<commit_message>
Migrated ResizeLab to ActionFramework, added ResizeLab button icon
</commit_message>
<xml_diff>
--- a/doc/Icons-ResizeLab.pptx
+++ b/doc/Icons-ResizeLab.pptx
@@ -107,6 +107,22 @@
       </a:defRPr>
     </a:lvl9pPr>
   </p:defaultTextStyle>
+  <p:extLst>
+    <p:ext uri="{EFAFB233-063F-42B5-8137-9DF3F51BA10A}">
+      <p15:sldGuideLst xmlns:p15="http://schemas.microsoft.com/office/powerpoint/2012/main">
+        <p15:guide id="1" orient="horz" pos="2160">
+          <p15:clr>
+            <a:srgbClr val="A4A3A4"/>
+          </p15:clr>
+        </p15:guide>
+        <p15:guide id="2" pos="2880">
+          <p15:clr>
+            <a:srgbClr val="A4A3A4"/>
+          </p15:clr>
+        </p15:guide>
+      </p15:sldGuideLst>
+    </p:ext>
+  </p:extLst>
 </p:presentation>
 </file>
 
@@ -192,7 +208,7 @@
           <a:p>
             <a:fld id="{6699ACB9-486C-4D62-A3A7-AF98E13EFDA3}" type="datetimeFigureOut">
               <a:rPr lang="en-US" smtClean="0"/>
-              <a:t>2/6/2016</a:t>
+              <a:t>2/25/2016</a:t>
             </a:fld>
             <a:endParaRPr lang="en-US"/>
           </a:p>
@@ -642,7 +658,7 @@
             <a:fld id="{1D8BD707-D9CF-40AE-B4C6-C98DA3205C09}" type="datetimeFigureOut">
               <a:rPr lang="en-US" smtClean="0"/>
               <a:pPr/>
-              <a:t>2/6/2016</a:t>
+              <a:t>2/25/2016</a:t>
             </a:fld>
             <a:endParaRPr lang="en-US"/>
           </a:p>
@@ -809,7 +825,7 @@
             <a:fld id="{1D8BD707-D9CF-40AE-B4C6-C98DA3205C09}" type="datetimeFigureOut">
               <a:rPr lang="en-US" smtClean="0"/>
               <a:pPr/>
-              <a:t>2/6/2016</a:t>
+              <a:t>2/25/2016</a:t>
             </a:fld>
             <a:endParaRPr lang="en-US"/>
           </a:p>
@@ -986,7 +1002,7 @@
             <a:fld id="{1D8BD707-D9CF-40AE-B4C6-C98DA3205C09}" type="datetimeFigureOut">
               <a:rPr lang="en-US" smtClean="0"/>
               <a:pPr/>
-              <a:t>2/6/2016</a:t>
+              <a:t>2/25/2016</a:t>
             </a:fld>
             <a:endParaRPr lang="en-US"/>
           </a:p>
@@ -1153,7 +1169,7 @@
             <a:fld id="{1D8BD707-D9CF-40AE-B4C6-C98DA3205C09}" type="datetimeFigureOut">
               <a:rPr lang="en-US" smtClean="0"/>
               <a:pPr/>
-              <a:t>2/6/2016</a:t>
+              <a:t>2/25/2016</a:t>
             </a:fld>
             <a:endParaRPr lang="en-US"/>
           </a:p>
@@ -1396,7 +1412,7 @@
             <a:fld id="{1D8BD707-D9CF-40AE-B4C6-C98DA3205C09}" type="datetimeFigureOut">
               <a:rPr lang="en-US" smtClean="0"/>
               <a:pPr/>
-              <a:t>2/6/2016</a:t>
+              <a:t>2/25/2016</a:t>
             </a:fld>
             <a:endParaRPr lang="en-US"/>
           </a:p>
@@ -1681,7 +1697,7 @@
             <a:fld id="{1D8BD707-D9CF-40AE-B4C6-C98DA3205C09}" type="datetimeFigureOut">
               <a:rPr lang="en-US" smtClean="0"/>
               <a:pPr/>
-              <a:t>2/6/2016</a:t>
+              <a:t>2/25/2016</a:t>
             </a:fld>
             <a:endParaRPr lang="en-US"/>
           </a:p>
@@ -2100,7 +2116,7 @@
             <a:fld id="{1D8BD707-D9CF-40AE-B4C6-C98DA3205C09}" type="datetimeFigureOut">
               <a:rPr lang="en-US" smtClean="0"/>
               <a:pPr/>
-              <a:t>2/6/2016</a:t>
+              <a:t>2/25/2016</a:t>
             </a:fld>
             <a:endParaRPr lang="en-US"/>
           </a:p>
@@ -2215,7 +2231,7 @@
             <a:fld id="{1D8BD707-D9CF-40AE-B4C6-C98DA3205C09}" type="datetimeFigureOut">
               <a:rPr lang="en-US" smtClean="0"/>
               <a:pPr/>
-              <a:t>2/6/2016</a:t>
+              <a:t>2/25/2016</a:t>
             </a:fld>
             <a:endParaRPr lang="en-US"/>
           </a:p>
@@ -2307,7 +2323,7 @@
             <a:fld id="{1D8BD707-D9CF-40AE-B4C6-C98DA3205C09}" type="datetimeFigureOut">
               <a:rPr lang="en-US" smtClean="0"/>
               <a:pPr/>
-              <a:t>2/6/2016</a:t>
+              <a:t>2/25/2016</a:t>
             </a:fld>
             <a:endParaRPr lang="en-US"/>
           </a:p>
@@ -2581,7 +2597,7 @@
             <a:fld id="{1D8BD707-D9CF-40AE-B4C6-C98DA3205C09}" type="datetimeFigureOut">
               <a:rPr lang="en-US" smtClean="0"/>
               <a:pPr/>
-              <a:t>2/6/2016</a:t>
+              <a:t>2/25/2016</a:t>
             </a:fld>
             <a:endParaRPr lang="en-US"/>
           </a:p>
@@ -2831,7 +2847,7 @@
             <a:fld id="{1D8BD707-D9CF-40AE-B4C6-C98DA3205C09}" type="datetimeFigureOut">
               <a:rPr lang="en-US" smtClean="0"/>
               <a:pPr/>
-              <a:t>2/6/2016</a:t>
+              <a:t>2/25/2016</a:t>
             </a:fld>
             <a:endParaRPr lang="en-US"/>
           </a:p>
@@ -3041,7 +3057,7 @@
             <a:fld id="{1D8BD707-D9CF-40AE-B4C6-C98DA3205C09}" type="datetimeFigureOut">
               <a:rPr lang="en-US" smtClean="0"/>
               <a:pPr/>
-              <a:t>2/6/2016</a:t>
+              <a:t>2/25/2016</a:t>
             </a:fld>
             <a:endParaRPr lang="en-US"/>
           </a:p>
@@ -3700,6 +3716,249 @@
           </a:extLst>
         </p:spPr>
       </p:pic>
+      <p:grpSp>
+        <p:nvGrpSpPr>
+          <p:cNvPr id="7" name="Group 6"/>
+          <p:cNvGrpSpPr>
+            <a:grpSpLocks/>
+          </p:cNvGrpSpPr>
+          <p:nvPr/>
+        </p:nvGrpSpPr>
+        <p:grpSpPr>
+          <a:xfrm>
+            <a:off x="2802694" y="2980172"/>
+            <a:ext cx="838200" cy="838200"/>
+            <a:chOff x="375266" y="5397326"/>
+            <a:chExt cx="838200" cy="838200"/>
+          </a:xfrm>
+        </p:grpSpPr>
+        <p:sp>
+          <p:nvSpPr>
+            <p:cNvPr id="8" name="Rectangle 7"/>
+            <p:cNvSpPr/>
+            <p:nvPr/>
+          </p:nvSpPr>
+          <p:spPr>
+            <a:xfrm>
+              <a:off x="375266" y="5397326"/>
+              <a:ext cx="838200" cy="838200"/>
+            </a:xfrm>
+            <a:prstGeom prst="rect">
+              <a:avLst/>
+            </a:prstGeom>
+            <a:noFill/>
+            <a:ln>
+              <a:noFill/>
+            </a:ln>
+          </p:spPr>
+          <p:style>
+            <a:lnRef idx="2">
+              <a:schemeClr val="accent1">
+                <a:shade val="50000"/>
+              </a:schemeClr>
+            </a:lnRef>
+            <a:fillRef idx="1">
+              <a:schemeClr val="accent1"/>
+            </a:fillRef>
+            <a:effectRef idx="0">
+              <a:schemeClr val="accent1"/>
+            </a:effectRef>
+            <a:fontRef idx="minor">
+              <a:schemeClr val="lt1"/>
+            </a:fontRef>
+          </p:style>
+          <p:txBody>
+            <a:bodyPr rtlCol="0" anchor="ctr"/>
+            <a:lstStyle/>
+            <a:p>
+              <a:pPr algn="ctr"/>
+              <a:endParaRPr lang="en-SG"/>
+            </a:p>
+          </p:txBody>
+        </p:sp>
+        <p:sp>
+          <p:nvSpPr>
+            <p:cNvPr id="9" name="Rectangle 4"/>
+            <p:cNvSpPr/>
+            <p:nvPr/>
+          </p:nvSpPr>
+          <p:spPr>
+            <a:xfrm rot="16200000">
+              <a:off x="444221" y="5470529"/>
+              <a:ext cx="700291" cy="690781"/>
+            </a:xfrm>
+            <a:custGeom>
+              <a:avLst/>
+              <a:gdLst/>
+              <a:ahLst/>
+              <a:cxnLst/>
+              <a:rect l="l" t="t" r="r" b="b"/>
+              <a:pathLst>
+                <a:path w="1752603" h="1752600">
+                  <a:moveTo>
+                    <a:pt x="533400" y="0"/>
+                  </a:moveTo>
+                  <a:lnTo>
+                    <a:pt x="533403" y="0"/>
+                  </a:lnTo>
+                  <a:lnTo>
+                    <a:pt x="1066800" y="0"/>
+                  </a:lnTo>
+                  <a:lnTo>
+                    <a:pt x="1752603" y="0"/>
+                  </a:lnTo>
+                  <a:lnTo>
+                    <a:pt x="1752603" y="1752600"/>
+                  </a:lnTo>
+                  <a:lnTo>
+                    <a:pt x="1219203" y="1752600"/>
+                  </a:lnTo>
+                  <a:lnTo>
+                    <a:pt x="533403" y="1752600"/>
+                  </a:lnTo>
+                  <a:lnTo>
+                    <a:pt x="3" y="1752600"/>
+                  </a:lnTo>
+                  <a:lnTo>
+                    <a:pt x="3" y="533430"/>
+                  </a:lnTo>
+                  <a:cubicBezTo>
+                    <a:pt x="0" y="533420"/>
+                    <a:pt x="0" y="533410"/>
+                    <a:pt x="0" y="533400"/>
+                  </a:cubicBezTo>
+                  <a:cubicBezTo>
+                    <a:pt x="0" y="238811"/>
+                    <a:pt x="238811" y="0"/>
+                    <a:pt x="533400" y="0"/>
+                  </a:cubicBezTo>
+                  <a:close/>
+                </a:path>
+              </a:pathLst>
+            </a:custGeom>
+            <a:noFill/>
+            <a:ln w="76200" cmpd="sng">
+              <a:solidFill>
+                <a:srgbClr val="0070C0"/>
+              </a:solidFill>
+              <a:miter lim="800000"/>
+            </a:ln>
+          </p:spPr>
+          <p:style>
+            <a:lnRef idx="2">
+              <a:schemeClr val="accent1">
+                <a:shade val="50000"/>
+              </a:schemeClr>
+            </a:lnRef>
+            <a:fillRef idx="1">
+              <a:schemeClr val="accent1"/>
+            </a:fillRef>
+            <a:effectRef idx="0">
+              <a:schemeClr val="accent1"/>
+            </a:effectRef>
+            <a:fontRef idx="minor">
+              <a:schemeClr val="lt1"/>
+            </a:fontRef>
+          </p:style>
+          <p:txBody>
+            <a:bodyPr rtlCol="0" anchor="ctr"/>
+            <a:lstStyle/>
+            <a:p>
+              <a:pPr algn="ctr"/>
+              <a:endParaRPr lang="en-US"/>
+            </a:p>
+          </p:txBody>
+        </p:sp>
+      </p:grpSp>
+      <p:cxnSp>
+        <p:nvCxnSpPr>
+          <p:cNvPr id="10" name="Straight Arrow Connector 10"/>
+          <p:cNvCxnSpPr>
+            <a:cxnSpLocks/>
+          </p:cNvCxnSpPr>
+          <p:nvPr/>
+        </p:nvCxnSpPr>
+        <p:spPr>
+          <a:xfrm flipH="1">
+            <a:off x="2991473" y="3132483"/>
+            <a:ext cx="498742" cy="495478"/>
+          </a:xfrm>
+          <a:prstGeom prst="straightConnector1">
+            <a:avLst/>
+          </a:prstGeom>
+          <a:ln w="63500">
+            <a:solidFill>
+              <a:srgbClr val="E56C08"/>
+            </a:solidFill>
+            <a:headEnd type="triangle"/>
+            <a:tailEnd type="triangle"/>
+          </a:ln>
+        </p:spPr>
+        <p:style>
+          <a:lnRef idx="1">
+            <a:schemeClr val="accent1"/>
+          </a:lnRef>
+          <a:fillRef idx="0">
+            <a:schemeClr val="accent1"/>
+          </a:fillRef>
+          <a:effectRef idx="0">
+            <a:schemeClr val="accent1"/>
+          </a:effectRef>
+          <a:fontRef idx="minor">
+            <a:schemeClr val="tx1"/>
+          </a:fontRef>
+        </p:style>
+      </p:cxnSp>
+      <p:sp>
+        <p:nvSpPr>
+          <p:cNvPr id="11" name="Rectangle 10"/>
+          <p:cNvSpPr>
+            <a:spLocks/>
+          </p:cNvSpPr>
+          <p:nvPr/>
+        </p:nvSpPr>
+        <p:spPr>
+          <a:xfrm>
+            <a:off x="3160640" y="3299260"/>
+            <a:ext cx="169935" cy="171450"/>
+          </a:xfrm>
+          <a:prstGeom prst="rect">
+            <a:avLst/>
+          </a:prstGeom>
+          <a:solidFill>
+            <a:srgbClr val="0070C0"/>
+          </a:solidFill>
+          <a:ln>
+            <a:solidFill>
+              <a:srgbClr val="0070C0"/>
+            </a:solidFill>
+          </a:ln>
+        </p:spPr>
+        <p:style>
+          <a:lnRef idx="2">
+            <a:schemeClr val="accent1">
+              <a:shade val="50000"/>
+            </a:schemeClr>
+          </a:lnRef>
+          <a:fillRef idx="1">
+            <a:schemeClr val="accent1"/>
+          </a:fillRef>
+          <a:effectRef idx="0">
+            <a:schemeClr val="accent1"/>
+          </a:effectRef>
+          <a:fontRef idx="minor">
+            <a:schemeClr val="lt1"/>
+          </a:fontRef>
+        </p:style>
+        <p:txBody>
+          <a:bodyPr rtlCol="0" anchor="ctr"/>
+          <a:lstStyle/>
+          <a:p>
+            <a:pPr algn="ctr"/>
+            <a:endParaRPr lang="en-US"/>
+          </a:p>
+        </p:txBody>
+      </p:sp>
     </p:spTree>
     <p:extLst>
       <p:ext uri="{BB962C8B-B14F-4D97-AF65-F5344CB8AC3E}">

</xml_diff>

<commit_message>
Updated icons for ResizeLab
</commit_message>
<xml_diff>
--- a/doc/Icons-ResizeLab.pptx
+++ b/doc/Icons-ResizeLab.pptx
@@ -5866,23 +5866,165 @@
           </a:fontRef>
         </p:style>
       </p:cxnSp>
+      <p:sp>
+        <p:nvSpPr>
+          <p:cNvPr id="58" name="Rounded Rectangle 57"/>
+          <p:cNvSpPr>
+            <a:spLocks/>
+          </p:cNvSpPr>
+          <p:nvPr/>
+        </p:nvSpPr>
+        <p:spPr>
+          <a:xfrm>
+            <a:off x="2231449" y="5478413"/>
+            <a:ext cx="187199" cy="89804"/>
+          </a:xfrm>
+          <a:prstGeom prst="roundRect">
+            <a:avLst/>
+          </a:prstGeom>
+          <a:solidFill>
+            <a:srgbClr val="F79645"/>
+          </a:solidFill>
+          <a:ln w="9525">
+            <a:solidFill>
+              <a:srgbClr val="F7974B"/>
+            </a:solidFill>
+          </a:ln>
+        </p:spPr>
+        <p:style>
+          <a:lnRef idx="2">
+            <a:schemeClr val="accent1">
+              <a:shade val="50000"/>
+            </a:schemeClr>
+          </a:lnRef>
+          <a:fillRef idx="1">
+            <a:schemeClr val="accent1"/>
+          </a:fillRef>
+          <a:effectRef idx="0">
+            <a:schemeClr val="accent1"/>
+          </a:effectRef>
+          <a:fontRef idx="minor">
+            <a:schemeClr val="lt1"/>
+          </a:fontRef>
+        </p:style>
+        <p:txBody>
+          <a:bodyPr tIns="25200" rtlCol="0" anchor="ctr" anchorCtr="0"/>
+          <a:lstStyle/>
+          <a:p>
+            <a:pPr algn="ctr"/>
+            <a:endParaRPr lang="en-US" sz="800" dirty="0">
+              <a:solidFill>
+                <a:srgbClr val="0070C0"/>
+              </a:solidFill>
+            </a:endParaRPr>
+          </a:p>
+        </p:txBody>
+      </p:sp>
+      <p:sp>
+        <p:nvSpPr>
+          <p:cNvPr id="67" name="Rounded Rectangle 66"/>
+          <p:cNvSpPr>
+            <a:spLocks/>
+          </p:cNvSpPr>
+          <p:nvPr/>
+        </p:nvSpPr>
+        <p:spPr>
+          <a:xfrm>
+            <a:off x="2101211" y="5641858"/>
+            <a:ext cx="176400" cy="84623"/>
+          </a:xfrm>
+          <a:prstGeom prst="roundRect">
+            <a:avLst/>
+          </a:prstGeom>
+          <a:solidFill>
+            <a:srgbClr val="0070C0"/>
+          </a:solidFill>
+          <a:ln w="9525">
+            <a:solidFill>
+              <a:srgbClr val="0070C0"/>
+            </a:solidFill>
+          </a:ln>
+        </p:spPr>
+        <p:style>
+          <a:lnRef idx="2">
+            <a:schemeClr val="accent1">
+              <a:shade val="50000"/>
+            </a:schemeClr>
+          </a:lnRef>
+          <a:fillRef idx="1">
+            <a:schemeClr val="accent1"/>
+          </a:fillRef>
+          <a:effectRef idx="0">
+            <a:schemeClr val="accent1"/>
+          </a:effectRef>
+          <a:fontRef idx="minor">
+            <a:schemeClr val="lt1"/>
+          </a:fontRef>
+        </p:style>
+        <p:txBody>
+          <a:bodyPr rtlCol="0" anchor="ctr"/>
+          <a:lstStyle/>
+          <a:p>
+            <a:pPr algn="ctr"/>
+            <a:endParaRPr lang="en-US" dirty="0"/>
+          </a:p>
+        </p:txBody>
+      </p:sp>
+      <p:cxnSp>
+        <p:nvCxnSpPr>
+          <p:cNvPr id="68" name="Straight Connector 67"/>
+          <p:cNvCxnSpPr>
+            <a:cxnSpLocks/>
+          </p:cNvCxnSpPr>
+          <p:nvPr/>
+        </p:nvCxnSpPr>
+        <p:spPr>
+          <a:xfrm flipH="1">
+            <a:off x="2425919" y="5449138"/>
+            <a:ext cx="3236" cy="327600"/>
+          </a:xfrm>
+          <a:prstGeom prst="line">
+            <a:avLst/>
+          </a:prstGeom>
+          <a:ln w="9525">
+            <a:solidFill>
+              <a:srgbClr val="0070C0"/>
+            </a:solidFill>
+            <a:prstDash val="solid"/>
+          </a:ln>
+        </p:spPr>
+        <p:style>
+          <a:lnRef idx="1">
+            <a:schemeClr val="accent1"/>
+          </a:lnRef>
+          <a:fillRef idx="0">
+            <a:schemeClr val="accent1"/>
+          </a:fillRef>
+          <a:effectRef idx="0">
+            <a:schemeClr val="accent1"/>
+          </a:effectRef>
+          <a:fontRef idx="minor">
+            <a:schemeClr val="tx1"/>
+          </a:fontRef>
+        </p:style>
+      </p:cxnSp>
       <p:grpSp>
         <p:nvGrpSpPr>
-          <p:cNvPr id="9" name="Group 8"/>
+          <p:cNvPr id="13" name="Group 12"/>
           <p:cNvGrpSpPr/>
           <p:nvPr/>
         </p:nvGrpSpPr>
         <p:grpSpPr>
           <a:xfrm>
-            <a:off x="2152011" y="5449138"/>
-            <a:ext cx="277144" cy="327600"/>
-            <a:chOff x="2152011" y="5449138"/>
-            <a:chExt cx="277144" cy="327600"/>
+            <a:off x="1942400" y="1718929"/>
+            <a:ext cx="289841" cy="327600"/>
+            <a:chOff x="1942400" y="1718929"/>
+            <a:chExt cx="289841" cy="327600"/>
           </a:xfrm>
         </p:grpSpPr>
         <p:sp>
           <p:nvSpPr>
-            <p:cNvPr id="58" name="Rounded Rectangle 57"/>
+            <p:cNvPr id="54" name="Rounded Rectangle 53"/>
             <p:cNvSpPr>
               <a:spLocks noChangeAspect="1"/>
             </p:cNvSpPr>
@@ -5890,7 +6032,7 @@
           </p:nvSpPr>
           <p:spPr>
             <a:xfrm>
-              <a:off x="2231449" y="5478413"/>
+              <a:off x="1954305" y="1748204"/>
               <a:ext cx="187199" cy="89804"/>
             </a:xfrm>
             <a:prstGeom prst="roundRect">
@@ -5936,7 +6078,7 @@
         </p:sp>
         <p:sp>
           <p:nvSpPr>
-            <p:cNvPr id="67" name="Rounded Rectangle 66"/>
+            <p:cNvPr id="55" name="Rounded Rectangle 54"/>
             <p:cNvSpPr>
               <a:spLocks noChangeAspect="1"/>
             </p:cNvSpPr>
@@ -5944,7 +6086,7 @@
           </p:nvSpPr>
           <p:spPr>
             <a:xfrm>
-              <a:off x="2152011" y="5641858"/>
+              <a:off x="2055841" y="1911649"/>
               <a:ext cx="176400" cy="84623"/>
             </a:xfrm>
             <a:prstGeom prst="roundRect">
@@ -5986,7 +6128,7 @@
         </p:sp>
         <p:cxnSp>
           <p:nvCxnSpPr>
-            <p:cNvPr id="68" name="Straight Connector 67"/>
+            <p:cNvPr id="66" name="Straight Connector 65"/>
             <p:cNvCxnSpPr>
               <a:cxnSpLocks/>
             </p:cNvCxnSpPr>
@@ -5994,7 +6136,7 @@
           </p:nvCxnSpPr>
           <p:spPr>
             <a:xfrm flipH="1">
-              <a:off x="2425919" y="5449138"/>
+              <a:off x="1942400" y="1718929"/>
               <a:ext cx="3236" cy="327600"/>
             </a:xfrm>
             <a:prstGeom prst="line">
@@ -6024,14 +6166,14 @@
         </p:cxnSp>
         <p:cxnSp>
           <p:nvCxnSpPr>
-            <p:cNvPr id="69" name="Straight Arrow Connector 68"/>
+            <p:cNvPr id="70" name="Straight Arrow Connector 69"/>
             <p:cNvCxnSpPr/>
             <p:nvPr/>
           </p:nvCxnSpPr>
           <p:spPr>
-            <a:xfrm rot="10800000" flipH="1">
-              <a:off x="2332318" y="5683553"/>
-              <a:ext cx="90000" cy="0"/>
+            <a:xfrm flipH="1" flipV="1">
+              <a:off x="1949606" y="1953344"/>
+              <a:ext cx="108000" cy="617"/>
             </a:xfrm>
             <a:prstGeom prst="straightConnector1">
               <a:avLst/>
@@ -6063,15 +6205,15 @@
       </p:grpSp>
       <p:sp>
         <p:nvSpPr>
-          <p:cNvPr id="54" name="Rounded Rectangle 53"/>
+          <p:cNvPr id="72" name="Rounded Rectangle 71"/>
           <p:cNvSpPr>
-            <a:spLocks noChangeAspect="1"/>
+            <a:spLocks/>
           </p:cNvSpPr>
           <p:nvPr/>
         </p:nvSpPr>
         <p:spPr>
           <a:xfrm>
-            <a:off x="1954305" y="1679152"/>
+            <a:off x="6062460" y="2565367"/>
             <a:ext cx="187199" cy="89804"/>
           </a:xfrm>
           <a:prstGeom prst="roundRect">
@@ -6117,15 +6259,299 @@
       </p:sp>
       <p:sp>
         <p:nvSpPr>
-          <p:cNvPr id="55" name="Rounded Rectangle 54"/>
+          <p:cNvPr id="73" name="Rounded Rectangle 72"/>
           <p:cNvSpPr>
-            <a:spLocks noChangeAspect="1"/>
+            <a:spLocks/>
           </p:cNvSpPr>
           <p:nvPr/>
         </p:nvSpPr>
         <p:spPr>
           <a:xfrm>
-            <a:off x="2055841" y="1842597"/>
+            <a:off x="5968735" y="2797074"/>
+            <a:ext cx="183600" cy="88077"/>
+          </a:xfrm>
+          <a:prstGeom prst="roundRect">
+            <a:avLst/>
+          </a:prstGeom>
+          <a:solidFill>
+            <a:srgbClr val="0070C0"/>
+          </a:solidFill>
+          <a:ln w="9525">
+            <a:solidFill>
+              <a:srgbClr val="0070C0"/>
+            </a:solidFill>
+          </a:ln>
+        </p:spPr>
+        <p:style>
+          <a:lnRef idx="2">
+            <a:schemeClr val="accent1">
+              <a:shade val="50000"/>
+            </a:schemeClr>
+          </a:lnRef>
+          <a:fillRef idx="1">
+            <a:schemeClr val="accent1"/>
+          </a:fillRef>
+          <a:effectRef idx="0">
+            <a:schemeClr val="accent1"/>
+          </a:effectRef>
+          <a:fontRef idx="minor">
+            <a:schemeClr val="lt1"/>
+          </a:fontRef>
+        </p:style>
+        <p:txBody>
+          <a:bodyPr rtlCol="0" anchor="ctr"/>
+          <a:lstStyle/>
+          <a:p>
+            <a:pPr algn="ctr"/>
+            <a:endParaRPr lang="en-US" dirty="0"/>
+          </a:p>
+        </p:txBody>
+      </p:sp>
+      <p:cxnSp>
+        <p:nvCxnSpPr>
+          <p:cNvPr id="74" name="Straight Connector 73"/>
+          <p:cNvCxnSpPr>
+            <a:cxnSpLocks/>
+          </p:cNvCxnSpPr>
+          <p:nvPr/>
+        </p:nvCxnSpPr>
+        <p:spPr>
+          <a:xfrm rot="5400000" flipH="1">
+            <a:off x="6106731" y="2391418"/>
+            <a:ext cx="0" cy="331200"/>
+          </a:xfrm>
+          <a:prstGeom prst="line">
+            <a:avLst/>
+          </a:prstGeom>
+          <a:ln w="9525">
+            <a:solidFill>
+              <a:srgbClr val="0070C0"/>
+            </a:solidFill>
+            <a:prstDash val="solid"/>
+          </a:ln>
+        </p:spPr>
+        <p:style>
+          <a:lnRef idx="1">
+            <a:schemeClr val="accent1"/>
+          </a:lnRef>
+          <a:fillRef idx="0">
+            <a:schemeClr val="accent1"/>
+          </a:fillRef>
+          <a:effectRef idx="0">
+            <a:schemeClr val="accent1"/>
+          </a:effectRef>
+          <a:fontRef idx="minor">
+            <a:schemeClr val="tx1"/>
+          </a:fontRef>
+        </p:style>
+      </p:cxnSp>
+      <p:sp>
+        <p:nvSpPr>
+          <p:cNvPr id="77" name="Rounded Rectangle 76"/>
+          <p:cNvSpPr>
+            <a:spLocks/>
+          </p:cNvSpPr>
+          <p:nvPr/>
+        </p:nvSpPr>
+        <p:spPr>
+          <a:xfrm>
+            <a:off x="6181864" y="5321394"/>
+            <a:ext cx="187199" cy="89804"/>
+          </a:xfrm>
+          <a:prstGeom prst="roundRect">
+            <a:avLst/>
+          </a:prstGeom>
+          <a:solidFill>
+            <a:srgbClr val="F79645"/>
+          </a:solidFill>
+          <a:ln w="9525">
+            <a:solidFill>
+              <a:srgbClr val="F7974B"/>
+            </a:solidFill>
+          </a:ln>
+        </p:spPr>
+        <p:style>
+          <a:lnRef idx="2">
+            <a:schemeClr val="accent1">
+              <a:shade val="50000"/>
+            </a:schemeClr>
+          </a:lnRef>
+          <a:fillRef idx="1">
+            <a:schemeClr val="accent1"/>
+          </a:fillRef>
+          <a:effectRef idx="0">
+            <a:schemeClr val="accent1"/>
+          </a:effectRef>
+          <a:fontRef idx="minor">
+            <a:schemeClr val="lt1"/>
+          </a:fontRef>
+        </p:style>
+        <p:txBody>
+          <a:bodyPr tIns="25200" rtlCol="0" anchor="ctr" anchorCtr="0"/>
+          <a:lstStyle/>
+          <a:p>
+            <a:pPr algn="ctr"/>
+            <a:endParaRPr lang="en-US" sz="800" dirty="0">
+              <a:solidFill>
+                <a:srgbClr val="0070C0"/>
+              </a:solidFill>
+            </a:endParaRPr>
+          </a:p>
+        </p:txBody>
+      </p:sp>
+      <p:sp>
+        <p:nvSpPr>
+          <p:cNvPr id="78" name="Rounded Rectangle 77"/>
+          <p:cNvSpPr>
+            <a:spLocks/>
+          </p:cNvSpPr>
+          <p:nvPr/>
+        </p:nvSpPr>
+        <p:spPr>
+          <a:xfrm>
+            <a:off x="6088139" y="5092720"/>
+            <a:ext cx="183600" cy="88077"/>
+          </a:xfrm>
+          <a:prstGeom prst="roundRect">
+            <a:avLst/>
+          </a:prstGeom>
+          <a:solidFill>
+            <a:srgbClr val="0070C0"/>
+          </a:solidFill>
+          <a:ln w="9525">
+            <a:solidFill>
+              <a:srgbClr val="0070C0"/>
+            </a:solidFill>
+          </a:ln>
+        </p:spPr>
+        <p:style>
+          <a:lnRef idx="2">
+            <a:schemeClr val="accent1">
+              <a:shade val="50000"/>
+            </a:schemeClr>
+          </a:lnRef>
+          <a:fillRef idx="1">
+            <a:schemeClr val="accent1"/>
+          </a:fillRef>
+          <a:effectRef idx="0">
+            <a:schemeClr val="accent1"/>
+          </a:effectRef>
+          <a:fontRef idx="minor">
+            <a:schemeClr val="lt1"/>
+          </a:fontRef>
+        </p:style>
+        <p:txBody>
+          <a:bodyPr rtlCol="0" anchor="ctr"/>
+          <a:lstStyle/>
+          <a:p>
+            <a:pPr algn="ctr"/>
+            <a:endParaRPr lang="en-US" dirty="0"/>
+          </a:p>
+        </p:txBody>
+      </p:sp>
+      <p:cxnSp>
+        <p:nvCxnSpPr>
+          <p:cNvPr id="79" name="Straight Connector 78"/>
+          <p:cNvCxnSpPr>
+            <a:cxnSpLocks/>
+          </p:cNvCxnSpPr>
+          <p:nvPr/>
+        </p:nvCxnSpPr>
+        <p:spPr>
+          <a:xfrm rot="5400000" flipH="1">
+            <a:off x="6226135" y="5254600"/>
+            <a:ext cx="0" cy="331200"/>
+          </a:xfrm>
+          <a:prstGeom prst="line">
+            <a:avLst/>
+          </a:prstGeom>
+          <a:ln w="9525">
+            <a:solidFill>
+              <a:srgbClr val="0070C0"/>
+            </a:solidFill>
+            <a:prstDash val="solid"/>
+          </a:ln>
+        </p:spPr>
+        <p:style>
+          <a:lnRef idx="1">
+            <a:schemeClr val="accent1"/>
+          </a:lnRef>
+          <a:fillRef idx="0">
+            <a:schemeClr val="accent1"/>
+          </a:fillRef>
+          <a:effectRef idx="0">
+            <a:schemeClr val="accent1"/>
+          </a:effectRef>
+          <a:fontRef idx="minor">
+            <a:schemeClr val="tx1"/>
+          </a:fontRef>
+        </p:style>
+      </p:cxnSp>
+      <p:sp>
+        <p:nvSpPr>
+          <p:cNvPr id="71" name="Rounded Rectangle 70"/>
+          <p:cNvSpPr>
+            <a:spLocks/>
+          </p:cNvSpPr>
+          <p:nvPr/>
+        </p:nvSpPr>
+        <p:spPr>
+          <a:xfrm>
+            <a:off x="1959068" y="2124449"/>
+            <a:ext cx="187199" cy="89804"/>
+          </a:xfrm>
+          <a:prstGeom prst="roundRect">
+            <a:avLst/>
+          </a:prstGeom>
+          <a:solidFill>
+            <a:srgbClr val="F79645"/>
+          </a:solidFill>
+          <a:ln w="9525">
+            <a:solidFill>
+              <a:srgbClr val="F7974B"/>
+            </a:solidFill>
+          </a:ln>
+        </p:spPr>
+        <p:style>
+          <a:lnRef idx="2">
+            <a:schemeClr val="accent1">
+              <a:shade val="50000"/>
+            </a:schemeClr>
+          </a:lnRef>
+          <a:fillRef idx="1">
+            <a:schemeClr val="accent1"/>
+          </a:fillRef>
+          <a:effectRef idx="0">
+            <a:schemeClr val="accent1"/>
+          </a:effectRef>
+          <a:fontRef idx="minor">
+            <a:schemeClr val="lt1"/>
+          </a:fontRef>
+        </p:style>
+        <p:txBody>
+          <a:bodyPr tIns="25200" rtlCol="0" anchor="ctr" anchorCtr="0"/>
+          <a:lstStyle/>
+          <a:p>
+            <a:pPr algn="ctr"/>
+            <a:endParaRPr lang="en-US" sz="800" dirty="0">
+              <a:solidFill>
+                <a:srgbClr val="0070C0"/>
+              </a:solidFill>
+            </a:endParaRPr>
+          </a:p>
+        </p:txBody>
+      </p:sp>
+      <p:sp>
+        <p:nvSpPr>
+          <p:cNvPr id="76" name="Rounded Rectangle 75"/>
+          <p:cNvSpPr>
+            <a:spLocks/>
+          </p:cNvSpPr>
+          <p:nvPr/>
+        </p:nvSpPr>
+        <p:spPr>
+          <a:xfrm>
+            <a:off x="2096319" y="2297418"/>
             <a:ext cx="176400" cy="84623"/>
           </a:xfrm>
           <a:prstGeom prst="roundRect">
@@ -6167,7 +6593,7 @@
       </p:sp>
       <p:cxnSp>
         <p:nvCxnSpPr>
-          <p:cNvPr id="66" name="Straight Connector 65"/>
+          <p:cNvPr id="88" name="Straight Connector 87"/>
           <p:cNvCxnSpPr>
             <a:cxnSpLocks/>
           </p:cNvCxnSpPr>
@@ -6175,17 +6601,17 @@
         </p:nvCxnSpPr>
         <p:spPr>
           <a:xfrm flipH="1">
-            <a:off x="1942400" y="1649877"/>
+            <a:off x="1947163" y="2095174"/>
             <a:ext cx="3236" cy="327600"/>
           </a:xfrm>
           <a:prstGeom prst="line">
             <a:avLst/>
           </a:prstGeom>
-          <a:ln w="9525">
+          <a:ln w="9525" cmpd="sng">
             <a:solidFill>
               <a:srgbClr val="0070C0"/>
             </a:solidFill>
-            <a:prstDash val="dash"/>
+            <a:prstDash val="solid"/>
           </a:ln>
         </p:spPr>
         <p:style>
@@ -6203,434 +6629,218 @@
           </a:fontRef>
         </p:style>
       </p:cxnSp>
-      <p:cxnSp>
-        <p:nvCxnSpPr>
-          <p:cNvPr id="70" name="Straight Arrow Connector 69"/>
-          <p:cNvCxnSpPr/>
+      <p:sp>
+        <p:nvSpPr>
+          <p:cNvPr id="90" name="Rounded Rectangle 89"/>
+          <p:cNvSpPr>
+            <a:spLocks/>
+          </p:cNvSpPr>
           <p:nvPr/>
-        </p:nvCxnSpPr>
+        </p:nvSpPr>
         <p:spPr>
-          <a:xfrm flipH="1" flipV="1">
-            <a:off x="1949606" y="1884292"/>
-            <a:ext cx="108000" cy="617"/>
+          <a:xfrm>
+            <a:off x="1951066" y="2297416"/>
+            <a:ext cx="176400" cy="84623"/>
           </a:xfrm>
-          <a:prstGeom prst="straightConnector1">
+          <a:prstGeom prst="roundRect">
             <a:avLst/>
           </a:prstGeom>
-          <a:ln w="6985">
+          <a:solidFill>
+            <a:srgbClr val="0070C0">
+              <a:alpha val="30000"/>
+            </a:srgbClr>
+          </a:solidFill>
+          <a:ln w="9525">
             <a:solidFill>
               <a:srgbClr val="0070C0"/>
             </a:solidFill>
-            <a:round/>
-            <a:headEnd w="sm" len="sm"/>
-            <a:tailEnd type="stealth" w="med" len="sm"/>
+            <a:prstDash val="dash"/>
           </a:ln>
         </p:spPr>
         <p:style>
-          <a:lnRef idx="1">
-            <a:schemeClr val="accent1"/>
+          <a:lnRef idx="2">
+            <a:schemeClr val="accent1">
+              <a:shade val="50000"/>
+            </a:schemeClr>
           </a:lnRef>
-          <a:fillRef idx="0">
+          <a:fillRef idx="1">
             <a:schemeClr val="accent1"/>
           </a:fillRef>
           <a:effectRef idx="0">
             <a:schemeClr val="accent1"/>
           </a:effectRef>
           <a:fontRef idx="minor">
-            <a:schemeClr val="tx1"/>
+            <a:schemeClr val="lt1"/>
           </a:fontRef>
         </p:style>
-      </p:cxnSp>
-      <p:grpSp>
-        <p:nvGrpSpPr>
-          <p:cNvPr id="16" name="Group 15"/>
-          <p:cNvGrpSpPr/>
+        <p:txBody>
+          <a:bodyPr rtlCol="0" anchor="ctr"/>
+          <a:lstStyle/>
+          <a:p>
+            <a:pPr algn="ctr"/>
+            <a:endParaRPr lang="en-US" dirty="0"/>
+          </a:p>
+        </p:txBody>
+      </p:sp>
+      <p:sp>
+        <p:nvSpPr>
+          <p:cNvPr id="91" name="Rounded Rectangle 90"/>
+          <p:cNvSpPr>
+            <a:spLocks/>
+          </p:cNvSpPr>
           <p:nvPr/>
-        </p:nvGrpSpPr>
-        <p:grpSpPr>
+        </p:nvSpPr>
+        <p:spPr>
           <a:xfrm>
-            <a:off x="5941131" y="2555399"/>
-            <a:ext cx="331200" cy="278952"/>
-            <a:chOff x="5941131" y="2555399"/>
-            <a:chExt cx="331200" cy="278952"/>
+            <a:off x="2247294" y="5641858"/>
+            <a:ext cx="176400" cy="84623"/>
           </a:xfrm>
-        </p:grpSpPr>
-        <p:sp>
-          <p:nvSpPr>
-            <p:cNvPr id="72" name="Rounded Rectangle 71"/>
-            <p:cNvSpPr>
-              <a:spLocks noChangeAspect="1"/>
-            </p:cNvSpPr>
-            <p:nvPr/>
-          </p:nvSpPr>
-          <p:spPr>
-            <a:xfrm>
-              <a:off x="6062460" y="2565367"/>
-              <a:ext cx="187199" cy="89804"/>
-            </a:xfrm>
-            <a:prstGeom prst="roundRect">
-              <a:avLst/>
-            </a:prstGeom>
-            <a:solidFill>
-              <a:srgbClr val="F79645"/>
-            </a:solidFill>
-            <a:ln w="9525">
-              <a:solidFill>
-                <a:srgbClr val="F7974B"/>
-              </a:solidFill>
-            </a:ln>
-          </p:spPr>
-          <p:style>
-            <a:lnRef idx="2">
-              <a:schemeClr val="accent1">
-                <a:shade val="50000"/>
-              </a:schemeClr>
-            </a:lnRef>
-            <a:fillRef idx="1">
-              <a:schemeClr val="accent1"/>
-            </a:fillRef>
-            <a:effectRef idx="0">
-              <a:schemeClr val="accent1"/>
-            </a:effectRef>
-            <a:fontRef idx="minor">
-              <a:schemeClr val="lt1"/>
-            </a:fontRef>
-          </p:style>
-          <p:txBody>
-            <a:bodyPr tIns="25200" rtlCol="0" anchor="ctr" anchorCtr="0"/>
-            <a:lstStyle/>
-            <a:p>
-              <a:pPr algn="ctr"/>
-              <a:endParaRPr lang="en-US" sz="800" dirty="0">
-                <a:solidFill>
-                  <a:srgbClr val="0070C0"/>
-                </a:solidFill>
-              </a:endParaRPr>
-            </a:p>
-          </p:txBody>
-        </p:sp>
-        <p:sp>
-          <p:nvSpPr>
-            <p:cNvPr id="73" name="Rounded Rectangle 72"/>
-            <p:cNvSpPr>
-              <a:spLocks noChangeAspect="1"/>
-            </p:cNvSpPr>
-            <p:nvPr/>
-          </p:nvSpPr>
-          <p:spPr>
-            <a:xfrm>
-              <a:off x="5968735" y="2746274"/>
-              <a:ext cx="183600" cy="88077"/>
-            </a:xfrm>
-            <a:prstGeom prst="roundRect">
-              <a:avLst/>
-            </a:prstGeom>
+          <a:prstGeom prst="roundRect">
+            <a:avLst/>
+          </a:prstGeom>
+          <a:solidFill>
+            <a:srgbClr val="0070C0">
+              <a:alpha val="30000"/>
+            </a:srgbClr>
+          </a:solidFill>
+          <a:ln w="9525">
             <a:solidFill>
               <a:srgbClr val="0070C0"/>
             </a:solidFill>
-            <a:ln w="9525">
-              <a:solidFill>
-                <a:srgbClr val="0070C0"/>
-              </a:solidFill>
-            </a:ln>
-          </p:spPr>
-          <p:style>
-            <a:lnRef idx="2">
-              <a:schemeClr val="accent1">
-                <a:shade val="50000"/>
-              </a:schemeClr>
-            </a:lnRef>
-            <a:fillRef idx="1">
-              <a:schemeClr val="accent1"/>
-            </a:fillRef>
-            <a:effectRef idx="0">
-              <a:schemeClr val="accent1"/>
-            </a:effectRef>
-            <a:fontRef idx="minor">
-              <a:schemeClr val="lt1"/>
-            </a:fontRef>
-          </p:style>
-          <p:txBody>
-            <a:bodyPr rtlCol="0" anchor="ctr"/>
-            <a:lstStyle/>
-            <a:p>
-              <a:pPr algn="ctr"/>
-              <a:endParaRPr lang="en-US" dirty="0"/>
-            </a:p>
-          </p:txBody>
-        </p:sp>
-        <p:cxnSp>
-          <p:nvCxnSpPr>
-            <p:cNvPr id="74" name="Straight Connector 73"/>
-            <p:cNvCxnSpPr>
-              <a:cxnSpLocks/>
-            </p:cNvCxnSpPr>
-            <p:nvPr/>
-          </p:nvCxnSpPr>
-          <p:spPr>
-            <a:xfrm rot="5400000" flipH="1">
-              <a:off x="6105113" y="2391418"/>
-              <a:ext cx="3236" cy="331200"/>
-            </a:xfrm>
-            <a:prstGeom prst="line">
-              <a:avLst/>
-            </a:prstGeom>
-            <a:ln w="9525">
-              <a:solidFill>
-                <a:srgbClr val="0070C0"/>
-              </a:solidFill>
-              <a:prstDash val="dash"/>
-            </a:ln>
-          </p:spPr>
-          <p:style>
-            <a:lnRef idx="1">
-              <a:schemeClr val="accent1"/>
-            </a:lnRef>
-            <a:fillRef idx="0">
-              <a:schemeClr val="accent1"/>
-            </a:fillRef>
-            <a:effectRef idx="0">
-              <a:schemeClr val="accent1"/>
-            </a:effectRef>
-            <a:fontRef idx="minor">
-              <a:schemeClr val="tx1"/>
-            </a:fontRef>
-          </p:style>
-        </p:cxnSp>
-        <p:cxnSp>
-          <p:nvCxnSpPr>
-            <p:cNvPr id="75" name="Straight Arrow Connector 74"/>
-            <p:cNvCxnSpPr/>
-            <p:nvPr/>
-          </p:nvCxnSpPr>
-          <p:spPr>
-            <a:xfrm flipV="1">
-              <a:off x="5994017" y="2555399"/>
-              <a:ext cx="4353" cy="190800"/>
-            </a:xfrm>
-            <a:prstGeom prst="straightConnector1">
-              <a:avLst/>
-            </a:prstGeom>
-            <a:ln w="6985">
-              <a:solidFill>
-                <a:srgbClr val="0070C0"/>
-              </a:solidFill>
-              <a:round/>
-              <a:headEnd w="sm" len="sm"/>
-              <a:tailEnd type="stealth" w="med" len="sm"/>
-            </a:ln>
-          </p:spPr>
-          <p:style>
-            <a:lnRef idx="1">
-              <a:schemeClr val="accent1"/>
-            </a:lnRef>
-            <a:fillRef idx="0">
-              <a:schemeClr val="accent1"/>
-            </a:fillRef>
-            <a:effectRef idx="0">
-              <a:schemeClr val="accent1"/>
-            </a:effectRef>
-            <a:fontRef idx="minor">
-              <a:schemeClr val="tx1"/>
-            </a:fontRef>
-          </p:style>
-        </p:cxnSp>
-      </p:grpSp>
-      <p:grpSp>
-        <p:nvGrpSpPr>
-          <p:cNvPr id="17" name="Group 16"/>
-          <p:cNvGrpSpPr/>
+            <a:prstDash val="dash"/>
+          </a:ln>
+        </p:spPr>
+        <p:style>
+          <a:lnRef idx="2">
+            <a:schemeClr val="accent1">
+              <a:shade val="50000"/>
+            </a:schemeClr>
+          </a:lnRef>
+          <a:fillRef idx="1">
+            <a:schemeClr val="accent1"/>
+          </a:fillRef>
+          <a:effectRef idx="0">
+            <a:schemeClr val="accent1"/>
+          </a:effectRef>
+          <a:fontRef idx="minor">
+            <a:schemeClr val="lt1"/>
+          </a:fontRef>
+        </p:style>
+        <p:txBody>
+          <a:bodyPr rtlCol="0" anchor="ctr"/>
+          <a:lstStyle/>
+          <a:p>
+            <a:pPr algn="ctr"/>
+            <a:endParaRPr lang="en-US" dirty="0"/>
+          </a:p>
+        </p:txBody>
+      </p:sp>
+      <p:sp>
+        <p:nvSpPr>
+          <p:cNvPr id="92" name="Rounded Rectangle 91"/>
+          <p:cNvSpPr>
+            <a:spLocks/>
+          </p:cNvSpPr>
           <p:nvPr/>
-        </p:nvGrpSpPr>
-        <p:grpSpPr>
+        </p:nvSpPr>
+        <p:spPr>
           <a:xfrm>
-            <a:off x="6060535" y="5140345"/>
-            <a:ext cx="331200" cy="281473"/>
-            <a:chOff x="6060535" y="5140345"/>
-            <a:chExt cx="331200" cy="281473"/>
+            <a:off x="5972335" y="2555399"/>
+            <a:ext cx="176400" cy="267175"/>
           </a:xfrm>
-        </p:grpSpPr>
-        <p:sp>
-          <p:nvSpPr>
-            <p:cNvPr id="77" name="Rounded Rectangle 76"/>
-            <p:cNvSpPr>
-              <a:spLocks noChangeAspect="1"/>
-            </p:cNvSpPr>
-            <p:nvPr/>
-          </p:nvSpPr>
-          <p:spPr>
-            <a:xfrm>
-              <a:off x="6181864" y="5321394"/>
-              <a:ext cx="187199" cy="89804"/>
-            </a:xfrm>
-            <a:prstGeom prst="roundRect">
-              <a:avLst/>
-            </a:prstGeom>
-            <a:solidFill>
-              <a:srgbClr val="F79645"/>
-            </a:solidFill>
-            <a:ln w="9525">
-              <a:solidFill>
-                <a:srgbClr val="F7974B"/>
-              </a:solidFill>
-            </a:ln>
-          </p:spPr>
-          <p:style>
-            <a:lnRef idx="2">
-              <a:schemeClr val="accent1">
-                <a:shade val="50000"/>
-              </a:schemeClr>
-            </a:lnRef>
-            <a:fillRef idx="1">
-              <a:schemeClr val="accent1"/>
-            </a:fillRef>
-            <a:effectRef idx="0">
-              <a:schemeClr val="accent1"/>
-            </a:effectRef>
-            <a:fontRef idx="minor">
-              <a:schemeClr val="lt1"/>
-            </a:fontRef>
-          </p:style>
-          <p:txBody>
-            <a:bodyPr tIns="25200" rtlCol="0" anchor="ctr" anchorCtr="0"/>
-            <a:lstStyle/>
-            <a:p>
-              <a:pPr algn="ctr"/>
-              <a:endParaRPr lang="en-US" sz="800" dirty="0">
-                <a:solidFill>
-                  <a:srgbClr val="0070C0"/>
-                </a:solidFill>
-              </a:endParaRPr>
-            </a:p>
-          </p:txBody>
-        </p:sp>
-        <p:sp>
-          <p:nvSpPr>
-            <p:cNvPr id="78" name="Rounded Rectangle 77"/>
-            <p:cNvSpPr>
-              <a:spLocks noChangeAspect="1"/>
-            </p:cNvSpPr>
-            <p:nvPr/>
-          </p:nvSpPr>
-          <p:spPr>
-            <a:xfrm>
-              <a:off x="6088139" y="5140345"/>
-              <a:ext cx="183600" cy="88077"/>
-            </a:xfrm>
-            <a:prstGeom prst="roundRect">
-              <a:avLst/>
-            </a:prstGeom>
+          <a:prstGeom prst="roundRect">
+            <a:avLst/>
+          </a:prstGeom>
+          <a:solidFill>
+            <a:srgbClr val="0070C0">
+              <a:alpha val="30000"/>
+            </a:srgbClr>
+          </a:solidFill>
+          <a:ln w="9525">
             <a:solidFill>
               <a:srgbClr val="0070C0"/>
             </a:solidFill>
-            <a:ln w="9525">
-              <a:solidFill>
-                <a:srgbClr val="0070C0"/>
-              </a:solidFill>
-            </a:ln>
-          </p:spPr>
-          <p:style>
-            <a:lnRef idx="2">
-              <a:schemeClr val="accent1">
-                <a:shade val="50000"/>
-              </a:schemeClr>
-            </a:lnRef>
-            <a:fillRef idx="1">
-              <a:schemeClr val="accent1"/>
-            </a:fillRef>
-            <a:effectRef idx="0">
-              <a:schemeClr val="accent1"/>
-            </a:effectRef>
-            <a:fontRef idx="minor">
-              <a:schemeClr val="lt1"/>
-            </a:fontRef>
-          </p:style>
-          <p:txBody>
-            <a:bodyPr rtlCol="0" anchor="ctr"/>
-            <a:lstStyle/>
-            <a:p>
-              <a:pPr algn="ctr"/>
-              <a:endParaRPr lang="en-US" dirty="0"/>
-            </a:p>
-          </p:txBody>
-        </p:sp>
-        <p:cxnSp>
-          <p:nvCxnSpPr>
-            <p:cNvPr id="79" name="Straight Connector 78"/>
-            <p:cNvCxnSpPr>
-              <a:cxnSpLocks/>
-            </p:cNvCxnSpPr>
-            <p:nvPr/>
-          </p:nvCxnSpPr>
-          <p:spPr>
-            <a:xfrm rot="5400000" flipH="1">
-              <a:off x="6224517" y="5254600"/>
-              <a:ext cx="3236" cy="331200"/>
-            </a:xfrm>
-            <a:prstGeom prst="line">
-              <a:avLst/>
-            </a:prstGeom>
-            <a:ln w="9525">
-              <a:solidFill>
-                <a:srgbClr val="0070C0"/>
-              </a:solidFill>
-              <a:prstDash val="dash"/>
-            </a:ln>
-          </p:spPr>
-          <p:style>
-            <a:lnRef idx="1">
-              <a:schemeClr val="accent1"/>
-            </a:lnRef>
-            <a:fillRef idx="0">
-              <a:schemeClr val="accent1"/>
-            </a:fillRef>
-            <a:effectRef idx="0">
-              <a:schemeClr val="accent1"/>
-            </a:effectRef>
-            <a:fontRef idx="minor">
-              <a:schemeClr val="tx1"/>
-            </a:fontRef>
-          </p:style>
-        </p:cxnSp>
-        <p:cxnSp>
-          <p:nvCxnSpPr>
-            <p:cNvPr id="87" name="Straight Arrow Connector 86"/>
-            <p:cNvCxnSpPr/>
-            <p:nvPr/>
-          </p:nvCxnSpPr>
-          <p:spPr>
-            <a:xfrm rot="10800000" flipV="1">
-              <a:off x="6113421" y="5231738"/>
-              <a:ext cx="4353" cy="180000"/>
-            </a:xfrm>
-            <a:prstGeom prst="straightConnector1">
-              <a:avLst/>
-            </a:prstGeom>
-            <a:ln w="6985">
-              <a:solidFill>
-                <a:srgbClr val="0070C0"/>
-              </a:solidFill>
-              <a:round/>
-              <a:headEnd w="sm" len="sm"/>
-              <a:tailEnd type="stealth" w="med" len="sm"/>
-            </a:ln>
-          </p:spPr>
-          <p:style>
-            <a:lnRef idx="1">
-              <a:schemeClr val="accent1"/>
-            </a:lnRef>
-            <a:fillRef idx="0">
-              <a:schemeClr val="accent1"/>
-            </a:fillRef>
-            <a:effectRef idx="0">
-              <a:schemeClr val="accent1"/>
-            </a:effectRef>
-            <a:fontRef idx="minor">
-              <a:schemeClr val="tx1"/>
-            </a:fontRef>
-          </p:style>
-        </p:cxnSp>
-      </p:grpSp>
+            <a:prstDash val="dash"/>
+          </a:ln>
+        </p:spPr>
+        <p:style>
+          <a:lnRef idx="2">
+            <a:schemeClr val="accent1">
+              <a:shade val="50000"/>
+            </a:schemeClr>
+          </a:lnRef>
+          <a:fillRef idx="1">
+            <a:schemeClr val="accent1"/>
+          </a:fillRef>
+          <a:effectRef idx="0">
+            <a:schemeClr val="accent1"/>
+          </a:effectRef>
+          <a:fontRef idx="minor">
+            <a:schemeClr val="lt1"/>
+          </a:fontRef>
+        </p:style>
+        <p:txBody>
+          <a:bodyPr rtlCol="0" anchor="ctr"/>
+          <a:lstStyle/>
+          <a:p>
+            <a:pPr algn="ctr"/>
+            <a:endParaRPr lang="en-US" dirty="0"/>
+          </a:p>
+        </p:txBody>
+      </p:sp>
+      <p:sp>
+        <p:nvSpPr>
+          <p:cNvPr id="93" name="Rounded Rectangle 92"/>
+          <p:cNvSpPr>
+            <a:spLocks/>
+          </p:cNvSpPr>
+          <p:nvPr/>
+        </p:nvSpPr>
+        <p:spPr>
+          <a:xfrm>
+            <a:off x="6095339" y="5151407"/>
+            <a:ext cx="176400" cy="267175"/>
+          </a:xfrm>
+          <a:prstGeom prst="roundRect">
+            <a:avLst/>
+          </a:prstGeom>
+          <a:solidFill>
+            <a:srgbClr val="0070C0">
+              <a:alpha val="30000"/>
+            </a:srgbClr>
+          </a:solidFill>
+          <a:ln w="9525">
+            <a:solidFill>
+              <a:srgbClr val="0070C0"/>
+            </a:solidFill>
+            <a:prstDash val="dash"/>
+          </a:ln>
+        </p:spPr>
+        <p:style>
+          <a:lnRef idx="2">
+            <a:schemeClr val="accent1">
+              <a:shade val="50000"/>
+            </a:schemeClr>
+          </a:lnRef>
+          <a:fillRef idx="1">
+            <a:schemeClr val="accent1"/>
+          </a:fillRef>
+          <a:effectRef idx="0">
+            <a:schemeClr val="accent1"/>
+          </a:effectRef>
+          <a:fontRef idx="minor">
+            <a:schemeClr val="lt1"/>
+          </a:fontRef>
+        </p:style>
+        <p:txBody>
+          <a:bodyPr rtlCol="0" anchor="ctr"/>
+          <a:lstStyle/>
+          <a:p>
+            <a:pPr algn="ctr"/>
+            <a:endParaRPr lang="en-US" dirty="0"/>
+          </a:p>
+        </p:txBody>
+      </p:sp>
     </p:spTree>
     <p:extLst>
       <p:ext uri="{BB962C8B-B14F-4D97-AF65-F5344CB8AC3E}">
@@ -12911,195 +13121,180 @@
           </a:p>
         </p:txBody>
       </p:sp>
-      <p:grpSp>
-        <p:nvGrpSpPr>
-          <p:cNvPr id="28" name="Group 27"/>
-          <p:cNvGrpSpPr/>
+      <p:sp>
+        <p:nvSpPr>
+          <p:cNvPr id="14" name="Rectangle 13"/>
+          <p:cNvSpPr>
+            <a:spLocks/>
+          </p:cNvSpPr>
           <p:nvPr/>
-        </p:nvGrpSpPr>
-        <p:grpSpPr>
+        </p:nvSpPr>
+        <p:spPr>
           <a:xfrm>
             <a:off x="1159405" y="2481097"/>
             <a:ext cx="316800" cy="316800"/>
-            <a:chOff x="1159405" y="2481097"/>
-            <a:chExt cx="316800" cy="316800"/>
           </a:xfrm>
-        </p:grpSpPr>
-        <p:sp>
-          <p:nvSpPr>
-            <p:cNvPr id="14" name="Rectangle 13"/>
-            <p:cNvSpPr>
-              <a:spLocks/>
-            </p:cNvSpPr>
-            <p:nvPr/>
-          </p:nvSpPr>
-          <p:spPr>
-            <a:xfrm>
-              <a:off x="1159405" y="2481097"/>
-              <a:ext cx="316800" cy="316800"/>
-            </a:xfrm>
-            <a:prstGeom prst="rect">
-              <a:avLst/>
-            </a:prstGeom>
-            <a:noFill/>
-            <a:ln>
-              <a:solidFill>
-                <a:srgbClr val="F79645"/>
-              </a:solidFill>
-            </a:ln>
-          </p:spPr>
-          <p:style>
-            <a:lnRef idx="2">
-              <a:schemeClr val="accent1">
-                <a:shade val="50000"/>
-              </a:schemeClr>
-            </a:lnRef>
-            <a:fillRef idx="1">
-              <a:schemeClr val="accent1"/>
-            </a:fillRef>
-            <a:effectRef idx="0">
-              <a:schemeClr val="accent1"/>
-            </a:effectRef>
-            <a:fontRef idx="minor">
-              <a:schemeClr val="lt1"/>
-            </a:fontRef>
-          </p:style>
-          <p:txBody>
-            <a:bodyPr rtlCol="0" anchor="ctr"/>
-            <a:lstStyle/>
-            <a:p>
-              <a:pPr algn="ctr"/>
-              <a:endParaRPr lang="en-US"/>
-            </a:p>
-          </p:txBody>
-        </p:sp>
-        <p:sp>
-          <p:nvSpPr>
-            <p:cNvPr id="15" name="Rounded Rectangle 14"/>
-            <p:cNvSpPr>
-              <a:spLocks noChangeAspect="1"/>
-            </p:cNvSpPr>
-            <p:nvPr/>
-          </p:nvSpPr>
-          <p:spPr>
-            <a:xfrm>
-              <a:off x="1260466" y="2595458"/>
-              <a:ext cx="124202" cy="88077"/>
-            </a:xfrm>
-            <a:prstGeom prst="roundRect">
-              <a:avLst/>
-            </a:prstGeom>
+          <a:prstGeom prst="rect">
+            <a:avLst/>
+          </a:prstGeom>
+          <a:noFill/>
+          <a:ln>
+            <a:solidFill>
+              <a:srgbClr val="F79645"/>
+            </a:solidFill>
+          </a:ln>
+        </p:spPr>
+        <p:style>
+          <a:lnRef idx="2">
+            <a:schemeClr val="accent1">
+              <a:shade val="50000"/>
+            </a:schemeClr>
+          </a:lnRef>
+          <a:fillRef idx="1">
+            <a:schemeClr val="accent1"/>
+          </a:fillRef>
+          <a:effectRef idx="0">
+            <a:schemeClr val="accent1"/>
+          </a:effectRef>
+          <a:fontRef idx="minor">
+            <a:schemeClr val="lt1"/>
+          </a:fontRef>
+        </p:style>
+        <p:txBody>
+          <a:bodyPr rtlCol="0" anchor="ctr"/>
+          <a:lstStyle/>
+          <a:p>
+            <a:pPr algn="ctr"/>
+            <a:endParaRPr lang="en-US"/>
+          </a:p>
+        </p:txBody>
+      </p:sp>
+      <p:sp>
+        <p:nvSpPr>
+          <p:cNvPr id="15" name="Rounded Rectangle 14"/>
+          <p:cNvSpPr>
+            <a:spLocks noChangeAspect="1"/>
+          </p:cNvSpPr>
+          <p:nvPr/>
+        </p:nvSpPr>
+        <p:spPr>
+          <a:xfrm>
+            <a:off x="1260466" y="2595458"/>
+            <a:ext cx="124202" cy="88077"/>
+          </a:xfrm>
+          <a:prstGeom prst="roundRect">
+            <a:avLst/>
+          </a:prstGeom>
+          <a:solidFill>
+            <a:srgbClr val="0070C0"/>
+          </a:solidFill>
+          <a:ln w="9525">
             <a:solidFill>
               <a:srgbClr val="0070C0"/>
             </a:solidFill>
-            <a:ln w="9525">
-              <a:solidFill>
-                <a:srgbClr val="0070C0"/>
-              </a:solidFill>
-            </a:ln>
-          </p:spPr>
-          <p:style>
-            <a:lnRef idx="2">
-              <a:schemeClr val="accent1">
-                <a:shade val="50000"/>
-              </a:schemeClr>
-            </a:lnRef>
-            <a:fillRef idx="1">
-              <a:schemeClr val="accent1"/>
-            </a:fillRef>
-            <a:effectRef idx="0">
-              <a:schemeClr val="accent1"/>
-            </a:effectRef>
-            <a:fontRef idx="minor">
-              <a:schemeClr val="lt1"/>
-            </a:fontRef>
-          </p:style>
-          <p:txBody>
-            <a:bodyPr rtlCol="0" anchor="ctr"/>
-            <a:lstStyle/>
-            <a:p>
-              <a:pPr algn="ctr"/>
-              <a:endParaRPr lang="en-US" dirty="0"/>
-            </a:p>
-          </p:txBody>
-        </p:sp>
-        <p:cxnSp>
-          <p:nvCxnSpPr>
-            <p:cNvPr id="16" name="Straight Arrow Connector 69"/>
-            <p:cNvCxnSpPr/>
-            <p:nvPr/>
-          </p:nvCxnSpPr>
-          <p:spPr>
-            <a:xfrm flipH="1" flipV="1">
-              <a:off x="1171576" y="2643096"/>
-              <a:ext cx="90000" cy="618"/>
-            </a:xfrm>
-            <a:prstGeom prst="straightConnector1">
-              <a:avLst/>
-            </a:prstGeom>
-            <a:ln w="6985">
-              <a:solidFill>
-                <a:srgbClr val="0070C0"/>
-              </a:solidFill>
-              <a:round/>
-              <a:headEnd w="sm" len="sm"/>
-              <a:tailEnd type="stealth" w="med" len="sm"/>
-            </a:ln>
-          </p:spPr>
-          <p:style>
-            <a:lnRef idx="1">
-              <a:schemeClr val="accent1"/>
-            </a:lnRef>
-            <a:fillRef idx="0">
-              <a:schemeClr val="accent1"/>
-            </a:fillRef>
-            <a:effectRef idx="0">
-              <a:schemeClr val="accent1"/>
-            </a:effectRef>
-            <a:fontRef idx="minor">
-              <a:schemeClr val="tx1"/>
-            </a:fontRef>
-          </p:style>
-        </p:cxnSp>
-        <p:cxnSp>
-          <p:nvCxnSpPr>
-            <p:cNvPr id="19" name="Straight Arrow Connector 69"/>
-            <p:cNvCxnSpPr/>
-            <p:nvPr/>
-          </p:nvCxnSpPr>
-          <p:spPr>
-            <a:xfrm rot="10800000" flipH="1" flipV="1">
-              <a:off x="1379119" y="2642478"/>
-              <a:ext cx="90000" cy="618"/>
-            </a:xfrm>
-            <a:prstGeom prst="straightConnector1">
-              <a:avLst/>
-            </a:prstGeom>
-            <a:ln w="6985">
-              <a:solidFill>
-                <a:srgbClr val="0070C0"/>
-              </a:solidFill>
-              <a:round/>
-              <a:headEnd w="sm" len="sm"/>
-              <a:tailEnd type="stealth" w="med" len="sm"/>
-            </a:ln>
-          </p:spPr>
-          <p:style>
-            <a:lnRef idx="1">
-              <a:schemeClr val="accent1"/>
-            </a:lnRef>
-            <a:fillRef idx="0">
-              <a:schemeClr val="accent1"/>
-            </a:fillRef>
-            <a:effectRef idx="0">
-              <a:schemeClr val="accent1"/>
-            </a:effectRef>
-            <a:fontRef idx="minor">
-              <a:schemeClr val="tx1"/>
-            </a:fontRef>
-          </p:style>
-        </p:cxnSp>
-      </p:grpSp>
+          </a:ln>
+        </p:spPr>
+        <p:style>
+          <a:lnRef idx="2">
+            <a:schemeClr val="accent1">
+              <a:shade val="50000"/>
+            </a:schemeClr>
+          </a:lnRef>
+          <a:fillRef idx="1">
+            <a:schemeClr val="accent1"/>
+          </a:fillRef>
+          <a:effectRef idx="0">
+            <a:schemeClr val="accent1"/>
+          </a:effectRef>
+          <a:fontRef idx="minor">
+            <a:schemeClr val="lt1"/>
+          </a:fontRef>
+        </p:style>
+        <p:txBody>
+          <a:bodyPr rtlCol="0" anchor="ctr"/>
+          <a:lstStyle/>
+          <a:p>
+            <a:pPr algn="ctr"/>
+            <a:endParaRPr lang="en-US" dirty="0"/>
+          </a:p>
+        </p:txBody>
+      </p:sp>
+      <p:cxnSp>
+        <p:nvCxnSpPr>
+          <p:cNvPr id="16" name="Straight Arrow Connector 69"/>
+          <p:cNvCxnSpPr/>
+          <p:nvPr/>
+        </p:nvCxnSpPr>
+        <p:spPr>
+          <a:xfrm flipH="1" flipV="1">
+            <a:off x="1171576" y="2643096"/>
+            <a:ext cx="90000" cy="618"/>
+          </a:xfrm>
+          <a:prstGeom prst="straightConnector1">
+            <a:avLst/>
+          </a:prstGeom>
+          <a:ln w="6985">
+            <a:solidFill>
+              <a:srgbClr val="0070C0"/>
+            </a:solidFill>
+            <a:round/>
+            <a:headEnd w="sm" len="sm"/>
+            <a:tailEnd type="stealth" w="med" len="sm"/>
+          </a:ln>
+        </p:spPr>
+        <p:style>
+          <a:lnRef idx="1">
+            <a:schemeClr val="accent1"/>
+          </a:lnRef>
+          <a:fillRef idx="0">
+            <a:schemeClr val="accent1"/>
+          </a:fillRef>
+          <a:effectRef idx="0">
+            <a:schemeClr val="accent1"/>
+          </a:effectRef>
+          <a:fontRef idx="minor">
+            <a:schemeClr val="tx1"/>
+          </a:fontRef>
+        </p:style>
+      </p:cxnSp>
+      <p:cxnSp>
+        <p:nvCxnSpPr>
+          <p:cNvPr id="19" name="Straight Arrow Connector 69"/>
+          <p:cNvCxnSpPr/>
+          <p:nvPr/>
+        </p:nvCxnSpPr>
+        <p:spPr>
+          <a:xfrm rot="10800000" flipH="1" flipV="1">
+            <a:off x="1379119" y="2642478"/>
+            <a:ext cx="90000" cy="618"/>
+          </a:xfrm>
+          <a:prstGeom prst="straightConnector1">
+            <a:avLst/>
+          </a:prstGeom>
+          <a:ln w="6985">
+            <a:solidFill>
+              <a:srgbClr val="0070C0"/>
+            </a:solidFill>
+            <a:round/>
+            <a:headEnd w="sm" len="sm"/>
+            <a:tailEnd type="stealth" w="med" len="sm"/>
+          </a:ln>
+        </p:spPr>
+        <p:style>
+          <a:lnRef idx="1">
+            <a:schemeClr val="accent1"/>
+          </a:lnRef>
+          <a:fillRef idx="0">
+            <a:schemeClr val="accent1"/>
+          </a:fillRef>
+          <a:effectRef idx="0">
+            <a:schemeClr val="accent1"/>
+          </a:effectRef>
+          <a:fontRef idx="minor">
+            <a:schemeClr val="tx1"/>
+          </a:fontRef>
+        </p:style>
+      </p:cxnSp>
       <p:grpSp>
         <p:nvGrpSpPr>
           <p:cNvPr id="34" name="Group 33"/>
@@ -13427,6 +13622,474 @@
           </a:fontRef>
         </p:style>
       </p:cxnSp>
+      <p:grpSp>
+        <p:nvGrpSpPr>
+          <p:cNvPr id="4" name="Group 3"/>
+          <p:cNvGrpSpPr/>
+          <p:nvPr/>
+        </p:nvGrpSpPr>
+        <p:grpSpPr>
+          <a:xfrm>
+            <a:off x="1833303" y="2488241"/>
+            <a:ext cx="316800" cy="316800"/>
+            <a:chOff x="1833303" y="2488241"/>
+            <a:chExt cx="316800" cy="316800"/>
+          </a:xfrm>
+        </p:grpSpPr>
+        <p:sp>
+          <p:nvSpPr>
+            <p:cNvPr id="20" name="Rectangle 19"/>
+            <p:cNvSpPr>
+              <a:spLocks/>
+            </p:cNvSpPr>
+            <p:nvPr/>
+          </p:nvSpPr>
+          <p:spPr>
+            <a:xfrm>
+              <a:off x="1833303" y="2488241"/>
+              <a:ext cx="316800" cy="316800"/>
+            </a:xfrm>
+            <a:prstGeom prst="rect">
+              <a:avLst/>
+            </a:prstGeom>
+            <a:noFill/>
+            <a:ln>
+              <a:solidFill>
+                <a:srgbClr val="F79645"/>
+              </a:solidFill>
+            </a:ln>
+          </p:spPr>
+          <p:style>
+            <a:lnRef idx="2">
+              <a:schemeClr val="accent1">
+                <a:shade val="50000"/>
+              </a:schemeClr>
+            </a:lnRef>
+            <a:fillRef idx="1">
+              <a:schemeClr val="accent1"/>
+            </a:fillRef>
+            <a:effectRef idx="0">
+              <a:schemeClr val="accent1"/>
+            </a:effectRef>
+            <a:fontRef idx="minor">
+              <a:schemeClr val="lt1"/>
+            </a:fontRef>
+          </p:style>
+          <p:txBody>
+            <a:bodyPr rtlCol="0" anchor="ctr"/>
+            <a:lstStyle/>
+            <a:p>
+              <a:pPr algn="ctr"/>
+              <a:endParaRPr lang="en-US"/>
+            </a:p>
+          </p:txBody>
+        </p:sp>
+        <p:sp>
+          <p:nvSpPr>
+            <p:cNvPr id="3" name="Oval 2"/>
+            <p:cNvSpPr>
+              <a:spLocks/>
+            </p:cNvSpPr>
+            <p:nvPr/>
+          </p:nvSpPr>
+          <p:spPr>
+            <a:xfrm>
+              <a:off x="1957503" y="2612441"/>
+              <a:ext cx="68400" cy="68400"/>
+            </a:xfrm>
+            <a:prstGeom prst="ellipse">
+              <a:avLst/>
+            </a:prstGeom>
+            <a:solidFill>
+              <a:srgbClr val="0070C0"/>
+            </a:solidFill>
+            <a:ln>
+              <a:solidFill>
+                <a:srgbClr val="0070C0"/>
+              </a:solidFill>
+            </a:ln>
+          </p:spPr>
+          <p:style>
+            <a:lnRef idx="2">
+              <a:schemeClr val="accent1">
+                <a:shade val="50000"/>
+              </a:schemeClr>
+            </a:lnRef>
+            <a:fillRef idx="1">
+              <a:schemeClr val="accent1"/>
+            </a:fillRef>
+            <a:effectRef idx="0">
+              <a:schemeClr val="accent1"/>
+            </a:effectRef>
+            <a:fontRef idx="minor">
+              <a:schemeClr val="lt1"/>
+            </a:fontRef>
+          </p:style>
+          <p:txBody>
+            <a:bodyPr rtlCol="0" anchor="ctr"/>
+            <a:lstStyle/>
+            <a:p>
+              <a:pPr algn="ctr"/>
+              <a:endParaRPr lang="en-US"/>
+            </a:p>
+          </p:txBody>
+        </p:sp>
+        <p:sp>
+          <p:nvSpPr>
+            <p:cNvPr id="22" name="Oval 21"/>
+            <p:cNvSpPr>
+              <a:spLocks/>
+            </p:cNvSpPr>
+            <p:nvPr/>
+          </p:nvSpPr>
+          <p:spPr>
+            <a:xfrm>
+              <a:off x="1853103" y="2604264"/>
+              <a:ext cx="277200" cy="86400"/>
+            </a:xfrm>
+            <a:prstGeom prst="ellipse">
+              <a:avLst/>
+            </a:prstGeom>
+            <a:solidFill>
+              <a:srgbClr val="0070C0">
+                <a:alpha val="30000"/>
+              </a:srgbClr>
+            </a:solidFill>
+            <a:ln w="9525">
+              <a:solidFill>
+                <a:srgbClr val="0070C0"/>
+              </a:solidFill>
+              <a:prstDash val="dash"/>
+            </a:ln>
+          </p:spPr>
+          <p:style>
+            <a:lnRef idx="2">
+              <a:schemeClr val="accent1">
+                <a:shade val="50000"/>
+              </a:schemeClr>
+            </a:lnRef>
+            <a:fillRef idx="1">
+              <a:schemeClr val="accent1"/>
+            </a:fillRef>
+            <a:effectRef idx="0">
+              <a:schemeClr val="accent1"/>
+            </a:effectRef>
+            <a:fontRef idx="minor">
+              <a:schemeClr val="lt1"/>
+            </a:fontRef>
+          </p:style>
+          <p:txBody>
+            <a:bodyPr rtlCol="0" anchor="ctr"/>
+            <a:lstStyle/>
+            <a:p>
+              <a:pPr algn="ctr"/>
+              <a:endParaRPr lang="en-US"/>
+            </a:p>
+          </p:txBody>
+        </p:sp>
+      </p:grpSp>
+      <p:sp>
+        <p:nvSpPr>
+          <p:cNvPr id="25" name="Rectangle 24"/>
+          <p:cNvSpPr>
+            <a:spLocks/>
+          </p:cNvSpPr>
+          <p:nvPr/>
+        </p:nvSpPr>
+        <p:spPr>
+          <a:xfrm rot="5400000">
+            <a:off x="4631767" y="2478716"/>
+            <a:ext cx="316800" cy="316800"/>
+          </a:xfrm>
+          <a:prstGeom prst="rect">
+            <a:avLst/>
+          </a:prstGeom>
+          <a:noFill/>
+          <a:ln>
+            <a:solidFill>
+              <a:srgbClr val="F79645"/>
+            </a:solidFill>
+          </a:ln>
+        </p:spPr>
+        <p:style>
+          <a:lnRef idx="2">
+            <a:schemeClr val="accent1">
+              <a:shade val="50000"/>
+            </a:schemeClr>
+          </a:lnRef>
+          <a:fillRef idx="1">
+            <a:schemeClr val="accent1"/>
+          </a:fillRef>
+          <a:effectRef idx="0">
+            <a:schemeClr val="accent1"/>
+          </a:effectRef>
+          <a:fontRef idx="minor">
+            <a:schemeClr val="lt1"/>
+          </a:fontRef>
+        </p:style>
+        <p:txBody>
+          <a:bodyPr rtlCol="0" anchor="ctr"/>
+          <a:lstStyle/>
+          <a:p>
+            <a:pPr algn="ctr"/>
+            <a:endParaRPr lang="en-US"/>
+          </a:p>
+        </p:txBody>
+      </p:sp>
+      <p:sp>
+        <p:nvSpPr>
+          <p:cNvPr id="26" name="Oval 25"/>
+          <p:cNvSpPr>
+            <a:spLocks/>
+          </p:cNvSpPr>
+          <p:nvPr/>
+        </p:nvSpPr>
+        <p:spPr>
+          <a:xfrm rot="5400000">
+            <a:off x="4755967" y="2602916"/>
+            <a:ext cx="68400" cy="68400"/>
+          </a:xfrm>
+          <a:prstGeom prst="ellipse">
+            <a:avLst/>
+          </a:prstGeom>
+          <a:solidFill>
+            <a:srgbClr val="0070C0"/>
+          </a:solidFill>
+          <a:ln>
+            <a:solidFill>
+              <a:srgbClr val="0070C0"/>
+            </a:solidFill>
+          </a:ln>
+        </p:spPr>
+        <p:style>
+          <a:lnRef idx="2">
+            <a:schemeClr val="accent1">
+              <a:shade val="50000"/>
+            </a:schemeClr>
+          </a:lnRef>
+          <a:fillRef idx="1">
+            <a:schemeClr val="accent1"/>
+          </a:fillRef>
+          <a:effectRef idx="0">
+            <a:schemeClr val="accent1"/>
+          </a:effectRef>
+          <a:fontRef idx="minor">
+            <a:schemeClr val="lt1"/>
+          </a:fontRef>
+        </p:style>
+        <p:txBody>
+          <a:bodyPr rtlCol="0" anchor="ctr"/>
+          <a:lstStyle/>
+          <a:p>
+            <a:pPr algn="ctr"/>
+            <a:endParaRPr lang="en-US"/>
+          </a:p>
+        </p:txBody>
+      </p:sp>
+      <p:sp>
+        <p:nvSpPr>
+          <p:cNvPr id="27" name="Oval 26"/>
+          <p:cNvSpPr>
+            <a:spLocks/>
+          </p:cNvSpPr>
+          <p:nvPr/>
+        </p:nvSpPr>
+        <p:spPr>
+          <a:xfrm rot="5400000">
+            <a:off x="4650744" y="2593916"/>
+            <a:ext cx="277200" cy="86400"/>
+          </a:xfrm>
+          <a:prstGeom prst="ellipse">
+            <a:avLst/>
+          </a:prstGeom>
+          <a:solidFill>
+            <a:srgbClr val="0070C0">
+              <a:alpha val="30000"/>
+            </a:srgbClr>
+          </a:solidFill>
+          <a:ln w="9525">
+            <a:solidFill>
+              <a:srgbClr val="0070C0"/>
+            </a:solidFill>
+            <a:prstDash val="dash"/>
+          </a:ln>
+        </p:spPr>
+        <p:style>
+          <a:lnRef idx="2">
+            <a:schemeClr val="accent1">
+              <a:shade val="50000"/>
+            </a:schemeClr>
+          </a:lnRef>
+          <a:fillRef idx="1">
+            <a:schemeClr val="accent1"/>
+          </a:fillRef>
+          <a:effectRef idx="0">
+            <a:schemeClr val="accent1"/>
+          </a:effectRef>
+          <a:fontRef idx="minor">
+            <a:schemeClr val="lt1"/>
+          </a:fontRef>
+        </p:style>
+        <p:txBody>
+          <a:bodyPr rtlCol="0" anchor="ctr"/>
+          <a:lstStyle/>
+          <a:p>
+            <a:pPr algn="ctr"/>
+            <a:endParaRPr lang="en-US"/>
+          </a:p>
+        </p:txBody>
+      </p:sp>
+      <p:sp>
+        <p:nvSpPr>
+          <p:cNvPr id="35" name="Rectangle 34"/>
+          <p:cNvSpPr>
+            <a:spLocks/>
+          </p:cNvSpPr>
+          <p:nvPr/>
+        </p:nvSpPr>
+        <p:spPr>
+          <a:xfrm>
+            <a:off x="7677537" y="2529977"/>
+            <a:ext cx="316800" cy="316800"/>
+          </a:xfrm>
+          <a:prstGeom prst="rect">
+            <a:avLst/>
+          </a:prstGeom>
+          <a:noFill/>
+          <a:ln>
+            <a:solidFill>
+              <a:srgbClr val="F79645"/>
+            </a:solidFill>
+          </a:ln>
+        </p:spPr>
+        <p:style>
+          <a:lnRef idx="2">
+            <a:schemeClr val="accent1">
+              <a:shade val="50000"/>
+            </a:schemeClr>
+          </a:lnRef>
+          <a:fillRef idx="1">
+            <a:schemeClr val="accent1"/>
+          </a:fillRef>
+          <a:effectRef idx="0">
+            <a:schemeClr val="accent1"/>
+          </a:effectRef>
+          <a:fontRef idx="minor">
+            <a:schemeClr val="lt1"/>
+          </a:fontRef>
+        </p:style>
+        <p:txBody>
+          <a:bodyPr rtlCol="0" anchor="ctr"/>
+          <a:lstStyle/>
+          <a:p>
+            <a:pPr algn="ctr"/>
+            <a:endParaRPr lang="en-US"/>
+          </a:p>
+        </p:txBody>
+      </p:sp>
+      <p:sp>
+        <p:nvSpPr>
+          <p:cNvPr id="38" name="Oval 37"/>
+          <p:cNvSpPr>
+            <a:spLocks/>
+          </p:cNvSpPr>
+          <p:nvPr/>
+        </p:nvSpPr>
+        <p:spPr>
+          <a:xfrm>
+            <a:off x="7801737" y="2654177"/>
+            <a:ext cx="68400" cy="68400"/>
+          </a:xfrm>
+          <a:prstGeom prst="ellipse">
+            <a:avLst/>
+          </a:prstGeom>
+          <a:solidFill>
+            <a:srgbClr val="0070C0"/>
+          </a:solidFill>
+          <a:ln>
+            <a:solidFill>
+              <a:srgbClr val="0070C0"/>
+            </a:solidFill>
+          </a:ln>
+        </p:spPr>
+        <p:style>
+          <a:lnRef idx="2">
+            <a:schemeClr val="accent1">
+              <a:shade val="50000"/>
+            </a:schemeClr>
+          </a:lnRef>
+          <a:fillRef idx="1">
+            <a:schemeClr val="accent1"/>
+          </a:fillRef>
+          <a:effectRef idx="0">
+            <a:schemeClr val="accent1"/>
+          </a:effectRef>
+          <a:fontRef idx="minor">
+            <a:schemeClr val="lt1"/>
+          </a:fontRef>
+        </p:style>
+        <p:txBody>
+          <a:bodyPr rtlCol="0" anchor="ctr"/>
+          <a:lstStyle/>
+          <a:p>
+            <a:pPr algn="ctr"/>
+            <a:endParaRPr lang="en-US"/>
+          </a:p>
+        </p:txBody>
+      </p:sp>
+      <p:sp>
+        <p:nvSpPr>
+          <p:cNvPr id="40" name="Oval 39"/>
+          <p:cNvSpPr>
+            <a:spLocks/>
+          </p:cNvSpPr>
+          <p:nvPr/>
+        </p:nvSpPr>
+        <p:spPr>
+          <a:xfrm>
+            <a:off x="7697337" y="2545996"/>
+            <a:ext cx="277200" cy="284400"/>
+          </a:xfrm>
+          <a:prstGeom prst="ellipse">
+            <a:avLst/>
+          </a:prstGeom>
+          <a:solidFill>
+            <a:srgbClr val="0070C0">
+              <a:alpha val="30000"/>
+            </a:srgbClr>
+          </a:solidFill>
+          <a:ln w="9525">
+            <a:solidFill>
+              <a:srgbClr val="0070C0"/>
+            </a:solidFill>
+            <a:prstDash val="dash"/>
+          </a:ln>
+        </p:spPr>
+        <p:style>
+          <a:lnRef idx="2">
+            <a:schemeClr val="accent1">
+              <a:shade val="50000"/>
+            </a:schemeClr>
+          </a:lnRef>
+          <a:fillRef idx="1">
+            <a:schemeClr val="accent1"/>
+          </a:fillRef>
+          <a:effectRef idx="0">
+            <a:schemeClr val="accent1"/>
+          </a:effectRef>
+          <a:fontRef idx="minor">
+            <a:schemeClr val="lt1"/>
+          </a:fontRef>
+        </p:style>
+        <p:txBody>
+          <a:bodyPr rtlCol="0" anchor="ctr"/>
+          <a:lstStyle/>
+          <a:p>
+            <a:pPr algn="ctr"/>
+            <a:endParaRPr lang="en-US"/>
+          </a:p>
+        </p:txBody>
+      </p:sp>
     </p:spTree>
     <p:extLst>
       <p:ext uri="{BB962C8B-B14F-4D97-AF65-F5344CB8AC3E}">

</xml_diff>

<commit_message>
Updated icons for fit to slide
</commit_message>
<xml_diff>
--- a/doc/Icons-ResizeLab.pptx
+++ b/doc/Icons-ResizeLab.pptx
@@ -213,7 +213,7 @@
           <a:p>
             <a:fld id="{6699ACB9-486C-4D62-A3A7-AF98E13EFDA3}" type="datetimeFigureOut">
               <a:rPr lang="en-US" smtClean="0"/>
-              <a:t>3/10/2016</a:t>
+              <a:t>3/17/2016</a:t>
             </a:fld>
             <a:endParaRPr lang="en-US"/>
           </a:p>
@@ -831,7 +831,7 @@
             <a:fld id="{1D8BD707-D9CF-40AE-B4C6-C98DA3205C09}" type="datetimeFigureOut">
               <a:rPr lang="en-US" smtClean="0"/>
               <a:pPr/>
-              <a:t>3/10/2016</a:t>
+              <a:t>3/17/2016</a:t>
             </a:fld>
             <a:endParaRPr lang="en-US"/>
           </a:p>
@@ -998,7 +998,7 @@
             <a:fld id="{1D8BD707-D9CF-40AE-B4C6-C98DA3205C09}" type="datetimeFigureOut">
               <a:rPr lang="en-US" smtClean="0"/>
               <a:pPr/>
-              <a:t>3/10/2016</a:t>
+              <a:t>3/17/2016</a:t>
             </a:fld>
             <a:endParaRPr lang="en-US"/>
           </a:p>
@@ -1175,7 +1175,7 @@
             <a:fld id="{1D8BD707-D9CF-40AE-B4C6-C98DA3205C09}" type="datetimeFigureOut">
               <a:rPr lang="en-US" smtClean="0"/>
               <a:pPr/>
-              <a:t>3/10/2016</a:t>
+              <a:t>3/17/2016</a:t>
             </a:fld>
             <a:endParaRPr lang="en-US"/>
           </a:p>
@@ -1342,7 +1342,7 @@
             <a:fld id="{1D8BD707-D9CF-40AE-B4C6-C98DA3205C09}" type="datetimeFigureOut">
               <a:rPr lang="en-US" smtClean="0"/>
               <a:pPr/>
-              <a:t>3/10/2016</a:t>
+              <a:t>3/17/2016</a:t>
             </a:fld>
             <a:endParaRPr lang="en-US"/>
           </a:p>
@@ -1585,7 +1585,7 @@
             <a:fld id="{1D8BD707-D9CF-40AE-B4C6-C98DA3205C09}" type="datetimeFigureOut">
               <a:rPr lang="en-US" smtClean="0"/>
               <a:pPr/>
-              <a:t>3/10/2016</a:t>
+              <a:t>3/17/2016</a:t>
             </a:fld>
             <a:endParaRPr lang="en-US"/>
           </a:p>
@@ -1870,7 +1870,7 @@
             <a:fld id="{1D8BD707-D9CF-40AE-B4C6-C98DA3205C09}" type="datetimeFigureOut">
               <a:rPr lang="en-US" smtClean="0"/>
               <a:pPr/>
-              <a:t>3/10/2016</a:t>
+              <a:t>3/17/2016</a:t>
             </a:fld>
             <a:endParaRPr lang="en-US"/>
           </a:p>
@@ -2289,7 +2289,7 @@
             <a:fld id="{1D8BD707-D9CF-40AE-B4C6-C98DA3205C09}" type="datetimeFigureOut">
               <a:rPr lang="en-US" smtClean="0"/>
               <a:pPr/>
-              <a:t>3/10/2016</a:t>
+              <a:t>3/17/2016</a:t>
             </a:fld>
             <a:endParaRPr lang="en-US"/>
           </a:p>
@@ -2404,7 +2404,7 @@
             <a:fld id="{1D8BD707-D9CF-40AE-B4C6-C98DA3205C09}" type="datetimeFigureOut">
               <a:rPr lang="en-US" smtClean="0"/>
               <a:pPr/>
-              <a:t>3/10/2016</a:t>
+              <a:t>3/17/2016</a:t>
             </a:fld>
             <a:endParaRPr lang="en-US"/>
           </a:p>
@@ -2496,7 +2496,7 @@
             <a:fld id="{1D8BD707-D9CF-40AE-B4C6-C98DA3205C09}" type="datetimeFigureOut">
               <a:rPr lang="en-US" smtClean="0"/>
               <a:pPr/>
-              <a:t>3/10/2016</a:t>
+              <a:t>3/17/2016</a:t>
             </a:fld>
             <a:endParaRPr lang="en-US"/>
           </a:p>
@@ -2770,7 +2770,7 @@
             <a:fld id="{1D8BD707-D9CF-40AE-B4C6-C98DA3205C09}" type="datetimeFigureOut">
               <a:rPr lang="en-US" smtClean="0"/>
               <a:pPr/>
-              <a:t>3/10/2016</a:t>
+              <a:t>3/17/2016</a:t>
             </a:fld>
             <a:endParaRPr lang="en-US"/>
           </a:p>
@@ -3020,7 +3020,7 @@
             <a:fld id="{1D8BD707-D9CF-40AE-B4C6-C98DA3205C09}" type="datetimeFigureOut">
               <a:rPr lang="en-US" smtClean="0"/>
               <a:pPr/>
-              <a:t>3/10/2016</a:t>
+              <a:t>3/17/2016</a:t>
             </a:fld>
             <a:endParaRPr lang="en-US"/>
           </a:p>
@@ -3230,7 +3230,7 @@
             <a:fld id="{1D8BD707-D9CF-40AE-B4C6-C98DA3205C09}" type="datetimeFigureOut">
               <a:rPr lang="en-US" smtClean="0"/>
               <a:pPr/>
-              <a:t>3/10/2016</a:t>
+              <a:t>3/17/2016</a:t>
             </a:fld>
             <a:endParaRPr lang="en-US"/>
           </a:p>
@@ -13624,7 +13624,7 @@
       </p:cxnSp>
       <p:grpSp>
         <p:nvGrpSpPr>
-          <p:cNvPr id="4" name="Group 3"/>
+          <p:cNvPr id="8" name="Group 7"/>
           <p:cNvGrpSpPr/>
           <p:nvPr/>
         </p:nvGrpSpPr>
@@ -13638,7 +13638,7 @@
         </p:grpSpPr>
         <p:sp>
           <p:nvSpPr>
-            <p:cNvPr id="20" name="Rectangle 19"/>
+            <p:cNvPr id="28" name="Rectangle 27"/>
             <p:cNvSpPr>
               <a:spLocks/>
             </p:cNvSpPr>
@@ -13686,7 +13686,7 @@
         </p:sp>
         <p:sp>
           <p:nvSpPr>
-            <p:cNvPr id="3" name="Oval 2"/>
+            <p:cNvPr id="29" name="Oval 28"/>
             <p:cNvSpPr>
               <a:spLocks/>
             </p:cNvSpPr>
@@ -13736,7 +13736,7 @@
         </p:sp>
         <p:sp>
           <p:nvSpPr>
-            <p:cNvPr id="22" name="Oval 21"/>
+            <p:cNvPr id="41" name="Oval 40"/>
             <p:cNvSpPr>
               <a:spLocks/>
             </p:cNvSpPr>
@@ -13759,7 +13759,7 @@
               <a:solidFill>
                 <a:srgbClr val="0070C0"/>
               </a:solidFill>
-              <a:prstDash val="dash"/>
+              <a:prstDash val="sysDash"/>
             </a:ln>
           </p:spPr>
           <p:style>
@@ -13788,308 +13788,338 @@
           </p:txBody>
         </p:sp>
       </p:grpSp>
-      <p:sp>
-        <p:nvSpPr>
-          <p:cNvPr id="25" name="Rectangle 24"/>
-          <p:cNvSpPr>
-            <a:spLocks/>
-          </p:cNvSpPr>
+      <p:grpSp>
+        <p:nvGrpSpPr>
+          <p:cNvPr id="9" name="Group 8"/>
+          <p:cNvGrpSpPr/>
           <p:nvPr/>
-        </p:nvSpPr>
-        <p:spPr>
-          <a:xfrm rot="5400000">
+        </p:nvGrpSpPr>
+        <p:grpSpPr>
+          <a:xfrm>
             <a:off x="4631767" y="2478716"/>
             <a:ext cx="316800" cy="316800"/>
+            <a:chOff x="4631767" y="2478716"/>
+            <a:chExt cx="316800" cy="316800"/>
           </a:xfrm>
-          <a:prstGeom prst="rect">
-            <a:avLst/>
-          </a:prstGeom>
-          <a:noFill/>
-          <a:ln>
-            <a:solidFill>
-              <a:srgbClr val="F79645"/>
-            </a:solidFill>
-          </a:ln>
-        </p:spPr>
-        <p:style>
-          <a:lnRef idx="2">
-            <a:schemeClr val="accent1">
-              <a:shade val="50000"/>
-            </a:schemeClr>
-          </a:lnRef>
-          <a:fillRef idx="1">
-            <a:schemeClr val="accent1"/>
-          </a:fillRef>
-          <a:effectRef idx="0">
-            <a:schemeClr val="accent1"/>
-          </a:effectRef>
-          <a:fontRef idx="minor">
-            <a:schemeClr val="lt1"/>
-          </a:fontRef>
-        </p:style>
-        <p:txBody>
-          <a:bodyPr rtlCol="0" anchor="ctr"/>
-          <a:lstStyle/>
-          <a:p>
-            <a:pPr algn="ctr"/>
-            <a:endParaRPr lang="en-US"/>
-          </a:p>
-        </p:txBody>
-      </p:sp>
-      <p:sp>
-        <p:nvSpPr>
-          <p:cNvPr id="26" name="Oval 25"/>
-          <p:cNvSpPr>
-            <a:spLocks/>
-          </p:cNvSpPr>
-          <p:nvPr/>
-        </p:nvSpPr>
-        <p:spPr>
-          <a:xfrm rot="5400000">
-            <a:off x="4755967" y="2602916"/>
-            <a:ext cx="68400" cy="68400"/>
-          </a:xfrm>
-          <a:prstGeom prst="ellipse">
-            <a:avLst/>
-          </a:prstGeom>
-          <a:solidFill>
-            <a:srgbClr val="0070C0"/>
-          </a:solidFill>
-          <a:ln>
+        </p:grpSpPr>
+        <p:sp>
+          <p:nvSpPr>
+            <p:cNvPr id="42" name="Rectangle 41"/>
+            <p:cNvSpPr>
+              <a:spLocks/>
+            </p:cNvSpPr>
+            <p:nvPr/>
+          </p:nvSpPr>
+          <p:spPr>
+            <a:xfrm rot="5400000">
+              <a:off x="4631767" y="2478716"/>
+              <a:ext cx="316800" cy="316800"/>
+            </a:xfrm>
+            <a:prstGeom prst="rect">
+              <a:avLst/>
+            </a:prstGeom>
+            <a:noFill/>
+            <a:ln>
+              <a:solidFill>
+                <a:srgbClr val="F79645"/>
+              </a:solidFill>
+            </a:ln>
+          </p:spPr>
+          <p:style>
+            <a:lnRef idx="2">
+              <a:schemeClr val="accent1">
+                <a:shade val="50000"/>
+              </a:schemeClr>
+            </a:lnRef>
+            <a:fillRef idx="1">
+              <a:schemeClr val="accent1"/>
+            </a:fillRef>
+            <a:effectRef idx="0">
+              <a:schemeClr val="accent1"/>
+            </a:effectRef>
+            <a:fontRef idx="minor">
+              <a:schemeClr val="lt1"/>
+            </a:fontRef>
+          </p:style>
+          <p:txBody>
+            <a:bodyPr rtlCol="0" anchor="ctr"/>
+            <a:lstStyle/>
+            <a:p>
+              <a:pPr algn="ctr"/>
+              <a:endParaRPr lang="en-US"/>
+            </a:p>
+          </p:txBody>
+        </p:sp>
+        <p:sp>
+          <p:nvSpPr>
+            <p:cNvPr id="43" name="Oval 42"/>
+            <p:cNvSpPr>
+              <a:spLocks/>
+            </p:cNvSpPr>
+            <p:nvPr/>
+          </p:nvSpPr>
+          <p:spPr>
+            <a:xfrm rot="5400000">
+              <a:off x="4755967" y="2602916"/>
+              <a:ext cx="68400" cy="68400"/>
+            </a:xfrm>
+            <a:prstGeom prst="ellipse">
+              <a:avLst/>
+            </a:prstGeom>
             <a:solidFill>
               <a:srgbClr val="0070C0"/>
             </a:solidFill>
-          </a:ln>
-        </p:spPr>
-        <p:style>
-          <a:lnRef idx="2">
-            <a:schemeClr val="accent1">
-              <a:shade val="50000"/>
-            </a:schemeClr>
-          </a:lnRef>
-          <a:fillRef idx="1">
-            <a:schemeClr val="accent1"/>
-          </a:fillRef>
-          <a:effectRef idx="0">
-            <a:schemeClr val="accent1"/>
-          </a:effectRef>
-          <a:fontRef idx="minor">
-            <a:schemeClr val="lt1"/>
-          </a:fontRef>
-        </p:style>
-        <p:txBody>
-          <a:bodyPr rtlCol="0" anchor="ctr"/>
-          <a:lstStyle/>
-          <a:p>
-            <a:pPr algn="ctr"/>
-            <a:endParaRPr lang="en-US"/>
-          </a:p>
-        </p:txBody>
-      </p:sp>
-      <p:sp>
-        <p:nvSpPr>
-          <p:cNvPr id="27" name="Oval 26"/>
-          <p:cNvSpPr>
-            <a:spLocks/>
-          </p:cNvSpPr>
+            <a:ln>
+              <a:solidFill>
+                <a:srgbClr val="0070C0"/>
+              </a:solidFill>
+            </a:ln>
+          </p:spPr>
+          <p:style>
+            <a:lnRef idx="2">
+              <a:schemeClr val="accent1">
+                <a:shade val="50000"/>
+              </a:schemeClr>
+            </a:lnRef>
+            <a:fillRef idx="1">
+              <a:schemeClr val="accent1"/>
+            </a:fillRef>
+            <a:effectRef idx="0">
+              <a:schemeClr val="accent1"/>
+            </a:effectRef>
+            <a:fontRef idx="minor">
+              <a:schemeClr val="lt1"/>
+            </a:fontRef>
+          </p:style>
+          <p:txBody>
+            <a:bodyPr rtlCol="0" anchor="ctr"/>
+            <a:lstStyle/>
+            <a:p>
+              <a:pPr algn="ctr"/>
+              <a:endParaRPr lang="en-US"/>
+            </a:p>
+          </p:txBody>
+        </p:sp>
+        <p:sp>
+          <p:nvSpPr>
+            <p:cNvPr id="44" name="Oval 43"/>
+            <p:cNvSpPr>
+              <a:spLocks/>
+            </p:cNvSpPr>
+            <p:nvPr/>
+          </p:nvSpPr>
+          <p:spPr>
+            <a:xfrm rot="5400000">
+              <a:off x="4650744" y="2593916"/>
+              <a:ext cx="277200" cy="86400"/>
+            </a:xfrm>
+            <a:prstGeom prst="ellipse">
+              <a:avLst/>
+            </a:prstGeom>
+            <a:solidFill>
+              <a:srgbClr val="0070C0">
+                <a:alpha val="30000"/>
+              </a:srgbClr>
+            </a:solidFill>
+            <a:ln w="9525">
+              <a:solidFill>
+                <a:srgbClr val="0070C0"/>
+              </a:solidFill>
+              <a:prstDash val="sysDash"/>
+            </a:ln>
+          </p:spPr>
+          <p:style>
+            <a:lnRef idx="2">
+              <a:schemeClr val="accent1">
+                <a:shade val="50000"/>
+              </a:schemeClr>
+            </a:lnRef>
+            <a:fillRef idx="1">
+              <a:schemeClr val="accent1"/>
+            </a:fillRef>
+            <a:effectRef idx="0">
+              <a:schemeClr val="accent1"/>
+            </a:effectRef>
+            <a:fontRef idx="minor">
+              <a:schemeClr val="lt1"/>
+            </a:fontRef>
+          </p:style>
+          <p:txBody>
+            <a:bodyPr rtlCol="0" anchor="ctr"/>
+            <a:lstStyle/>
+            <a:p>
+              <a:pPr algn="ctr"/>
+              <a:endParaRPr lang="en-US"/>
+            </a:p>
+          </p:txBody>
+        </p:sp>
+      </p:grpSp>
+      <p:grpSp>
+        <p:nvGrpSpPr>
+          <p:cNvPr id="10" name="Group 9"/>
+          <p:cNvGrpSpPr/>
           <p:nvPr/>
-        </p:nvSpPr>
-        <p:spPr>
-          <a:xfrm rot="5400000">
-            <a:off x="4650744" y="2593916"/>
-            <a:ext cx="277200" cy="86400"/>
+        </p:nvGrpSpPr>
+        <p:grpSpPr>
+          <a:xfrm>
+            <a:off x="7677537" y="2529977"/>
+            <a:ext cx="316800" cy="316800"/>
+            <a:chOff x="7677537" y="2529977"/>
+            <a:chExt cx="316800" cy="316800"/>
           </a:xfrm>
-          <a:prstGeom prst="ellipse">
-            <a:avLst/>
-          </a:prstGeom>
-          <a:solidFill>
-            <a:srgbClr val="0070C0">
-              <a:alpha val="30000"/>
-            </a:srgbClr>
-          </a:solidFill>
-          <a:ln w="9525">
+        </p:grpSpPr>
+        <p:sp>
+          <p:nvSpPr>
+            <p:cNvPr id="45" name="Rectangle 44"/>
+            <p:cNvSpPr>
+              <a:spLocks/>
+            </p:cNvSpPr>
+            <p:nvPr/>
+          </p:nvSpPr>
+          <p:spPr>
+            <a:xfrm>
+              <a:off x="7677537" y="2529977"/>
+              <a:ext cx="316800" cy="316800"/>
+            </a:xfrm>
+            <a:prstGeom prst="rect">
+              <a:avLst/>
+            </a:prstGeom>
+            <a:noFill/>
+            <a:ln>
+              <a:solidFill>
+                <a:srgbClr val="F79645"/>
+              </a:solidFill>
+            </a:ln>
+          </p:spPr>
+          <p:style>
+            <a:lnRef idx="2">
+              <a:schemeClr val="accent1">
+                <a:shade val="50000"/>
+              </a:schemeClr>
+            </a:lnRef>
+            <a:fillRef idx="1">
+              <a:schemeClr val="accent1"/>
+            </a:fillRef>
+            <a:effectRef idx="0">
+              <a:schemeClr val="accent1"/>
+            </a:effectRef>
+            <a:fontRef idx="minor">
+              <a:schemeClr val="lt1"/>
+            </a:fontRef>
+          </p:style>
+          <p:txBody>
+            <a:bodyPr rtlCol="0" anchor="ctr"/>
+            <a:lstStyle/>
+            <a:p>
+              <a:pPr algn="ctr"/>
+              <a:endParaRPr lang="en-US"/>
+            </a:p>
+          </p:txBody>
+        </p:sp>
+        <p:sp>
+          <p:nvSpPr>
+            <p:cNvPr id="46" name="Oval 45"/>
+            <p:cNvSpPr>
+              <a:spLocks/>
+            </p:cNvSpPr>
+            <p:nvPr/>
+          </p:nvSpPr>
+          <p:spPr>
+            <a:xfrm>
+              <a:off x="7801737" y="2654177"/>
+              <a:ext cx="68400" cy="68400"/>
+            </a:xfrm>
+            <a:prstGeom prst="ellipse">
+              <a:avLst/>
+            </a:prstGeom>
             <a:solidFill>
               <a:srgbClr val="0070C0"/>
             </a:solidFill>
-            <a:prstDash val="dash"/>
-          </a:ln>
-        </p:spPr>
-        <p:style>
-          <a:lnRef idx="2">
-            <a:schemeClr val="accent1">
-              <a:shade val="50000"/>
-            </a:schemeClr>
-          </a:lnRef>
-          <a:fillRef idx="1">
-            <a:schemeClr val="accent1"/>
-          </a:fillRef>
-          <a:effectRef idx="0">
-            <a:schemeClr val="accent1"/>
-          </a:effectRef>
-          <a:fontRef idx="minor">
-            <a:schemeClr val="lt1"/>
-          </a:fontRef>
-        </p:style>
-        <p:txBody>
-          <a:bodyPr rtlCol="0" anchor="ctr"/>
-          <a:lstStyle/>
-          <a:p>
-            <a:pPr algn="ctr"/>
-            <a:endParaRPr lang="en-US"/>
-          </a:p>
-        </p:txBody>
-      </p:sp>
-      <p:sp>
-        <p:nvSpPr>
-          <p:cNvPr id="35" name="Rectangle 34"/>
-          <p:cNvSpPr>
-            <a:spLocks/>
-          </p:cNvSpPr>
-          <p:nvPr/>
-        </p:nvSpPr>
-        <p:spPr>
-          <a:xfrm>
-            <a:off x="7677537" y="2529977"/>
-            <a:ext cx="316800" cy="316800"/>
-          </a:xfrm>
-          <a:prstGeom prst="rect">
-            <a:avLst/>
-          </a:prstGeom>
-          <a:noFill/>
-          <a:ln>
+            <a:ln>
+              <a:solidFill>
+                <a:srgbClr val="0070C0"/>
+              </a:solidFill>
+            </a:ln>
+          </p:spPr>
+          <p:style>
+            <a:lnRef idx="2">
+              <a:schemeClr val="accent1">
+                <a:shade val="50000"/>
+              </a:schemeClr>
+            </a:lnRef>
+            <a:fillRef idx="1">
+              <a:schemeClr val="accent1"/>
+            </a:fillRef>
+            <a:effectRef idx="0">
+              <a:schemeClr val="accent1"/>
+            </a:effectRef>
+            <a:fontRef idx="minor">
+              <a:schemeClr val="lt1"/>
+            </a:fontRef>
+          </p:style>
+          <p:txBody>
+            <a:bodyPr rtlCol="0" anchor="ctr"/>
+            <a:lstStyle/>
+            <a:p>
+              <a:pPr algn="ctr"/>
+              <a:endParaRPr lang="en-US"/>
+            </a:p>
+          </p:txBody>
+        </p:sp>
+        <p:sp>
+          <p:nvSpPr>
+            <p:cNvPr id="47" name="Oval 46"/>
+            <p:cNvSpPr>
+              <a:spLocks/>
+            </p:cNvSpPr>
+            <p:nvPr/>
+          </p:nvSpPr>
+          <p:spPr>
+            <a:xfrm>
+              <a:off x="7697337" y="2545996"/>
+              <a:ext cx="277200" cy="284400"/>
+            </a:xfrm>
+            <a:prstGeom prst="ellipse">
+              <a:avLst/>
+            </a:prstGeom>
             <a:solidFill>
-              <a:srgbClr val="F79645"/>
+              <a:srgbClr val="0070C0">
+                <a:alpha val="30000"/>
+              </a:srgbClr>
             </a:solidFill>
-          </a:ln>
-        </p:spPr>
-        <p:style>
-          <a:lnRef idx="2">
-            <a:schemeClr val="accent1">
-              <a:shade val="50000"/>
-            </a:schemeClr>
-          </a:lnRef>
-          <a:fillRef idx="1">
-            <a:schemeClr val="accent1"/>
-          </a:fillRef>
-          <a:effectRef idx="0">
-            <a:schemeClr val="accent1"/>
-          </a:effectRef>
-          <a:fontRef idx="minor">
-            <a:schemeClr val="lt1"/>
-          </a:fontRef>
-        </p:style>
-        <p:txBody>
-          <a:bodyPr rtlCol="0" anchor="ctr"/>
-          <a:lstStyle/>
-          <a:p>
-            <a:pPr algn="ctr"/>
-            <a:endParaRPr lang="en-US"/>
-          </a:p>
-        </p:txBody>
-      </p:sp>
-      <p:sp>
-        <p:nvSpPr>
-          <p:cNvPr id="38" name="Oval 37"/>
-          <p:cNvSpPr>
-            <a:spLocks/>
-          </p:cNvSpPr>
-          <p:nvPr/>
-        </p:nvSpPr>
-        <p:spPr>
-          <a:xfrm>
-            <a:off x="7801737" y="2654177"/>
-            <a:ext cx="68400" cy="68400"/>
-          </a:xfrm>
-          <a:prstGeom prst="ellipse">
-            <a:avLst/>
-          </a:prstGeom>
-          <a:solidFill>
-            <a:srgbClr val="0070C0"/>
-          </a:solidFill>
-          <a:ln>
-            <a:solidFill>
-              <a:srgbClr val="0070C0"/>
-            </a:solidFill>
-          </a:ln>
-        </p:spPr>
-        <p:style>
-          <a:lnRef idx="2">
-            <a:schemeClr val="accent1">
-              <a:shade val="50000"/>
-            </a:schemeClr>
-          </a:lnRef>
-          <a:fillRef idx="1">
-            <a:schemeClr val="accent1"/>
-          </a:fillRef>
-          <a:effectRef idx="0">
-            <a:schemeClr val="accent1"/>
-          </a:effectRef>
-          <a:fontRef idx="minor">
-            <a:schemeClr val="lt1"/>
-          </a:fontRef>
-        </p:style>
-        <p:txBody>
-          <a:bodyPr rtlCol="0" anchor="ctr"/>
-          <a:lstStyle/>
-          <a:p>
-            <a:pPr algn="ctr"/>
-            <a:endParaRPr lang="en-US"/>
-          </a:p>
-        </p:txBody>
-      </p:sp>
-      <p:sp>
-        <p:nvSpPr>
-          <p:cNvPr id="40" name="Oval 39"/>
-          <p:cNvSpPr>
-            <a:spLocks/>
-          </p:cNvSpPr>
-          <p:nvPr/>
-        </p:nvSpPr>
-        <p:spPr>
-          <a:xfrm>
-            <a:off x="7697337" y="2545996"/>
-            <a:ext cx="277200" cy="284400"/>
-          </a:xfrm>
-          <a:prstGeom prst="ellipse">
-            <a:avLst/>
-          </a:prstGeom>
-          <a:solidFill>
-            <a:srgbClr val="0070C0">
-              <a:alpha val="30000"/>
-            </a:srgbClr>
-          </a:solidFill>
-          <a:ln w="9525">
-            <a:solidFill>
-              <a:srgbClr val="0070C0"/>
-            </a:solidFill>
-            <a:prstDash val="dash"/>
-          </a:ln>
-        </p:spPr>
-        <p:style>
-          <a:lnRef idx="2">
-            <a:schemeClr val="accent1">
-              <a:shade val="50000"/>
-            </a:schemeClr>
-          </a:lnRef>
-          <a:fillRef idx="1">
-            <a:schemeClr val="accent1"/>
-          </a:fillRef>
-          <a:effectRef idx="0">
-            <a:schemeClr val="accent1"/>
-          </a:effectRef>
-          <a:fontRef idx="minor">
-            <a:schemeClr val="lt1"/>
-          </a:fontRef>
-        </p:style>
-        <p:txBody>
-          <a:bodyPr rtlCol="0" anchor="ctr"/>
-          <a:lstStyle/>
-          <a:p>
-            <a:pPr algn="ctr"/>
-            <a:endParaRPr lang="en-US"/>
-          </a:p>
-        </p:txBody>
-      </p:sp>
+            <a:ln w="9525">
+              <a:solidFill>
+                <a:srgbClr val="0070C0"/>
+              </a:solidFill>
+              <a:prstDash val="sysDash"/>
+            </a:ln>
+          </p:spPr>
+          <p:style>
+            <a:lnRef idx="2">
+              <a:schemeClr val="accent1">
+                <a:shade val="50000"/>
+              </a:schemeClr>
+            </a:lnRef>
+            <a:fillRef idx="1">
+              <a:schemeClr val="accent1"/>
+            </a:fillRef>
+            <a:effectRef idx="0">
+              <a:schemeClr val="accent1"/>
+            </a:effectRef>
+            <a:fontRef idx="minor">
+              <a:schemeClr val="lt1"/>
+            </a:fontRef>
+          </p:style>
+          <p:txBody>
+            <a:bodyPr rtlCol="0" anchor="ctr"/>
+            <a:lstStyle/>
+            <a:p>
+              <a:pPr algn="ctr"/>
+              <a:endParaRPr lang="en-US"/>
+            </a:p>
+          </p:txBody>
+        </p:sp>
+      </p:grpSp>
     </p:spTree>
     <p:extLst>
       <p:ext uri="{BB962C8B-B14F-4D97-AF65-F5344CB8AC3E}">

</xml_diff>

<commit_message>
Updated UI for Match Height/Width
</commit_message>
<xml_diff>
--- a/doc/Icons-ResizeLab.pptx
+++ b/doc/Icons-ResizeLab.pptx
@@ -215,7 +215,7 @@
           <a:p>
             <a:fld id="{6699ACB9-486C-4D62-A3A7-AF98E13EFDA3}" type="datetimeFigureOut">
               <a:rPr lang="en-US" smtClean="0"/>
-              <a:t>3/20/2016</a:t>
+              <a:t>3/24/2016</a:t>
             </a:fld>
             <a:endParaRPr lang="en-US"/>
           </a:p>
@@ -917,7 +917,7 @@
             <a:fld id="{1D8BD707-D9CF-40AE-B4C6-C98DA3205C09}" type="datetimeFigureOut">
               <a:rPr lang="en-US" smtClean="0"/>
               <a:pPr/>
-              <a:t>3/20/2016</a:t>
+              <a:t>3/24/2016</a:t>
             </a:fld>
             <a:endParaRPr lang="en-US"/>
           </a:p>
@@ -1084,7 +1084,7 @@
             <a:fld id="{1D8BD707-D9CF-40AE-B4C6-C98DA3205C09}" type="datetimeFigureOut">
               <a:rPr lang="en-US" smtClean="0"/>
               <a:pPr/>
-              <a:t>3/20/2016</a:t>
+              <a:t>3/24/2016</a:t>
             </a:fld>
             <a:endParaRPr lang="en-US"/>
           </a:p>
@@ -1261,7 +1261,7 @@
             <a:fld id="{1D8BD707-D9CF-40AE-B4C6-C98DA3205C09}" type="datetimeFigureOut">
               <a:rPr lang="en-US" smtClean="0"/>
               <a:pPr/>
-              <a:t>3/20/2016</a:t>
+              <a:t>3/24/2016</a:t>
             </a:fld>
             <a:endParaRPr lang="en-US"/>
           </a:p>
@@ -1428,7 +1428,7 @@
             <a:fld id="{1D8BD707-D9CF-40AE-B4C6-C98DA3205C09}" type="datetimeFigureOut">
               <a:rPr lang="en-US" smtClean="0"/>
               <a:pPr/>
-              <a:t>3/20/2016</a:t>
+              <a:t>3/24/2016</a:t>
             </a:fld>
             <a:endParaRPr lang="en-US"/>
           </a:p>
@@ -1671,7 +1671,7 @@
             <a:fld id="{1D8BD707-D9CF-40AE-B4C6-C98DA3205C09}" type="datetimeFigureOut">
               <a:rPr lang="en-US" smtClean="0"/>
               <a:pPr/>
-              <a:t>3/20/2016</a:t>
+              <a:t>3/24/2016</a:t>
             </a:fld>
             <a:endParaRPr lang="en-US"/>
           </a:p>
@@ -1956,7 +1956,7 @@
             <a:fld id="{1D8BD707-D9CF-40AE-B4C6-C98DA3205C09}" type="datetimeFigureOut">
               <a:rPr lang="en-US" smtClean="0"/>
               <a:pPr/>
-              <a:t>3/20/2016</a:t>
+              <a:t>3/24/2016</a:t>
             </a:fld>
             <a:endParaRPr lang="en-US"/>
           </a:p>
@@ -2375,7 +2375,7 @@
             <a:fld id="{1D8BD707-D9CF-40AE-B4C6-C98DA3205C09}" type="datetimeFigureOut">
               <a:rPr lang="en-US" smtClean="0"/>
               <a:pPr/>
-              <a:t>3/20/2016</a:t>
+              <a:t>3/24/2016</a:t>
             </a:fld>
             <a:endParaRPr lang="en-US"/>
           </a:p>
@@ -2490,7 +2490,7 @@
             <a:fld id="{1D8BD707-D9CF-40AE-B4C6-C98DA3205C09}" type="datetimeFigureOut">
               <a:rPr lang="en-US" smtClean="0"/>
               <a:pPr/>
-              <a:t>3/20/2016</a:t>
+              <a:t>3/24/2016</a:t>
             </a:fld>
             <a:endParaRPr lang="en-US"/>
           </a:p>
@@ -2582,7 +2582,7 @@
             <a:fld id="{1D8BD707-D9CF-40AE-B4C6-C98DA3205C09}" type="datetimeFigureOut">
               <a:rPr lang="en-US" smtClean="0"/>
               <a:pPr/>
-              <a:t>3/20/2016</a:t>
+              <a:t>3/24/2016</a:t>
             </a:fld>
             <a:endParaRPr lang="en-US"/>
           </a:p>
@@ -2856,7 +2856,7 @@
             <a:fld id="{1D8BD707-D9CF-40AE-B4C6-C98DA3205C09}" type="datetimeFigureOut">
               <a:rPr lang="en-US" smtClean="0"/>
               <a:pPr/>
-              <a:t>3/20/2016</a:t>
+              <a:t>3/24/2016</a:t>
             </a:fld>
             <a:endParaRPr lang="en-US"/>
           </a:p>
@@ -3106,7 +3106,7 @@
             <a:fld id="{1D8BD707-D9CF-40AE-B4C6-C98DA3205C09}" type="datetimeFigureOut">
               <a:rPr lang="en-US" smtClean="0"/>
               <a:pPr/>
-              <a:t>3/20/2016</a:t>
+              <a:t>3/24/2016</a:t>
             </a:fld>
             <a:endParaRPr lang="en-US"/>
           </a:p>
@@ -3321,7 +3321,7 @@
             <a:fld id="{1D8BD707-D9CF-40AE-B4C6-C98DA3205C09}" type="datetimeFigureOut">
               <a:rPr lang="en-US" smtClean="0"/>
               <a:pPr/>
-              <a:t>3/20/2016</a:t>
+              <a:t>3/24/2016</a:t>
             </a:fld>
             <a:endParaRPr lang="en-US"/>
           </a:p>
@@ -17916,472 +17916,6 @@
       </p:sp>
       <p:grpSp>
         <p:nvGrpSpPr>
-          <p:cNvPr id="11" name="Group 10"/>
-          <p:cNvGrpSpPr/>
-          <p:nvPr/>
-        </p:nvGrpSpPr>
-        <p:grpSpPr>
-          <a:xfrm>
-            <a:off x="1748325" y="2477117"/>
-            <a:ext cx="763108" cy="616291"/>
-            <a:chOff x="1590542" y="2477117"/>
-            <a:chExt cx="763108" cy="616291"/>
-          </a:xfrm>
-        </p:grpSpPr>
-        <p:sp>
-          <p:nvSpPr>
-            <p:cNvPr id="18" name="Rectangle 17"/>
-            <p:cNvSpPr>
-              <a:spLocks/>
-            </p:cNvSpPr>
-            <p:nvPr/>
-          </p:nvSpPr>
-          <p:spPr>
-            <a:xfrm flipV="1">
-              <a:off x="1737360" y="2477117"/>
-              <a:ext cx="616290" cy="434647"/>
-            </a:xfrm>
-            <a:prstGeom prst="rect">
-              <a:avLst/>
-            </a:prstGeom>
-            <a:solidFill>
-              <a:srgbClr val="0070C0"/>
-            </a:solidFill>
-            <a:ln w="19050">
-              <a:solidFill>
-                <a:srgbClr val="0070C0"/>
-              </a:solidFill>
-              <a:prstDash val="solid"/>
-            </a:ln>
-          </p:spPr>
-          <p:style>
-            <a:lnRef idx="2">
-              <a:schemeClr val="accent1">
-                <a:shade val="50000"/>
-              </a:schemeClr>
-            </a:lnRef>
-            <a:fillRef idx="1">
-              <a:schemeClr val="accent1"/>
-            </a:fillRef>
-            <a:effectRef idx="0">
-              <a:schemeClr val="accent1"/>
-            </a:effectRef>
-            <a:fontRef idx="minor">
-              <a:schemeClr val="lt1"/>
-            </a:fontRef>
-          </p:style>
-          <p:txBody>
-            <a:bodyPr rtlCol="0" anchor="ctr"/>
-            <a:lstStyle/>
-            <a:p>
-              <a:pPr algn="ctr"/>
-              <a:endParaRPr lang="en-US" sz="1000" b="1" dirty="0"/>
-            </a:p>
-          </p:txBody>
-        </p:sp>
-        <p:sp>
-          <p:nvSpPr>
-            <p:cNvPr id="20" name="Rectangle 19"/>
-            <p:cNvSpPr>
-              <a:spLocks/>
-            </p:cNvSpPr>
-            <p:nvPr/>
-          </p:nvSpPr>
-          <p:spPr>
-            <a:xfrm flipV="1">
-              <a:off x="1737360" y="2785262"/>
-              <a:ext cx="616290" cy="308146"/>
-            </a:xfrm>
-            <a:prstGeom prst="rect">
-              <a:avLst/>
-            </a:prstGeom>
-            <a:solidFill>
-              <a:schemeClr val="bg1"/>
-            </a:solidFill>
-            <a:ln w="19050">
-              <a:solidFill>
-                <a:srgbClr val="0070C0"/>
-              </a:solidFill>
-            </a:ln>
-          </p:spPr>
-          <p:style>
-            <a:lnRef idx="2">
-              <a:schemeClr val="accent1">
-                <a:shade val="50000"/>
-              </a:schemeClr>
-            </a:lnRef>
-            <a:fillRef idx="1">
-              <a:schemeClr val="accent1"/>
-            </a:fillRef>
-            <a:effectRef idx="0">
-              <a:schemeClr val="accent1"/>
-            </a:effectRef>
-            <a:fontRef idx="minor">
-              <a:schemeClr val="lt1"/>
-            </a:fontRef>
-          </p:style>
-          <p:txBody>
-            <a:bodyPr rtlCol="0" anchor="ctr"/>
-            <a:lstStyle/>
-            <a:p>
-              <a:pPr algn="ctr"/>
-              <a:endParaRPr lang="en-US" dirty="0"/>
-            </a:p>
-          </p:txBody>
-        </p:sp>
-        <p:cxnSp>
-          <p:nvCxnSpPr>
-            <p:cNvPr id="21" name="Straight Connector 20"/>
-            <p:cNvCxnSpPr>
-              <a:cxnSpLocks/>
-            </p:cNvCxnSpPr>
-            <p:nvPr/>
-          </p:nvCxnSpPr>
-          <p:spPr>
-            <a:xfrm>
-              <a:off x="1737360" y="3093408"/>
-              <a:ext cx="616290" cy="0"/>
-            </a:xfrm>
-            <a:prstGeom prst="line">
-              <a:avLst/>
-            </a:prstGeom>
-            <a:ln w="38100" cmpd="sng">
-              <a:solidFill>
-                <a:srgbClr val="FF6600"/>
-              </a:solidFill>
-              <a:prstDash val="solid"/>
-              <a:headEnd type="triangle" w="med" len="med"/>
-              <a:tailEnd type="triangle" w="med" len="med"/>
-            </a:ln>
-          </p:spPr>
-          <p:style>
-            <a:lnRef idx="1">
-              <a:schemeClr val="accent1"/>
-            </a:lnRef>
-            <a:fillRef idx="0">
-              <a:schemeClr val="accent1"/>
-            </a:fillRef>
-            <a:effectRef idx="0">
-              <a:schemeClr val="accent1"/>
-            </a:effectRef>
-            <a:fontRef idx="minor">
-              <a:schemeClr val="tx1"/>
-            </a:fontRef>
-          </p:style>
-        </p:cxnSp>
-        <p:cxnSp>
-          <p:nvCxnSpPr>
-            <p:cNvPr id="22" name="Straight Arrow Connector 21"/>
-            <p:cNvCxnSpPr/>
-            <p:nvPr/>
-          </p:nvCxnSpPr>
-          <p:spPr>
-            <a:xfrm flipV="1">
-              <a:off x="2045505" y="2537922"/>
-              <a:ext cx="0" cy="213425"/>
-            </a:xfrm>
-            <a:prstGeom prst="straightConnector1">
-              <a:avLst/>
-            </a:prstGeom>
-            <a:ln w="38100">
-              <a:solidFill>
-                <a:schemeClr val="bg1"/>
-              </a:solidFill>
-              <a:headEnd type="none" w="med" len="med"/>
-              <a:tailEnd type="triangle" w="med" len="med"/>
-            </a:ln>
-          </p:spPr>
-          <p:style>
-            <a:lnRef idx="1">
-              <a:schemeClr val="accent1"/>
-            </a:lnRef>
-            <a:fillRef idx="0">
-              <a:schemeClr val="accent1"/>
-            </a:fillRef>
-            <a:effectRef idx="0">
-              <a:schemeClr val="accent1"/>
-            </a:effectRef>
-            <a:fontRef idx="minor">
-              <a:schemeClr val="tx1"/>
-            </a:fontRef>
-          </p:style>
-        </p:cxnSp>
-        <p:cxnSp>
-          <p:nvCxnSpPr>
-            <p:cNvPr id="30" name="Straight Connector 29"/>
-            <p:cNvCxnSpPr>
-              <a:cxnSpLocks/>
-            </p:cNvCxnSpPr>
-            <p:nvPr/>
-          </p:nvCxnSpPr>
-          <p:spPr>
-            <a:xfrm rot="16200000">
-              <a:off x="1282397" y="2785262"/>
-              <a:ext cx="616290" cy="0"/>
-            </a:xfrm>
-            <a:prstGeom prst="line">
-              <a:avLst/>
-            </a:prstGeom>
-            <a:ln w="38100" cmpd="sng">
-              <a:solidFill>
-                <a:srgbClr val="FF6600"/>
-              </a:solidFill>
-              <a:prstDash val="solid"/>
-              <a:headEnd type="triangle" w="med" len="med"/>
-              <a:tailEnd type="triangle" w="med" len="med"/>
-            </a:ln>
-          </p:spPr>
-          <p:style>
-            <a:lnRef idx="1">
-              <a:schemeClr val="accent1"/>
-            </a:lnRef>
-            <a:fillRef idx="0">
-              <a:schemeClr val="accent1"/>
-            </a:fillRef>
-            <a:effectRef idx="0">
-              <a:schemeClr val="accent1"/>
-            </a:effectRef>
-            <a:fontRef idx="minor">
-              <a:schemeClr val="tx1"/>
-            </a:fontRef>
-          </p:style>
-        </p:cxnSp>
-      </p:grpSp>
-      <p:grpSp>
-        <p:nvGrpSpPr>
-          <p:cNvPr id="32" name="Group 31"/>
-          <p:cNvGrpSpPr/>
-          <p:nvPr/>
-        </p:nvGrpSpPr>
-        <p:grpSpPr>
-          <a:xfrm rot="5400000">
-            <a:off x="4090647" y="2548448"/>
-            <a:ext cx="640722" cy="588704"/>
-            <a:chOff x="1712929" y="2528391"/>
-            <a:chExt cx="640722" cy="588704"/>
-          </a:xfrm>
-        </p:grpSpPr>
-        <p:sp>
-          <p:nvSpPr>
-            <p:cNvPr id="33" name="Rectangle 32"/>
-            <p:cNvSpPr>
-              <a:spLocks/>
-            </p:cNvSpPr>
-            <p:nvPr/>
-          </p:nvSpPr>
-          <p:spPr>
-            <a:xfrm flipV="1">
-              <a:off x="1804325" y="2537919"/>
-              <a:ext cx="549326" cy="373843"/>
-            </a:xfrm>
-            <a:prstGeom prst="rect">
-              <a:avLst/>
-            </a:prstGeom>
-            <a:solidFill>
-              <a:srgbClr val="0070C0"/>
-            </a:solidFill>
-            <a:ln w="19050">
-              <a:solidFill>
-                <a:srgbClr val="0070C0"/>
-              </a:solidFill>
-              <a:prstDash val="solid"/>
-            </a:ln>
-          </p:spPr>
-          <p:style>
-            <a:lnRef idx="2">
-              <a:schemeClr val="accent1">
-                <a:shade val="50000"/>
-              </a:schemeClr>
-            </a:lnRef>
-            <a:fillRef idx="1">
-              <a:schemeClr val="accent1"/>
-            </a:fillRef>
-            <a:effectRef idx="0">
-              <a:schemeClr val="accent1"/>
-            </a:effectRef>
-            <a:fontRef idx="minor">
-              <a:schemeClr val="lt1"/>
-            </a:fontRef>
-          </p:style>
-          <p:txBody>
-            <a:bodyPr rtlCol="0" anchor="ctr"/>
-            <a:lstStyle/>
-            <a:p>
-              <a:pPr algn="ctr"/>
-              <a:endParaRPr lang="en-US" sz="1000" b="1" dirty="0"/>
-            </a:p>
-          </p:txBody>
-        </p:sp>
-        <p:sp>
-          <p:nvSpPr>
-            <p:cNvPr id="34" name="Rectangle 33"/>
-            <p:cNvSpPr>
-              <a:spLocks/>
-            </p:cNvSpPr>
-            <p:nvPr/>
-          </p:nvSpPr>
-          <p:spPr>
-            <a:xfrm flipV="1">
-              <a:off x="1804322" y="2785262"/>
-              <a:ext cx="549328" cy="308146"/>
-            </a:xfrm>
-            <a:prstGeom prst="rect">
-              <a:avLst/>
-            </a:prstGeom>
-            <a:solidFill>
-              <a:schemeClr val="bg1"/>
-            </a:solidFill>
-            <a:ln w="19050">
-              <a:solidFill>
-                <a:srgbClr val="0070C0"/>
-              </a:solidFill>
-            </a:ln>
-          </p:spPr>
-          <p:style>
-            <a:lnRef idx="2">
-              <a:schemeClr val="accent1">
-                <a:shade val="50000"/>
-              </a:schemeClr>
-            </a:lnRef>
-            <a:fillRef idx="1">
-              <a:schemeClr val="accent1"/>
-            </a:fillRef>
-            <a:effectRef idx="0">
-              <a:schemeClr val="accent1"/>
-            </a:effectRef>
-            <a:fontRef idx="minor">
-              <a:schemeClr val="lt1"/>
-            </a:fontRef>
-          </p:style>
-          <p:txBody>
-            <a:bodyPr rtlCol="0" anchor="ctr"/>
-            <a:lstStyle/>
-            <a:p>
-              <a:pPr algn="ctr"/>
-              <a:endParaRPr lang="en-US" dirty="0"/>
-            </a:p>
-          </p:txBody>
-        </p:sp>
-        <p:cxnSp>
-          <p:nvCxnSpPr>
-            <p:cNvPr id="38" name="Straight Connector 37"/>
-            <p:cNvCxnSpPr>
-              <a:cxnSpLocks/>
-            </p:cNvCxnSpPr>
-            <p:nvPr/>
-          </p:nvCxnSpPr>
-          <p:spPr>
-            <a:xfrm rot="16200000">
-              <a:off x="2078986" y="2818744"/>
-              <a:ext cx="0" cy="549328"/>
-            </a:xfrm>
-            <a:prstGeom prst="line">
-              <a:avLst/>
-            </a:prstGeom>
-            <a:ln w="38100" cmpd="sng">
-              <a:solidFill>
-                <a:srgbClr val="FF6600"/>
-              </a:solidFill>
-              <a:prstDash val="solid"/>
-              <a:headEnd type="triangle" w="med" len="med"/>
-              <a:tailEnd type="triangle" w="med" len="med"/>
-            </a:ln>
-          </p:spPr>
-          <p:style>
-            <a:lnRef idx="1">
-              <a:schemeClr val="accent1"/>
-            </a:lnRef>
-            <a:fillRef idx="0">
-              <a:schemeClr val="accent1"/>
-            </a:fillRef>
-            <a:effectRef idx="0">
-              <a:schemeClr val="accent1"/>
-            </a:effectRef>
-            <a:fontRef idx="minor">
-              <a:schemeClr val="tx1"/>
-            </a:fontRef>
-          </p:style>
-        </p:cxnSp>
-        <p:cxnSp>
-          <p:nvCxnSpPr>
-            <p:cNvPr id="39" name="Straight Arrow Connector 38"/>
-            <p:cNvCxnSpPr/>
-            <p:nvPr/>
-          </p:nvCxnSpPr>
-          <p:spPr>
-            <a:xfrm flipV="1">
-              <a:off x="2075989" y="2537922"/>
-              <a:ext cx="0" cy="213425"/>
-            </a:xfrm>
-            <a:prstGeom prst="straightConnector1">
-              <a:avLst/>
-            </a:prstGeom>
-            <a:ln w="38100">
-              <a:solidFill>
-                <a:schemeClr val="bg1"/>
-              </a:solidFill>
-              <a:headEnd type="none" w="med" len="med"/>
-              <a:tailEnd type="triangle" w="med" len="med"/>
-            </a:ln>
-          </p:spPr>
-          <p:style>
-            <a:lnRef idx="1">
-              <a:schemeClr val="accent1"/>
-            </a:lnRef>
-            <a:fillRef idx="0">
-              <a:schemeClr val="accent1"/>
-            </a:fillRef>
-            <a:effectRef idx="0">
-              <a:schemeClr val="accent1"/>
-            </a:effectRef>
-            <a:fontRef idx="minor">
-              <a:schemeClr val="tx1"/>
-            </a:fontRef>
-          </p:style>
-        </p:cxnSp>
-        <p:cxnSp>
-          <p:nvCxnSpPr>
-            <p:cNvPr id="40" name="Straight Connector 39"/>
-            <p:cNvCxnSpPr>
-              <a:cxnSpLocks/>
-            </p:cNvCxnSpPr>
-            <p:nvPr/>
-          </p:nvCxnSpPr>
-          <p:spPr>
-            <a:xfrm rot="16200000">
-              <a:off x="1418577" y="2822743"/>
-              <a:ext cx="588704" cy="0"/>
-            </a:xfrm>
-            <a:prstGeom prst="line">
-              <a:avLst/>
-            </a:prstGeom>
-            <a:ln w="38100" cmpd="sng">
-              <a:solidFill>
-                <a:srgbClr val="FF6600"/>
-              </a:solidFill>
-              <a:prstDash val="solid"/>
-              <a:headEnd type="triangle" w="med" len="med"/>
-              <a:tailEnd type="triangle" w="med" len="med"/>
-            </a:ln>
-          </p:spPr>
-          <p:style>
-            <a:lnRef idx="1">
-              <a:schemeClr val="accent1"/>
-            </a:lnRef>
-            <a:fillRef idx="0">
-              <a:schemeClr val="accent1"/>
-            </a:fillRef>
-            <a:effectRef idx="0">
-              <a:schemeClr val="accent1"/>
-            </a:effectRef>
-            <a:fontRef idx="minor">
-              <a:schemeClr val="tx1"/>
-            </a:fontRef>
-          </p:style>
-        </p:cxnSp>
-      </p:grpSp>
-      <p:grpSp>
-        <p:nvGrpSpPr>
           <p:cNvPr id="6" name="Group 5"/>
           <p:cNvGrpSpPr/>
           <p:nvPr/>
@@ -18933,6 +18467,1771 @@
                 <a:schemeClr val="tx1"/>
               </a:solidFill>
             </a:endParaRPr>
+          </a:p>
+        </p:txBody>
+      </p:sp>
+      <p:grpSp>
+        <p:nvGrpSpPr>
+          <p:cNvPr id="8" name="Group 7"/>
+          <p:cNvGrpSpPr>
+            <a:grpSpLocks noChangeAspect="1"/>
+          </p:cNvGrpSpPr>
+          <p:nvPr/>
+        </p:nvGrpSpPr>
+        <p:grpSpPr>
+          <a:xfrm>
+            <a:off x="2056512" y="2490835"/>
+            <a:ext cx="548545" cy="550800"/>
+            <a:chOff x="2056512" y="2490835"/>
+            <a:chExt cx="548545" cy="550800"/>
+          </a:xfrm>
+        </p:grpSpPr>
+        <p:grpSp>
+          <p:nvGrpSpPr>
+            <p:cNvPr id="11" name="Group 10"/>
+            <p:cNvGrpSpPr>
+              <a:grpSpLocks noChangeAspect="1"/>
+            </p:cNvGrpSpPr>
+            <p:nvPr/>
+          </p:nvGrpSpPr>
+          <p:grpSpPr>
+            <a:xfrm>
+              <a:off x="2124948" y="2559552"/>
+              <a:ext cx="411673" cy="413366"/>
+              <a:chOff x="1590542" y="2477117"/>
+              <a:chExt cx="763108" cy="616291"/>
+            </a:xfrm>
+          </p:grpSpPr>
+          <p:sp>
+            <p:nvSpPr>
+              <p:cNvPr id="18" name="Rectangle 17"/>
+              <p:cNvSpPr>
+                <a:spLocks/>
+              </p:cNvSpPr>
+              <p:nvPr/>
+            </p:nvSpPr>
+            <p:spPr>
+              <a:xfrm flipV="1">
+                <a:off x="1737360" y="2477117"/>
+                <a:ext cx="616290" cy="434647"/>
+              </a:xfrm>
+              <a:prstGeom prst="rect">
+                <a:avLst/>
+              </a:prstGeom>
+              <a:solidFill>
+                <a:srgbClr val="0070C0"/>
+              </a:solidFill>
+              <a:ln w="19050">
+                <a:solidFill>
+                  <a:srgbClr val="0070C0"/>
+                </a:solidFill>
+                <a:prstDash val="solid"/>
+              </a:ln>
+            </p:spPr>
+            <p:style>
+              <a:lnRef idx="2">
+                <a:schemeClr val="accent1">
+                  <a:shade val="50000"/>
+                </a:schemeClr>
+              </a:lnRef>
+              <a:fillRef idx="1">
+                <a:schemeClr val="accent1"/>
+              </a:fillRef>
+              <a:effectRef idx="0">
+                <a:schemeClr val="accent1"/>
+              </a:effectRef>
+              <a:fontRef idx="minor">
+                <a:schemeClr val="lt1"/>
+              </a:fontRef>
+            </p:style>
+            <p:txBody>
+              <a:bodyPr rtlCol="0" anchor="ctr"/>
+              <a:lstStyle/>
+              <a:p>
+                <a:pPr algn="ctr"/>
+                <a:endParaRPr lang="en-US" sz="1000" b="1" dirty="0"/>
+              </a:p>
+            </p:txBody>
+          </p:sp>
+          <p:sp>
+            <p:nvSpPr>
+              <p:cNvPr id="20" name="Rectangle 19"/>
+              <p:cNvSpPr>
+                <a:spLocks/>
+              </p:cNvSpPr>
+              <p:nvPr/>
+            </p:nvSpPr>
+            <p:spPr>
+              <a:xfrm flipV="1">
+                <a:off x="1737360" y="2785262"/>
+                <a:ext cx="616290" cy="308146"/>
+              </a:xfrm>
+              <a:prstGeom prst="rect">
+                <a:avLst/>
+              </a:prstGeom>
+              <a:solidFill>
+                <a:schemeClr val="bg1"/>
+              </a:solidFill>
+              <a:ln w="19050">
+                <a:solidFill>
+                  <a:srgbClr val="0070C0"/>
+                </a:solidFill>
+              </a:ln>
+            </p:spPr>
+            <p:style>
+              <a:lnRef idx="2">
+                <a:schemeClr val="accent1">
+                  <a:shade val="50000"/>
+                </a:schemeClr>
+              </a:lnRef>
+              <a:fillRef idx="1">
+                <a:schemeClr val="accent1"/>
+              </a:fillRef>
+              <a:effectRef idx="0">
+                <a:schemeClr val="accent1"/>
+              </a:effectRef>
+              <a:fontRef idx="minor">
+                <a:schemeClr val="lt1"/>
+              </a:fontRef>
+            </p:style>
+            <p:txBody>
+              <a:bodyPr rtlCol="0" anchor="ctr"/>
+              <a:lstStyle/>
+              <a:p>
+                <a:pPr algn="ctr"/>
+                <a:endParaRPr lang="en-US" dirty="0"/>
+              </a:p>
+            </p:txBody>
+          </p:sp>
+          <p:cxnSp>
+            <p:nvCxnSpPr>
+              <p:cNvPr id="21" name="Straight Connector 20"/>
+              <p:cNvCxnSpPr>
+                <a:cxnSpLocks/>
+              </p:cNvCxnSpPr>
+              <p:nvPr/>
+            </p:nvCxnSpPr>
+            <p:spPr>
+              <a:xfrm>
+                <a:off x="1737360" y="3093408"/>
+                <a:ext cx="616290" cy="0"/>
+              </a:xfrm>
+              <a:prstGeom prst="line">
+                <a:avLst/>
+              </a:prstGeom>
+              <a:ln w="38100" cmpd="sng">
+                <a:solidFill>
+                  <a:srgbClr val="FF6600"/>
+                </a:solidFill>
+                <a:prstDash val="solid"/>
+                <a:headEnd type="triangle" w="med" len="med"/>
+                <a:tailEnd type="triangle" w="med" len="med"/>
+              </a:ln>
+            </p:spPr>
+            <p:style>
+              <a:lnRef idx="1">
+                <a:schemeClr val="accent1"/>
+              </a:lnRef>
+              <a:fillRef idx="0">
+                <a:schemeClr val="accent1"/>
+              </a:fillRef>
+              <a:effectRef idx="0">
+                <a:schemeClr val="accent1"/>
+              </a:effectRef>
+              <a:fontRef idx="minor">
+                <a:schemeClr val="tx1"/>
+              </a:fontRef>
+            </p:style>
+          </p:cxnSp>
+          <p:cxnSp>
+            <p:nvCxnSpPr>
+              <p:cNvPr id="22" name="Straight Arrow Connector 21"/>
+              <p:cNvCxnSpPr/>
+              <p:nvPr/>
+            </p:nvCxnSpPr>
+            <p:spPr>
+              <a:xfrm flipV="1">
+                <a:off x="2045505" y="2537922"/>
+                <a:ext cx="0" cy="213425"/>
+              </a:xfrm>
+              <a:prstGeom prst="straightConnector1">
+                <a:avLst/>
+              </a:prstGeom>
+              <a:ln w="38100">
+                <a:solidFill>
+                  <a:schemeClr val="bg1"/>
+                </a:solidFill>
+                <a:headEnd type="none" w="med" len="med"/>
+                <a:tailEnd type="triangle" w="med" len="med"/>
+              </a:ln>
+            </p:spPr>
+            <p:style>
+              <a:lnRef idx="1">
+                <a:schemeClr val="accent1"/>
+              </a:lnRef>
+              <a:fillRef idx="0">
+                <a:schemeClr val="accent1"/>
+              </a:fillRef>
+              <a:effectRef idx="0">
+                <a:schemeClr val="accent1"/>
+              </a:effectRef>
+              <a:fontRef idx="minor">
+                <a:schemeClr val="tx1"/>
+              </a:fontRef>
+            </p:style>
+          </p:cxnSp>
+          <p:cxnSp>
+            <p:nvCxnSpPr>
+              <p:cNvPr id="30" name="Straight Connector 29"/>
+              <p:cNvCxnSpPr>
+                <a:cxnSpLocks/>
+              </p:cNvCxnSpPr>
+              <p:nvPr/>
+            </p:nvCxnSpPr>
+            <p:spPr>
+              <a:xfrm rot="16200000">
+                <a:off x="1282397" y="2785262"/>
+                <a:ext cx="616290" cy="0"/>
+              </a:xfrm>
+              <a:prstGeom prst="line">
+                <a:avLst/>
+              </a:prstGeom>
+              <a:ln w="38100" cmpd="sng">
+                <a:solidFill>
+                  <a:srgbClr val="FF6600"/>
+                </a:solidFill>
+                <a:prstDash val="solid"/>
+                <a:headEnd type="triangle" w="med" len="med"/>
+                <a:tailEnd type="triangle" w="med" len="med"/>
+              </a:ln>
+            </p:spPr>
+            <p:style>
+              <a:lnRef idx="1">
+                <a:schemeClr val="accent1"/>
+              </a:lnRef>
+              <a:fillRef idx="0">
+                <a:schemeClr val="accent1"/>
+              </a:fillRef>
+              <a:effectRef idx="0">
+                <a:schemeClr val="accent1"/>
+              </a:effectRef>
+              <a:fontRef idx="minor">
+                <a:schemeClr val="tx1"/>
+              </a:fontRef>
+            </p:style>
+          </p:cxnSp>
+        </p:grpSp>
+        <p:sp>
+          <p:nvSpPr>
+            <p:cNvPr id="50" name="Rectangle 49"/>
+            <p:cNvSpPr>
+              <a:spLocks noChangeAspect="1"/>
+            </p:cNvSpPr>
+            <p:nvPr/>
+          </p:nvSpPr>
+          <p:spPr>
+            <a:xfrm>
+              <a:off x="2056512" y="2490835"/>
+              <a:ext cx="548545" cy="550800"/>
+            </a:xfrm>
+            <a:prstGeom prst="rect">
+              <a:avLst/>
+            </a:prstGeom>
+            <a:noFill/>
+            <a:ln w="9525">
+              <a:noFill/>
+            </a:ln>
+          </p:spPr>
+          <p:style>
+            <a:lnRef idx="2">
+              <a:schemeClr val="accent1">
+                <a:shade val="50000"/>
+              </a:schemeClr>
+            </a:lnRef>
+            <a:fillRef idx="1">
+              <a:schemeClr val="accent1"/>
+            </a:fillRef>
+            <a:effectRef idx="0">
+              <a:schemeClr val="accent1"/>
+            </a:effectRef>
+            <a:fontRef idx="minor">
+              <a:schemeClr val="lt1"/>
+            </a:fontRef>
+          </p:style>
+          <p:txBody>
+            <a:bodyPr rtlCol="0" anchor="ctr"/>
+            <a:lstStyle/>
+            <a:p>
+              <a:pPr algn="ctr"/>
+              <a:endParaRPr lang="en-US"/>
+            </a:p>
+          </p:txBody>
+        </p:sp>
+      </p:grpSp>
+      <p:grpSp>
+        <p:nvGrpSpPr>
+          <p:cNvPr id="14" name="Group 13"/>
+          <p:cNvGrpSpPr/>
+          <p:nvPr/>
+        </p:nvGrpSpPr>
+        <p:grpSpPr>
+          <a:xfrm>
+            <a:off x="4356114" y="2494820"/>
+            <a:ext cx="548545" cy="550800"/>
+            <a:chOff x="4356114" y="2494820"/>
+            <a:chExt cx="548545" cy="550800"/>
+          </a:xfrm>
+        </p:grpSpPr>
+        <p:grpSp>
+          <p:nvGrpSpPr>
+            <p:cNvPr id="32" name="Group 31"/>
+            <p:cNvGrpSpPr>
+              <a:grpSpLocks/>
+            </p:cNvGrpSpPr>
+            <p:nvPr/>
+          </p:nvGrpSpPr>
+          <p:grpSpPr>
+            <a:xfrm rot="5400000">
+              <a:off x="4426986" y="2561420"/>
+              <a:ext cx="410400" cy="414000"/>
+              <a:chOff x="1712929" y="2528392"/>
+              <a:chExt cx="640722" cy="588704"/>
+            </a:xfrm>
+          </p:grpSpPr>
+          <p:sp>
+            <p:nvSpPr>
+              <p:cNvPr id="33" name="Rectangle 32"/>
+              <p:cNvSpPr>
+                <a:spLocks/>
+              </p:cNvSpPr>
+              <p:nvPr/>
+            </p:nvSpPr>
+            <p:spPr>
+              <a:xfrm flipV="1">
+                <a:off x="1804325" y="2537920"/>
+                <a:ext cx="549326" cy="373843"/>
+              </a:xfrm>
+              <a:prstGeom prst="rect">
+                <a:avLst/>
+              </a:prstGeom>
+              <a:solidFill>
+                <a:srgbClr val="0070C0"/>
+              </a:solidFill>
+              <a:ln w="19050">
+                <a:solidFill>
+                  <a:srgbClr val="0070C0"/>
+                </a:solidFill>
+                <a:prstDash val="solid"/>
+              </a:ln>
+            </p:spPr>
+            <p:style>
+              <a:lnRef idx="2">
+                <a:schemeClr val="accent1">
+                  <a:shade val="50000"/>
+                </a:schemeClr>
+              </a:lnRef>
+              <a:fillRef idx="1">
+                <a:schemeClr val="accent1"/>
+              </a:fillRef>
+              <a:effectRef idx="0">
+                <a:schemeClr val="accent1"/>
+              </a:effectRef>
+              <a:fontRef idx="minor">
+                <a:schemeClr val="lt1"/>
+              </a:fontRef>
+            </p:style>
+            <p:txBody>
+              <a:bodyPr rtlCol="0" anchor="ctr"/>
+              <a:lstStyle/>
+              <a:p>
+                <a:pPr algn="ctr"/>
+                <a:endParaRPr lang="en-US" sz="1000" b="1" dirty="0"/>
+              </a:p>
+            </p:txBody>
+          </p:sp>
+          <p:sp>
+            <p:nvSpPr>
+              <p:cNvPr id="34" name="Rectangle 33"/>
+              <p:cNvSpPr>
+                <a:spLocks/>
+              </p:cNvSpPr>
+              <p:nvPr/>
+            </p:nvSpPr>
+            <p:spPr>
+              <a:xfrm flipV="1">
+                <a:off x="1804322" y="2785262"/>
+                <a:ext cx="549328" cy="308146"/>
+              </a:xfrm>
+              <a:prstGeom prst="rect">
+                <a:avLst/>
+              </a:prstGeom>
+              <a:solidFill>
+                <a:schemeClr val="bg1"/>
+              </a:solidFill>
+              <a:ln w="19050">
+                <a:solidFill>
+                  <a:srgbClr val="0070C0"/>
+                </a:solidFill>
+              </a:ln>
+            </p:spPr>
+            <p:style>
+              <a:lnRef idx="2">
+                <a:schemeClr val="accent1">
+                  <a:shade val="50000"/>
+                </a:schemeClr>
+              </a:lnRef>
+              <a:fillRef idx="1">
+                <a:schemeClr val="accent1"/>
+              </a:fillRef>
+              <a:effectRef idx="0">
+                <a:schemeClr val="accent1"/>
+              </a:effectRef>
+              <a:fontRef idx="minor">
+                <a:schemeClr val="lt1"/>
+              </a:fontRef>
+            </p:style>
+            <p:txBody>
+              <a:bodyPr rtlCol="0" anchor="ctr"/>
+              <a:lstStyle/>
+              <a:p>
+                <a:pPr algn="ctr"/>
+                <a:endParaRPr lang="en-US" dirty="0"/>
+              </a:p>
+            </p:txBody>
+          </p:sp>
+          <p:cxnSp>
+            <p:nvCxnSpPr>
+              <p:cNvPr id="38" name="Straight Connector 37"/>
+              <p:cNvCxnSpPr>
+                <a:cxnSpLocks/>
+              </p:cNvCxnSpPr>
+              <p:nvPr/>
+            </p:nvCxnSpPr>
+            <p:spPr>
+              <a:xfrm rot="16200000">
+                <a:off x="2078986" y="2818744"/>
+                <a:ext cx="0" cy="549328"/>
+              </a:xfrm>
+              <a:prstGeom prst="line">
+                <a:avLst/>
+              </a:prstGeom>
+              <a:ln w="38100" cmpd="sng">
+                <a:solidFill>
+                  <a:srgbClr val="FF6600"/>
+                </a:solidFill>
+                <a:prstDash val="solid"/>
+                <a:headEnd type="triangle" w="med" len="med"/>
+                <a:tailEnd type="triangle" w="med" len="med"/>
+              </a:ln>
+            </p:spPr>
+            <p:style>
+              <a:lnRef idx="1">
+                <a:schemeClr val="accent1"/>
+              </a:lnRef>
+              <a:fillRef idx="0">
+                <a:schemeClr val="accent1"/>
+              </a:fillRef>
+              <a:effectRef idx="0">
+                <a:schemeClr val="accent1"/>
+              </a:effectRef>
+              <a:fontRef idx="minor">
+                <a:schemeClr val="tx1"/>
+              </a:fontRef>
+            </p:style>
+          </p:cxnSp>
+          <p:cxnSp>
+            <p:nvCxnSpPr>
+              <p:cNvPr id="39" name="Straight Arrow Connector 38"/>
+              <p:cNvCxnSpPr/>
+              <p:nvPr/>
+            </p:nvCxnSpPr>
+            <p:spPr>
+              <a:xfrm flipV="1">
+                <a:off x="2075989" y="2537922"/>
+                <a:ext cx="0" cy="213425"/>
+              </a:xfrm>
+              <a:prstGeom prst="straightConnector1">
+                <a:avLst/>
+              </a:prstGeom>
+              <a:ln w="38100">
+                <a:solidFill>
+                  <a:schemeClr val="bg1"/>
+                </a:solidFill>
+                <a:headEnd type="none" w="med" len="med"/>
+                <a:tailEnd type="triangle" w="med" len="med"/>
+              </a:ln>
+            </p:spPr>
+            <p:style>
+              <a:lnRef idx="1">
+                <a:schemeClr val="accent1"/>
+              </a:lnRef>
+              <a:fillRef idx="0">
+                <a:schemeClr val="accent1"/>
+              </a:fillRef>
+              <a:effectRef idx="0">
+                <a:schemeClr val="accent1"/>
+              </a:effectRef>
+              <a:fontRef idx="minor">
+                <a:schemeClr val="tx1"/>
+              </a:fontRef>
+            </p:style>
+          </p:cxnSp>
+          <p:cxnSp>
+            <p:nvCxnSpPr>
+              <p:cNvPr id="40" name="Straight Connector 39"/>
+              <p:cNvCxnSpPr>
+                <a:cxnSpLocks/>
+              </p:cNvCxnSpPr>
+              <p:nvPr/>
+            </p:nvCxnSpPr>
+            <p:spPr>
+              <a:xfrm rot="16200000">
+                <a:off x="1418577" y="2822744"/>
+                <a:ext cx="588704" cy="0"/>
+              </a:xfrm>
+              <a:prstGeom prst="line">
+                <a:avLst/>
+              </a:prstGeom>
+              <a:ln w="38100" cmpd="sng">
+                <a:solidFill>
+                  <a:srgbClr val="FF6600"/>
+                </a:solidFill>
+                <a:prstDash val="solid"/>
+                <a:headEnd type="triangle" w="med" len="med"/>
+                <a:tailEnd type="triangle" w="med" len="med"/>
+              </a:ln>
+            </p:spPr>
+            <p:style>
+              <a:lnRef idx="1">
+                <a:schemeClr val="accent1"/>
+              </a:lnRef>
+              <a:fillRef idx="0">
+                <a:schemeClr val="accent1"/>
+              </a:fillRef>
+              <a:effectRef idx="0">
+                <a:schemeClr val="accent1"/>
+              </a:effectRef>
+              <a:fontRef idx="minor">
+                <a:schemeClr val="tx1"/>
+              </a:fontRef>
+            </p:style>
+          </p:cxnSp>
+        </p:grpSp>
+        <p:sp>
+          <p:nvSpPr>
+            <p:cNvPr id="122" name="Rectangle 121"/>
+            <p:cNvSpPr>
+              <a:spLocks/>
+            </p:cNvSpPr>
+            <p:nvPr/>
+          </p:nvSpPr>
+          <p:spPr>
+            <a:xfrm>
+              <a:off x="4356114" y="2494820"/>
+              <a:ext cx="548545" cy="550800"/>
+            </a:xfrm>
+            <a:prstGeom prst="rect">
+              <a:avLst/>
+            </a:prstGeom>
+            <a:noFill/>
+            <a:ln w="9525">
+              <a:noFill/>
+            </a:ln>
+          </p:spPr>
+          <p:style>
+            <a:lnRef idx="2">
+              <a:schemeClr val="accent1">
+                <a:shade val="50000"/>
+              </a:schemeClr>
+            </a:lnRef>
+            <a:fillRef idx="1">
+              <a:schemeClr val="accent1"/>
+            </a:fillRef>
+            <a:effectRef idx="0">
+              <a:schemeClr val="accent1"/>
+            </a:effectRef>
+            <a:fontRef idx="minor">
+              <a:schemeClr val="lt1"/>
+            </a:fontRef>
+          </p:style>
+          <p:txBody>
+            <a:bodyPr rtlCol="0" anchor="ctr"/>
+            <a:lstStyle/>
+            <a:p>
+              <a:pPr algn="ctr"/>
+              <a:endParaRPr lang="en-US"/>
+            </a:p>
+          </p:txBody>
+        </p:sp>
+      </p:grpSp>
+      <p:grpSp>
+        <p:nvGrpSpPr>
+          <p:cNvPr id="123" name="Group 7_Copy"/>
+          <p:cNvGrpSpPr/>
+          <p:nvPr/>
+        </p:nvGrpSpPr>
+        <p:grpSpPr>
+          <a:xfrm>
+            <a:off x="2056512" y="2490835"/>
+            <a:ext cx="548545" cy="550800"/>
+            <a:chOff x="2056512" y="2490835"/>
+            <a:chExt cx="548545" cy="550800"/>
+          </a:xfrm>
+        </p:grpSpPr>
+        <p:grpSp>
+          <p:nvGrpSpPr>
+            <p:cNvPr id="124" name="Group 123"/>
+            <p:cNvGrpSpPr>
+              <a:grpSpLocks noChangeAspect="1"/>
+            </p:cNvGrpSpPr>
+            <p:nvPr/>
+          </p:nvGrpSpPr>
+          <p:grpSpPr>
+            <a:xfrm>
+              <a:off x="2124948" y="2559552"/>
+              <a:ext cx="411673" cy="413366"/>
+              <a:chOff x="1590542" y="2477117"/>
+              <a:chExt cx="763108" cy="616291"/>
+            </a:xfrm>
+          </p:grpSpPr>
+          <p:sp>
+            <p:nvSpPr>
+              <p:cNvPr id="126" name="Rectangle 125"/>
+              <p:cNvSpPr>
+                <a:spLocks/>
+              </p:cNvSpPr>
+              <p:nvPr/>
+            </p:nvSpPr>
+            <p:spPr>
+              <a:xfrm flipV="1">
+                <a:off x="1737360" y="2477117"/>
+                <a:ext cx="616290" cy="434647"/>
+              </a:xfrm>
+              <a:prstGeom prst="rect">
+                <a:avLst/>
+              </a:prstGeom>
+              <a:solidFill>
+                <a:srgbClr val="0070C0"/>
+              </a:solidFill>
+              <a:ln w="19050">
+                <a:solidFill>
+                  <a:srgbClr val="0070C0"/>
+                </a:solidFill>
+                <a:prstDash val="solid"/>
+              </a:ln>
+            </p:spPr>
+            <p:style>
+              <a:lnRef idx="2">
+                <a:schemeClr val="accent1">
+                  <a:shade val="50000"/>
+                </a:schemeClr>
+              </a:lnRef>
+              <a:fillRef idx="1">
+                <a:schemeClr val="accent1"/>
+              </a:fillRef>
+              <a:effectRef idx="0">
+                <a:schemeClr val="accent1"/>
+              </a:effectRef>
+              <a:fontRef idx="minor">
+                <a:schemeClr val="lt1"/>
+              </a:fontRef>
+            </p:style>
+            <p:txBody>
+              <a:bodyPr rtlCol="0" anchor="ctr"/>
+              <a:lstStyle/>
+              <a:p>
+                <a:pPr algn="ctr"/>
+                <a:endParaRPr lang="en-US" sz="1000" b="1" dirty="0"/>
+              </a:p>
+            </p:txBody>
+          </p:sp>
+          <p:sp>
+            <p:nvSpPr>
+              <p:cNvPr id="127" name="Rectangle 126"/>
+              <p:cNvSpPr>
+                <a:spLocks/>
+              </p:cNvSpPr>
+              <p:nvPr/>
+            </p:nvSpPr>
+            <p:spPr>
+              <a:xfrm flipV="1">
+                <a:off x="1737360" y="2785262"/>
+                <a:ext cx="616290" cy="308146"/>
+              </a:xfrm>
+              <a:prstGeom prst="rect">
+                <a:avLst/>
+              </a:prstGeom>
+              <a:solidFill>
+                <a:schemeClr val="bg1"/>
+              </a:solidFill>
+              <a:ln w="19050">
+                <a:solidFill>
+                  <a:srgbClr val="0070C0"/>
+                </a:solidFill>
+              </a:ln>
+            </p:spPr>
+            <p:style>
+              <a:lnRef idx="2">
+                <a:schemeClr val="accent1">
+                  <a:shade val="50000"/>
+                </a:schemeClr>
+              </a:lnRef>
+              <a:fillRef idx="1">
+                <a:schemeClr val="accent1"/>
+              </a:fillRef>
+              <a:effectRef idx="0">
+                <a:schemeClr val="accent1"/>
+              </a:effectRef>
+              <a:fontRef idx="minor">
+                <a:schemeClr val="lt1"/>
+              </a:fontRef>
+            </p:style>
+            <p:txBody>
+              <a:bodyPr rtlCol="0" anchor="ctr"/>
+              <a:lstStyle/>
+              <a:p>
+                <a:pPr algn="ctr"/>
+                <a:endParaRPr lang="en-US" dirty="0"/>
+              </a:p>
+            </p:txBody>
+          </p:sp>
+          <p:cxnSp>
+            <p:nvCxnSpPr>
+              <p:cNvPr id="128" name="Straight Connector 127"/>
+              <p:cNvCxnSpPr>
+                <a:cxnSpLocks/>
+              </p:cNvCxnSpPr>
+              <p:nvPr/>
+            </p:nvCxnSpPr>
+            <p:spPr>
+              <a:xfrm>
+                <a:off x="1737360" y="3093408"/>
+                <a:ext cx="616290" cy="0"/>
+              </a:xfrm>
+              <a:prstGeom prst="line">
+                <a:avLst/>
+              </a:prstGeom>
+              <a:ln w="38100" cmpd="sng">
+                <a:solidFill>
+                  <a:srgbClr val="FF6600"/>
+                </a:solidFill>
+                <a:prstDash val="solid"/>
+                <a:headEnd type="triangle" w="med" len="med"/>
+                <a:tailEnd type="triangle" w="med" len="med"/>
+              </a:ln>
+            </p:spPr>
+            <p:style>
+              <a:lnRef idx="1">
+                <a:schemeClr val="accent1"/>
+              </a:lnRef>
+              <a:fillRef idx="0">
+                <a:schemeClr val="accent1"/>
+              </a:fillRef>
+              <a:effectRef idx="0">
+                <a:schemeClr val="accent1"/>
+              </a:effectRef>
+              <a:fontRef idx="minor">
+                <a:schemeClr val="tx1"/>
+              </a:fontRef>
+            </p:style>
+          </p:cxnSp>
+          <p:cxnSp>
+            <p:nvCxnSpPr>
+              <p:cNvPr id="129" name="Straight Arrow Connector 128"/>
+              <p:cNvCxnSpPr/>
+              <p:nvPr/>
+            </p:nvCxnSpPr>
+            <p:spPr>
+              <a:xfrm flipV="1">
+                <a:off x="2045505" y="2537922"/>
+                <a:ext cx="0" cy="213425"/>
+              </a:xfrm>
+              <a:prstGeom prst="straightConnector1">
+                <a:avLst/>
+              </a:prstGeom>
+              <a:ln w="38100">
+                <a:solidFill>
+                  <a:schemeClr val="bg1"/>
+                </a:solidFill>
+                <a:headEnd type="none" w="med" len="med"/>
+                <a:tailEnd type="triangle" w="med" len="med"/>
+              </a:ln>
+            </p:spPr>
+            <p:style>
+              <a:lnRef idx="1">
+                <a:schemeClr val="accent1"/>
+              </a:lnRef>
+              <a:fillRef idx="0">
+                <a:schemeClr val="accent1"/>
+              </a:fillRef>
+              <a:effectRef idx="0">
+                <a:schemeClr val="accent1"/>
+              </a:effectRef>
+              <a:fontRef idx="minor">
+                <a:schemeClr val="tx1"/>
+              </a:fontRef>
+            </p:style>
+          </p:cxnSp>
+          <p:cxnSp>
+            <p:nvCxnSpPr>
+              <p:cNvPr id="130" name="Straight Connector 129"/>
+              <p:cNvCxnSpPr>
+                <a:cxnSpLocks/>
+              </p:cNvCxnSpPr>
+              <p:nvPr/>
+            </p:nvCxnSpPr>
+            <p:spPr>
+              <a:xfrm rot="16200000">
+                <a:off x="1282397" y="2785262"/>
+                <a:ext cx="616290" cy="0"/>
+              </a:xfrm>
+              <a:prstGeom prst="line">
+                <a:avLst/>
+              </a:prstGeom>
+              <a:ln w="38100" cmpd="sng">
+                <a:solidFill>
+                  <a:srgbClr val="FF6600"/>
+                </a:solidFill>
+                <a:prstDash val="solid"/>
+                <a:headEnd type="triangle" w="med" len="med"/>
+                <a:tailEnd type="triangle" w="med" len="med"/>
+              </a:ln>
+            </p:spPr>
+            <p:style>
+              <a:lnRef idx="1">
+                <a:schemeClr val="accent1"/>
+              </a:lnRef>
+              <a:fillRef idx="0">
+                <a:schemeClr val="accent1"/>
+              </a:fillRef>
+              <a:effectRef idx="0">
+                <a:schemeClr val="accent1"/>
+              </a:effectRef>
+              <a:fontRef idx="minor">
+                <a:schemeClr val="tx1"/>
+              </a:fontRef>
+            </p:style>
+          </p:cxnSp>
+        </p:grpSp>
+        <p:sp>
+          <p:nvSpPr>
+            <p:cNvPr id="125" name="Rectangle 124"/>
+            <p:cNvSpPr>
+              <a:spLocks noChangeAspect="1"/>
+            </p:cNvSpPr>
+            <p:nvPr/>
+          </p:nvSpPr>
+          <p:spPr>
+            <a:xfrm>
+              <a:off x="2056512" y="2490835"/>
+              <a:ext cx="548545" cy="550800"/>
+            </a:xfrm>
+            <a:prstGeom prst="rect">
+              <a:avLst/>
+            </a:prstGeom>
+            <a:noFill/>
+            <a:ln w="9525">
+              <a:noFill/>
+            </a:ln>
+          </p:spPr>
+          <p:style>
+            <a:lnRef idx="2">
+              <a:schemeClr val="accent1">
+                <a:shade val="50000"/>
+              </a:schemeClr>
+            </a:lnRef>
+            <a:fillRef idx="1">
+              <a:schemeClr val="accent1"/>
+            </a:fillRef>
+            <a:effectRef idx="0">
+              <a:schemeClr val="accent1"/>
+            </a:effectRef>
+            <a:fontRef idx="minor">
+              <a:schemeClr val="lt1"/>
+            </a:fontRef>
+          </p:style>
+          <p:txBody>
+            <a:bodyPr rtlCol="0" anchor="ctr"/>
+            <a:lstStyle/>
+            <a:p>
+              <a:pPr algn="ctr"/>
+              <a:endParaRPr lang="en-US"/>
+            </a:p>
+          </p:txBody>
+        </p:sp>
+      </p:grpSp>
+      <p:grpSp>
+        <p:nvGrpSpPr>
+          <p:cNvPr id="131" name="Group 7_Copy"/>
+          <p:cNvGrpSpPr/>
+          <p:nvPr/>
+        </p:nvGrpSpPr>
+        <p:grpSpPr>
+          <a:xfrm>
+            <a:off x="2056512" y="2490835"/>
+            <a:ext cx="548545" cy="550800"/>
+            <a:chOff x="2056512" y="2490835"/>
+            <a:chExt cx="548545" cy="550800"/>
+          </a:xfrm>
+        </p:grpSpPr>
+        <p:grpSp>
+          <p:nvGrpSpPr>
+            <p:cNvPr id="132" name="Group 131"/>
+            <p:cNvGrpSpPr>
+              <a:grpSpLocks noChangeAspect="1"/>
+            </p:cNvGrpSpPr>
+            <p:nvPr/>
+          </p:nvGrpSpPr>
+          <p:grpSpPr>
+            <a:xfrm>
+              <a:off x="2124948" y="2559552"/>
+              <a:ext cx="411673" cy="413366"/>
+              <a:chOff x="1590542" y="2477117"/>
+              <a:chExt cx="763108" cy="616291"/>
+            </a:xfrm>
+          </p:grpSpPr>
+          <p:sp>
+            <p:nvSpPr>
+              <p:cNvPr id="134" name="Rectangle 133"/>
+              <p:cNvSpPr>
+                <a:spLocks/>
+              </p:cNvSpPr>
+              <p:nvPr/>
+            </p:nvSpPr>
+            <p:spPr>
+              <a:xfrm flipV="1">
+                <a:off x="1737360" y="2477117"/>
+                <a:ext cx="616290" cy="434647"/>
+              </a:xfrm>
+              <a:prstGeom prst="rect">
+                <a:avLst/>
+              </a:prstGeom>
+              <a:solidFill>
+                <a:srgbClr val="0070C0"/>
+              </a:solidFill>
+              <a:ln w="19050">
+                <a:solidFill>
+                  <a:srgbClr val="0070C0"/>
+                </a:solidFill>
+                <a:prstDash val="solid"/>
+              </a:ln>
+            </p:spPr>
+            <p:style>
+              <a:lnRef idx="2">
+                <a:schemeClr val="accent1">
+                  <a:shade val="50000"/>
+                </a:schemeClr>
+              </a:lnRef>
+              <a:fillRef idx="1">
+                <a:schemeClr val="accent1"/>
+              </a:fillRef>
+              <a:effectRef idx="0">
+                <a:schemeClr val="accent1"/>
+              </a:effectRef>
+              <a:fontRef idx="minor">
+                <a:schemeClr val="lt1"/>
+              </a:fontRef>
+            </p:style>
+            <p:txBody>
+              <a:bodyPr rtlCol="0" anchor="ctr"/>
+              <a:lstStyle/>
+              <a:p>
+                <a:pPr algn="ctr"/>
+                <a:endParaRPr lang="en-US" sz="1000" b="1" dirty="0"/>
+              </a:p>
+            </p:txBody>
+          </p:sp>
+          <p:sp>
+            <p:nvSpPr>
+              <p:cNvPr id="135" name="Rectangle 134"/>
+              <p:cNvSpPr>
+                <a:spLocks/>
+              </p:cNvSpPr>
+              <p:nvPr/>
+            </p:nvSpPr>
+            <p:spPr>
+              <a:xfrm flipV="1">
+                <a:off x="1737360" y="2785262"/>
+                <a:ext cx="616290" cy="308146"/>
+              </a:xfrm>
+              <a:prstGeom prst="rect">
+                <a:avLst/>
+              </a:prstGeom>
+              <a:solidFill>
+                <a:schemeClr val="bg1"/>
+              </a:solidFill>
+              <a:ln w="19050">
+                <a:solidFill>
+                  <a:srgbClr val="0070C0"/>
+                </a:solidFill>
+              </a:ln>
+            </p:spPr>
+            <p:style>
+              <a:lnRef idx="2">
+                <a:schemeClr val="accent1">
+                  <a:shade val="50000"/>
+                </a:schemeClr>
+              </a:lnRef>
+              <a:fillRef idx="1">
+                <a:schemeClr val="accent1"/>
+              </a:fillRef>
+              <a:effectRef idx="0">
+                <a:schemeClr val="accent1"/>
+              </a:effectRef>
+              <a:fontRef idx="minor">
+                <a:schemeClr val="lt1"/>
+              </a:fontRef>
+            </p:style>
+            <p:txBody>
+              <a:bodyPr rtlCol="0" anchor="ctr"/>
+              <a:lstStyle/>
+              <a:p>
+                <a:pPr algn="ctr"/>
+                <a:endParaRPr lang="en-US" dirty="0"/>
+              </a:p>
+            </p:txBody>
+          </p:sp>
+          <p:cxnSp>
+            <p:nvCxnSpPr>
+              <p:cNvPr id="136" name="Straight Connector 135"/>
+              <p:cNvCxnSpPr>
+                <a:cxnSpLocks/>
+              </p:cNvCxnSpPr>
+              <p:nvPr/>
+            </p:nvCxnSpPr>
+            <p:spPr>
+              <a:xfrm>
+                <a:off x="1737360" y="3093408"/>
+                <a:ext cx="616290" cy="0"/>
+              </a:xfrm>
+              <a:prstGeom prst="line">
+                <a:avLst/>
+              </a:prstGeom>
+              <a:ln w="38100" cmpd="sng">
+                <a:solidFill>
+                  <a:srgbClr val="FF6600"/>
+                </a:solidFill>
+                <a:prstDash val="solid"/>
+                <a:headEnd type="triangle" w="med" len="med"/>
+                <a:tailEnd type="triangle" w="med" len="med"/>
+              </a:ln>
+            </p:spPr>
+            <p:style>
+              <a:lnRef idx="1">
+                <a:schemeClr val="accent1"/>
+              </a:lnRef>
+              <a:fillRef idx="0">
+                <a:schemeClr val="accent1"/>
+              </a:fillRef>
+              <a:effectRef idx="0">
+                <a:schemeClr val="accent1"/>
+              </a:effectRef>
+              <a:fontRef idx="minor">
+                <a:schemeClr val="tx1"/>
+              </a:fontRef>
+            </p:style>
+          </p:cxnSp>
+          <p:cxnSp>
+            <p:nvCxnSpPr>
+              <p:cNvPr id="137" name="Straight Arrow Connector 136"/>
+              <p:cNvCxnSpPr/>
+              <p:nvPr/>
+            </p:nvCxnSpPr>
+            <p:spPr>
+              <a:xfrm flipV="1">
+                <a:off x="2045505" y="2537922"/>
+                <a:ext cx="0" cy="213425"/>
+              </a:xfrm>
+              <a:prstGeom prst="straightConnector1">
+                <a:avLst/>
+              </a:prstGeom>
+              <a:ln w="38100">
+                <a:solidFill>
+                  <a:schemeClr val="bg1"/>
+                </a:solidFill>
+                <a:headEnd type="none" w="med" len="med"/>
+                <a:tailEnd type="triangle" w="med" len="med"/>
+              </a:ln>
+            </p:spPr>
+            <p:style>
+              <a:lnRef idx="1">
+                <a:schemeClr val="accent1"/>
+              </a:lnRef>
+              <a:fillRef idx="0">
+                <a:schemeClr val="accent1"/>
+              </a:fillRef>
+              <a:effectRef idx="0">
+                <a:schemeClr val="accent1"/>
+              </a:effectRef>
+              <a:fontRef idx="minor">
+                <a:schemeClr val="tx1"/>
+              </a:fontRef>
+            </p:style>
+          </p:cxnSp>
+          <p:cxnSp>
+            <p:nvCxnSpPr>
+              <p:cNvPr id="138" name="Straight Connector 137"/>
+              <p:cNvCxnSpPr>
+                <a:cxnSpLocks/>
+              </p:cNvCxnSpPr>
+              <p:nvPr/>
+            </p:nvCxnSpPr>
+            <p:spPr>
+              <a:xfrm rot="16200000">
+                <a:off x="1282397" y="2785262"/>
+                <a:ext cx="616290" cy="0"/>
+              </a:xfrm>
+              <a:prstGeom prst="line">
+                <a:avLst/>
+              </a:prstGeom>
+              <a:ln w="38100" cmpd="sng">
+                <a:solidFill>
+                  <a:srgbClr val="FF6600"/>
+                </a:solidFill>
+                <a:prstDash val="solid"/>
+                <a:headEnd type="triangle" w="med" len="med"/>
+                <a:tailEnd type="triangle" w="med" len="med"/>
+              </a:ln>
+            </p:spPr>
+            <p:style>
+              <a:lnRef idx="1">
+                <a:schemeClr val="accent1"/>
+              </a:lnRef>
+              <a:fillRef idx="0">
+                <a:schemeClr val="accent1"/>
+              </a:fillRef>
+              <a:effectRef idx="0">
+                <a:schemeClr val="accent1"/>
+              </a:effectRef>
+              <a:fontRef idx="minor">
+                <a:schemeClr val="tx1"/>
+              </a:fontRef>
+            </p:style>
+          </p:cxnSp>
+        </p:grpSp>
+        <p:sp>
+          <p:nvSpPr>
+            <p:cNvPr id="133" name="Rectangle 132"/>
+            <p:cNvSpPr>
+              <a:spLocks noChangeAspect="1"/>
+            </p:cNvSpPr>
+            <p:nvPr/>
+          </p:nvSpPr>
+          <p:spPr>
+            <a:xfrm>
+              <a:off x="2056512" y="2490835"/>
+              <a:ext cx="548545" cy="550800"/>
+            </a:xfrm>
+            <a:prstGeom prst="rect">
+              <a:avLst/>
+            </a:prstGeom>
+            <a:noFill/>
+            <a:ln w="9525">
+              <a:noFill/>
+            </a:ln>
+          </p:spPr>
+          <p:style>
+            <a:lnRef idx="2">
+              <a:schemeClr val="accent1">
+                <a:shade val="50000"/>
+              </a:schemeClr>
+            </a:lnRef>
+            <a:fillRef idx="1">
+              <a:schemeClr val="accent1"/>
+            </a:fillRef>
+            <a:effectRef idx="0">
+              <a:schemeClr val="accent1"/>
+            </a:effectRef>
+            <a:fontRef idx="minor">
+              <a:schemeClr val="lt1"/>
+            </a:fontRef>
+          </p:style>
+          <p:txBody>
+            <a:bodyPr rtlCol="0" anchor="ctr"/>
+            <a:lstStyle/>
+            <a:p>
+              <a:pPr algn="ctr"/>
+              <a:endParaRPr lang="en-US"/>
+            </a:p>
+          </p:txBody>
+        </p:sp>
+      </p:grpSp>
+      <p:grpSp>
+        <p:nvGrpSpPr>
+          <p:cNvPr id="139" name="Group 7_Copy"/>
+          <p:cNvGrpSpPr>
+            <a:grpSpLocks noChangeAspect="1"/>
+          </p:cNvGrpSpPr>
+          <p:nvPr/>
+        </p:nvGrpSpPr>
+        <p:grpSpPr>
+          <a:xfrm>
+            <a:off x="2056512" y="2490835"/>
+            <a:ext cx="548545" cy="550800"/>
+            <a:chOff x="2056512" y="2490835"/>
+            <a:chExt cx="548545" cy="550800"/>
+          </a:xfrm>
+        </p:grpSpPr>
+        <p:grpSp>
+          <p:nvGrpSpPr>
+            <p:cNvPr id="140" name="Group 139"/>
+            <p:cNvGrpSpPr>
+              <a:grpSpLocks noChangeAspect="1"/>
+            </p:cNvGrpSpPr>
+            <p:nvPr/>
+          </p:nvGrpSpPr>
+          <p:grpSpPr>
+            <a:xfrm>
+              <a:off x="2124948" y="2559552"/>
+              <a:ext cx="411673" cy="413366"/>
+              <a:chOff x="1590542" y="2477117"/>
+              <a:chExt cx="763108" cy="616291"/>
+            </a:xfrm>
+          </p:grpSpPr>
+          <p:sp>
+            <p:nvSpPr>
+              <p:cNvPr id="142" name="Rectangle 141"/>
+              <p:cNvSpPr>
+                <a:spLocks/>
+              </p:cNvSpPr>
+              <p:nvPr/>
+            </p:nvSpPr>
+            <p:spPr>
+              <a:xfrm flipV="1">
+                <a:off x="1737360" y="2477117"/>
+                <a:ext cx="616290" cy="434647"/>
+              </a:xfrm>
+              <a:prstGeom prst="rect">
+                <a:avLst/>
+              </a:prstGeom>
+              <a:solidFill>
+                <a:srgbClr val="0070C0"/>
+              </a:solidFill>
+              <a:ln w="19050">
+                <a:solidFill>
+                  <a:srgbClr val="0070C0"/>
+                </a:solidFill>
+                <a:prstDash val="solid"/>
+              </a:ln>
+            </p:spPr>
+            <p:style>
+              <a:lnRef idx="2">
+                <a:schemeClr val="accent1">
+                  <a:shade val="50000"/>
+                </a:schemeClr>
+              </a:lnRef>
+              <a:fillRef idx="1">
+                <a:schemeClr val="accent1"/>
+              </a:fillRef>
+              <a:effectRef idx="0">
+                <a:schemeClr val="accent1"/>
+              </a:effectRef>
+              <a:fontRef idx="minor">
+                <a:schemeClr val="lt1"/>
+              </a:fontRef>
+            </p:style>
+            <p:txBody>
+              <a:bodyPr rtlCol="0" anchor="ctr"/>
+              <a:lstStyle/>
+              <a:p>
+                <a:pPr algn="ctr"/>
+                <a:endParaRPr lang="en-US" sz="1000" b="1" dirty="0"/>
+              </a:p>
+            </p:txBody>
+          </p:sp>
+          <p:sp>
+            <p:nvSpPr>
+              <p:cNvPr id="143" name="Rectangle 142"/>
+              <p:cNvSpPr>
+                <a:spLocks/>
+              </p:cNvSpPr>
+              <p:nvPr/>
+            </p:nvSpPr>
+            <p:spPr>
+              <a:xfrm flipV="1">
+                <a:off x="1737360" y="2785262"/>
+                <a:ext cx="616290" cy="308146"/>
+              </a:xfrm>
+              <a:prstGeom prst="rect">
+                <a:avLst/>
+              </a:prstGeom>
+              <a:solidFill>
+                <a:schemeClr val="bg1"/>
+              </a:solidFill>
+              <a:ln w="19050">
+                <a:solidFill>
+                  <a:srgbClr val="0070C0"/>
+                </a:solidFill>
+              </a:ln>
+            </p:spPr>
+            <p:style>
+              <a:lnRef idx="2">
+                <a:schemeClr val="accent1">
+                  <a:shade val="50000"/>
+                </a:schemeClr>
+              </a:lnRef>
+              <a:fillRef idx="1">
+                <a:schemeClr val="accent1"/>
+              </a:fillRef>
+              <a:effectRef idx="0">
+                <a:schemeClr val="accent1"/>
+              </a:effectRef>
+              <a:fontRef idx="minor">
+                <a:schemeClr val="lt1"/>
+              </a:fontRef>
+            </p:style>
+            <p:txBody>
+              <a:bodyPr rtlCol="0" anchor="ctr"/>
+              <a:lstStyle/>
+              <a:p>
+                <a:pPr algn="ctr"/>
+                <a:endParaRPr lang="en-US" dirty="0"/>
+              </a:p>
+            </p:txBody>
+          </p:sp>
+          <p:cxnSp>
+            <p:nvCxnSpPr>
+              <p:cNvPr id="144" name="Straight Connector 143"/>
+              <p:cNvCxnSpPr>
+                <a:cxnSpLocks/>
+              </p:cNvCxnSpPr>
+              <p:nvPr/>
+            </p:nvCxnSpPr>
+            <p:spPr>
+              <a:xfrm>
+                <a:off x="1737360" y="3093408"/>
+                <a:ext cx="616290" cy="0"/>
+              </a:xfrm>
+              <a:prstGeom prst="line">
+                <a:avLst/>
+              </a:prstGeom>
+              <a:ln w="38100" cmpd="sng">
+                <a:solidFill>
+                  <a:srgbClr val="FF6600"/>
+                </a:solidFill>
+                <a:prstDash val="solid"/>
+                <a:headEnd type="triangle" w="med" len="med"/>
+                <a:tailEnd type="triangle" w="med" len="med"/>
+              </a:ln>
+            </p:spPr>
+            <p:style>
+              <a:lnRef idx="1">
+                <a:schemeClr val="accent1"/>
+              </a:lnRef>
+              <a:fillRef idx="0">
+                <a:schemeClr val="accent1"/>
+              </a:fillRef>
+              <a:effectRef idx="0">
+                <a:schemeClr val="accent1"/>
+              </a:effectRef>
+              <a:fontRef idx="minor">
+                <a:schemeClr val="tx1"/>
+              </a:fontRef>
+            </p:style>
+          </p:cxnSp>
+          <p:cxnSp>
+            <p:nvCxnSpPr>
+              <p:cNvPr id="145" name="Straight Arrow Connector 144"/>
+              <p:cNvCxnSpPr/>
+              <p:nvPr/>
+            </p:nvCxnSpPr>
+            <p:spPr>
+              <a:xfrm flipV="1">
+                <a:off x="2045505" y="2537922"/>
+                <a:ext cx="0" cy="213425"/>
+              </a:xfrm>
+              <a:prstGeom prst="straightConnector1">
+                <a:avLst/>
+              </a:prstGeom>
+              <a:ln w="38100">
+                <a:solidFill>
+                  <a:schemeClr val="bg1"/>
+                </a:solidFill>
+                <a:headEnd type="none" w="med" len="med"/>
+                <a:tailEnd type="triangle" w="med" len="med"/>
+              </a:ln>
+            </p:spPr>
+            <p:style>
+              <a:lnRef idx="1">
+                <a:schemeClr val="accent1"/>
+              </a:lnRef>
+              <a:fillRef idx="0">
+                <a:schemeClr val="accent1"/>
+              </a:fillRef>
+              <a:effectRef idx="0">
+                <a:schemeClr val="accent1"/>
+              </a:effectRef>
+              <a:fontRef idx="minor">
+                <a:schemeClr val="tx1"/>
+              </a:fontRef>
+            </p:style>
+          </p:cxnSp>
+          <p:cxnSp>
+            <p:nvCxnSpPr>
+              <p:cNvPr id="146" name="Straight Connector 145"/>
+              <p:cNvCxnSpPr>
+                <a:cxnSpLocks/>
+              </p:cNvCxnSpPr>
+              <p:nvPr/>
+            </p:nvCxnSpPr>
+            <p:spPr>
+              <a:xfrm rot="16200000">
+                <a:off x="1282397" y="2785262"/>
+                <a:ext cx="616290" cy="0"/>
+              </a:xfrm>
+              <a:prstGeom prst="line">
+                <a:avLst/>
+              </a:prstGeom>
+              <a:ln w="38100" cmpd="sng">
+                <a:solidFill>
+                  <a:srgbClr val="FF6600"/>
+                </a:solidFill>
+                <a:prstDash val="solid"/>
+                <a:headEnd type="triangle" w="med" len="med"/>
+                <a:tailEnd type="triangle" w="med" len="med"/>
+              </a:ln>
+            </p:spPr>
+            <p:style>
+              <a:lnRef idx="1">
+                <a:schemeClr val="accent1"/>
+              </a:lnRef>
+              <a:fillRef idx="0">
+                <a:schemeClr val="accent1"/>
+              </a:fillRef>
+              <a:effectRef idx="0">
+                <a:schemeClr val="accent1"/>
+              </a:effectRef>
+              <a:fontRef idx="minor">
+                <a:schemeClr val="tx1"/>
+              </a:fontRef>
+            </p:style>
+          </p:cxnSp>
+        </p:grpSp>
+        <p:sp>
+          <p:nvSpPr>
+            <p:cNvPr id="141" name="Rectangle 140"/>
+            <p:cNvSpPr>
+              <a:spLocks noChangeAspect="1"/>
+            </p:cNvSpPr>
+            <p:nvPr/>
+          </p:nvSpPr>
+          <p:spPr>
+            <a:xfrm>
+              <a:off x="2056512" y="2490835"/>
+              <a:ext cx="548545" cy="550800"/>
+            </a:xfrm>
+            <a:prstGeom prst="rect">
+              <a:avLst/>
+            </a:prstGeom>
+            <a:noFill/>
+            <a:ln w="9525">
+              <a:noFill/>
+            </a:ln>
+          </p:spPr>
+          <p:style>
+            <a:lnRef idx="2">
+              <a:schemeClr val="accent1">
+                <a:shade val="50000"/>
+              </a:schemeClr>
+            </a:lnRef>
+            <a:fillRef idx="1">
+              <a:schemeClr val="accent1"/>
+            </a:fillRef>
+            <a:effectRef idx="0">
+              <a:schemeClr val="accent1"/>
+            </a:effectRef>
+            <a:fontRef idx="minor">
+              <a:schemeClr val="lt1"/>
+            </a:fontRef>
+          </p:style>
+          <p:txBody>
+            <a:bodyPr rtlCol="0" anchor="ctr"/>
+            <a:lstStyle/>
+            <a:p>
+              <a:pPr algn="ctr"/>
+              <a:endParaRPr lang="en-US"/>
+            </a:p>
+          </p:txBody>
+        </p:sp>
+      </p:grpSp>
+      <p:grpSp>
+        <p:nvGrpSpPr>
+          <p:cNvPr id="148" name="Group 147"/>
+          <p:cNvGrpSpPr>
+            <a:grpSpLocks noChangeAspect="1"/>
+          </p:cNvGrpSpPr>
+          <p:nvPr/>
+        </p:nvGrpSpPr>
+        <p:grpSpPr>
+          <a:xfrm>
+            <a:off x="2124948" y="2559552"/>
+            <a:ext cx="411673" cy="413366"/>
+            <a:chOff x="1590542" y="2477117"/>
+            <a:chExt cx="763108" cy="616291"/>
+          </a:xfrm>
+        </p:grpSpPr>
+        <p:sp>
+          <p:nvSpPr>
+            <p:cNvPr id="150" name="Rectangle 149"/>
+            <p:cNvSpPr>
+              <a:spLocks/>
+            </p:cNvSpPr>
+            <p:nvPr/>
+          </p:nvSpPr>
+          <p:spPr>
+            <a:xfrm flipV="1">
+              <a:off x="1737360" y="2477117"/>
+              <a:ext cx="616290" cy="434647"/>
+            </a:xfrm>
+            <a:prstGeom prst="rect">
+              <a:avLst/>
+            </a:prstGeom>
+            <a:solidFill>
+              <a:srgbClr val="0070C0"/>
+            </a:solidFill>
+            <a:ln w="19050">
+              <a:solidFill>
+                <a:srgbClr val="0070C0"/>
+              </a:solidFill>
+              <a:prstDash val="solid"/>
+            </a:ln>
+          </p:spPr>
+          <p:style>
+            <a:lnRef idx="2">
+              <a:schemeClr val="accent1">
+                <a:shade val="50000"/>
+              </a:schemeClr>
+            </a:lnRef>
+            <a:fillRef idx="1">
+              <a:schemeClr val="accent1"/>
+            </a:fillRef>
+            <a:effectRef idx="0">
+              <a:schemeClr val="accent1"/>
+            </a:effectRef>
+            <a:fontRef idx="minor">
+              <a:schemeClr val="lt1"/>
+            </a:fontRef>
+          </p:style>
+          <p:txBody>
+            <a:bodyPr rtlCol="0" anchor="ctr"/>
+            <a:lstStyle/>
+            <a:p>
+              <a:pPr algn="ctr"/>
+              <a:endParaRPr lang="en-US" sz="1000" b="1" dirty="0"/>
+            </a:p>
+          </p:txBody>
+        </p:sp>
+        <p:sp>
+          <p:nvSpPr>
+            <p:cNvPr id="151" name="Rectangle 150"/>
+            <p:cNvSpPr>
+              <a:spLocks/>
+            </p:cNvSpPr>
+            <p:nvPr/>
+          </p:nvSpPr>
+          <p:spPr>
+            <a:xfrm flipV="1">
+              <a:off x="1737360" y="2785262"/>
+              <a:ext cx="616290" cy="308146"/>
+            </a:xfrm>
+            <a:prstGeom prst="rect">
+              <a:avLst/>
+            </a:prstGeom>
+            <a:solidFill>
+              <a:schemeClr val="bg1"/>
+            </a:solidFill>
+            <a:ln w="19050">
+              <a:solidFill>
+                <a:srgbClr val="0070C0"/>
+              </a:solidFill>
+            </a:ln>
+          </p:spPr>
+          <p:style>
+            <a:lnRef idx="2">
+              <a:schemeClr val="accent1">
+                <a:shade val="50000"/>
+              </a:schemeClr>
+            </a:lnRef>
+            <a:fillRef idx="1">
+              <a:schemeClr val="accent1"/>
+            </a:fillRef>
+            <a:effectRef idx="0">
+              <a:schemeClr val="accent1"/>
+            </a:effectRef>
+            <a:fontRef idx="minor">
+              <a:schemeClr val="lt1"/>
+            </a:fontRef>
+          </p:style>
+          <p:txBody>
+            <a:bodyPr rtlCol="0" anchor="ctr"/>
+            <a:lstStyle/>
+            <a:p>
+              <a:pPr algn="ctr"/>
+              <a:endParaRPr lang="en-US" dirty="0"/>
+            </a:p>
+          </p:txBody>
+        </p:sp>
+        <p:cxnSp>
+          <p:nvCxnSpPr>
+            <p:cNvPr id="152" name="Straight Connector 151"/>
+            <p:cNvCxnSpPr>
+              <a:cxnSpLocks/>
+            </p:cNvCxnSpPr>
+            <p:nvPr/>
+          </p:nvCxnSpPr>
+          <p:spPr>
+            <a:xfrm>
+              <a:off x="1737360" y="3093408"/>
+              <a:ext cx="616290" cy="0"/>
+            </a:xfrm>
+            <a:prstGeom prst="line">
+              <a:avLst/>
+            </a:prstGeom>
+            <a:ln w="38100" cmpd="sng">
+              <a:solidFill>
+                <a:srgbClr val="FF6600"/>
+              </a:solidFill>
+              <a:prstDash val="solid"/>
+              <a:headEnd type="triangle" w="med" len="med"/>
+              <a:tailEnd type="triangle" w="med" len="med"/>
+            </a:ln>
+          </p:spPr>
+          <p:style>
+            <a:lnRef idx="1">
+              <a:schemeClr val="accent1"/>
+            </a:lnRef>
+            <a:fillRef idx="0">
+              <a:schemeClr val="accent1"/>
+            </a:fillRef>
+            <a:effectRef idx="0">
+              <a:schemeClr val="accent1"/>
+            </a:effectRef>
+            <a:fontRef idx="minor">
+              <a:schemeClr val="tx1"/>
+            </a:fontRef>
+          </p:style>
+        </p:cxnSp>
+        <p:cxnSp>
+          <p:nvCxnSpPr>
+            <p:cNvPr id="153" name="Straight Arrow Connector 152"/>
+            <p:cNvCxnSpPr/>
+            <p:nvPr/>
+          </p:nvCxnSpPr>
+          <p:spPr>
+            <a:xfrm flipV="1">
+              <a:off x="2045505" y="2537922"/>
+              <a:ext cx="0" cy="213425"/>
+            </a:xfrm>
+            <a:prstGeom prst="straightConnector1">
+              <a:avLst/>
+            </a:prstGeom>
+            <a:ln w="38100">
+              <a:solidFill>
+                <a:schemeClr val="bg1"/>
+              </a:solidFill>
+              <a:headEnd type="none" w="med" len="med"/>
+              <a:tailEnd type="triangle" w="med" len="med"/>
+            </a:ln>
+          </p:spPr>
+          <p:style>
+            <a:lnRef idx="1">
+              <a:schemeClr val="accent1"/>
+            </a:lnRef>
+            <a:fillRef idx="0">
+              <a:schemeClr val="accent1"/>
+            </a:fillRef>
+            <a:effectRef idx="0">
+              <a:schemeClr val="accent1"/>
+            </a:effectRef>
+            <a:fontRef idx="minor">
+              <a:schemeClr val="tx1"/>
+            </a:fontRef>
+          </p:style>
+        </p:cxnSp>
+        <p:cxnSp>
+          <p:nvCxnSpPr>
+            <p:cNvPr id="154" name="Straight Connector 153"/>
+            <p:cNvCxnSpPr>
+              <a:cxnSpLocks/>
+            </p:cNvCxnSpPr>
+            <p:nvPr/>
+          </p:nvCxnSpPr>
+          <p:spPr>
+            <a:xfrm rot="16200000">
+              <a:off x="1282397" y="2785262"/>
+              <a:ext cx="616290" cy="0"/>
+            </a:xfrm>
+            <a:prstGeom prst="line">
+              <a:avLst/>
+            </a:prstGeom>
+            <a:ln w="38100" cmpd="sng">
+              <a:solidFill>
+                <a:srgbClr val="FF6600"/>
+              </a:solidFill>
+              <a:prstDash val="solid"/>
+              <a:headEnd type="triangle" w="med" len="med"/>
+              <a:tailEnd type="triangle" w="med" len="med"/>
+            </a:ln>
+          </p:spPr>
+          <p:style>
+            <a:lnRef idx="1">
+              <a:schemeClr val="accent1"/>
+            </a:lnRef>
+            <a:fillRef idx="0">
+              <a:schemeClr val="accent1"/>
+            </a:fillRef>
+            <a:effectRef idx="0">
+              <a:schemeClr val="accent1"/>
+            </a:effectRef>
+            <a:fontRef idx="minor">
+              <a:schemeClr val="tx1"/>
+            </a:fontRef>
+          </p:style>
+        </p:cxnSp>
+      </p:grpSp>
+      <p:sp>
+        <p:nvSpPr>
+          <p:cNvPr id="149" name="Rectangle 148"/>
+          <p:cNvSpPr>
+            <a:spLocks noChangeAspect="1"/>
+          </p:cNvSpPr>
+          <p:nvPr/>
+        </p:nvSpPr>
+        <p:spPr>
+          <a:xfrm>
+            <a:off x="2056512" y="2490835"/>
+            <a:ext cx="548545" cy="550800"/>
+          </a:xfrm>
+          <a:prstGeom prst="rect">
+            <a:avLst/>
+          </a:prstGeom>
+          <a:noFill/>
+          <a:ln w="9525">
+            <a:noFill/>
+          </a:ln>
+        </p:spPr>
+        <p:style>
+          <a:lnRef idx="2">
+            <a:schemeClr val="accent1">
+              <a:shade val="50000"/>
+            </a:schemeClr>
+          </a:lnRef>
+          <a:fillRef idx="1">
+            <a:schemeClr val="accent1"/>
+          </a:fillRef>
+          <a:effectRef idx="0">
+            <a:schemeClr val="accent1"/>
+          </a:effectRef>
+          <a:fontRef idx="minor">
+            <a:schemeClr val="lt1"/>
+          </a:fontRef>
+        </p:style>
+        <p:txBody>
+          <a:bodyPr rtlCol="0" anchor="ctr"/>
+          <a:lstStyle/>
+          <a:p>
+            <a:pPr algn="ctr"/>
+            <a:endParaRPr lang="en-US"/>
           </a:p>
         </p:txBody>
       </p:sp>
@@ -19926,7 +21225,7 @@
       </p:grpSp>
       <p:grpSp>
         <p:nvGrpSpPr>
-          <p:cNvPr id="3" name="Group 2"/>
+          <p:cNvPr id="7" name="Group 6"/>
           <p:cNvGrpSpPr/>
           <p:nvPr/>
         </p:nvGrpSpPr>

</xml_diff>

<commit_message>
Removed duplicate shapes in icons file
</commit_message>
<xml_diff>
--- a/doc/Icons-ResizeLab.pptx
+++ b/doc/Icons-ResizeLab.pptx
@@ -18472,304 +18472,6 @@
       </p:sp>
       <p:grpSp>
         <p:nvGrpSpPr>
-          <p:cNvPr id="8" name="Group 7"/>
-          <p:cNvGrpSpPr>
-            <a:grpSpLocks noChangeAspect="1"/>
-          </p:cNvGrpSpPr>
-          <p:nvPr/>
-        </p:nvGrpSpPr>
-        <p:grpSpPr>
-          <a:xfrm>
-            <a:off x="2056512" y="2490835"/>
-            <a:ext cx="548545" cy="550800"/>
-            <a:chOff x="2056512" y="2490835"/>
-            <a:chExt cx="548545" cy="550800"/>
-          </a:xfrm>
-        </p:grpSpPr>
-        <p:grpSp>
-          <p:nvGrpSpPr>
-            <p:cNvPr id="11" name="Group 10"/>
-            <p:cNvGrpSpPr>
-              <a:grpSpLocks noChangeAspect="1"/>
-            </p:cNvGrpSpPr>
-            <p:nvPr/>
-          </p:nvGrpSpPr>
-          <p:grpSpPr>
-            <a:xfrm>
-              <a:off x="2124948" y="2559552"/>
-              <a:ext cx="411673" cy="413366"/>
-              <a:chOff x="1590542" y="2477117"/>
-              <a:chExt cx="763108" cy="616291"/>
-            </a:xfrm>
-          </p:grpSpPr>
-          <p:sp>
-            <p:nvSpPr>
-              <p:cNvPr id="18" name="Rectangle 17"/>
-              <p:cNvSpPr>
-                <a:spLocks/>
-              </p:cNvSpPr>
-              <p:nvPr/>
-            </p:nvSpPr>
-            <p:spPr>
-              <a:xfrm flipV="1">
-                <a:off x="1737360" y="2477117"/>
-                <a:ext cx="616290" cy="434647"/>
-              </a:xfrm>
-              <a:prstGeom prst="rect">
-                <a:avLst/>
-              </a:prstGeom>
-              <a:solidFill>
-                <a:srgbClr val="0070C0"/>
-              </a:solidFill>
-              <a:ln w="19050">
-                <a:solidFill>
-                  <a:srgbClr val="0070C0"/>
-                </a:solidFill>
-                <a:prstDash val="solid"/>
-              </a:ln>
-            </p:spPr>
-            <p:style>
-              <a:lnRef idx="2">
-                <a:schemeClr val="accent1">
-                  <a:shade val="50000"/>
-                </a:schemeClr>
-              </a:lnRef>
-              <a:fillRef idx="1">
-                <a:schemeClr val="accent1"/>
-              </a:fillRef>
-              <a:effectRef idx="0">
-                <a:schemeClr val="accent1"/>
-              </a:effectRef>
-              <a:fontRef idx="minor">
-                <a:schemeClr val="lt1"/>
-              </a:fontRef>
-            </p:style>
-            <p:txBody>
-              <a:bodyPr rtlCol="0" anchor="ctr"/>
-              <a:lstStyle/>
-              <a:p>
-                <a:pPr algn="ctr"/>
-                <a:endParaRPr lang="en-US" sz="1000" b="1" dirty="0"/>
-              </a:p>
-            </p:txBody>
-          </p:sp>
-          <p:sp>
-            <p:nvSpPr>
-              <p:cNvPr id="20" name="Rectangle 19"/>
-              <p:cNvSpPr>
-                <a:spLocks/>
-              </p:cNvSpPr>
-              <p:nvPr/>
-            </p:nvSpPr>
-            <p:spPr>
-              <a:xfrm flipV="1">
-                <a:off x="1737360" y="2785262"/>
-                <a:ext cx="616290" cy="308146"/>
-              </a:xfrm>
-              <a:prstGeom prst="rect">
-                <a:avLst/>
-              </a:prstGeom>
-              <a:solidFill>
-                <a:schemeClr val="bg1"/>
-              </a:solidFill>
-              <a:ln w="19050">
-                <a:solidFill>
-                  <a:srgbClr val="0070C0"/>
-                </a:solidFill>
-              </a:ln>
-            </p:spPr>
-            <p:style>
-              <a:lnRef idx="2">
-                <a:schemeClr val="accent1">
-                  <a:shade val="50000"/>
-                </a:schemeClr>
-              </a:lnRef>
-              <a:fillRef idx="1">
-                <a:schemeClr val="accent1"/>
-              </a:fillRef>
-              <a:effectRef idx="0">
-                <a:schemeClr val="accent1"/>
-              </a:effectRef>
-              <a:fontRef idx="minor">
-                <a:schemeClr val="lt1"/>
-              </a:fontRef>
-            </p:style>
-            <p:txBody>
-              <a:bodyPr rtlCol="0" anchor="ctr"/>
-              <a:lstStyle/>
-              <a:p>
-                <a:pPr algn="ctr"/>
-                <a:endParaRPr lang="en-US" dirty="0"/>
-              </a:p>
-            </p:txBody>
-          </p:sp>
-          <p:cxnSp>
-            <p:nvCxnSpPr>
-              <p:cNvPr id="21" name="Straight Connector 20"/>
-              <p:cNvCxnSpPr>
-                <a:cxnSpLocks/>
-              </p:cNvCxnSpPr>
-              <p:nvPr/>
-            </p:nvCxnSpPr>
-            <p:spPr>
-              <a:xfrm>
-                <a:off x="1737360" y="3093408"/>
-                <a:ext cx="616290" cy="0"/>
-              </a:xfrm>
-              <a:prstGeom prst="line">
-                <a:avLst/>
-              </a:prstGeom>
-              <a:ln w="38100" cmpd="sng">
-                <a:solidFill>
-                  <a:srgbClr val="FF6600"/>
-                </a:solidFill>
-                <a:prstDash val="solid"/>
-                <a:headEnd type="triangle" w="med" len="med"/>
-                <a:tailEnd type="triangle" w="med" len="med"/>
-              </a:ln>
-            </p:spPr>
-            <p:style>
-              <a:lnRef idx="1">
-                <a:schemeClr val="accent1"/>
-              </a:lnRef>
-              <a:fillRef idx="0">
-                <a:schemeClr val="accent1"/>
-              </a:fillRef>
-              <a:effectRef idx="0">
-                <a:schemeClr val="accent1"/>
-              </a:effectRef>
-              <a:fontRef idx="minor">
-                <a:schemeClr val="tx1"/>
-              </a:fontRef>
-            </p:style>
-          </p:cxnSp>
-          <p:cxnSp>
-            <p:nvCxnSpPr>
-              <p:cNvPr id="22" name="Straight Arrow Connector 21"/>
-              <p:cNvCxnSpPr/>
-              <p:nvPr/>
-            </p:nvCxnSpPr>
-            <p:spPr>
-              <a:xfrm flipV="1">
-                <a:off x="2045505" y="2537922"/>
-                <a:ext cx="0" cy="213425"/>
-              </a:xfrm>
-              <a:prstGeom prst="straightConnector1">
-                <a:avLst/>
-              </a:prstGeom>
-              <a:ln w="38100">
-                <a:solidFill>
-                  <a:schemeClr val="bg1"/>
-                </a:solidFill>
-                <a:headEnd type="none" w="med" len="med"/>
-                <a:tailEnd type="triangle" w="med" len="med"/>
-              </a:ln>
-            </p:spPr>
-            <p:style>
-              <a:lnRef idx="1">
-                <a:schemeClr val="accent1"/>
-              </a:lnRef>
-              <a:fillRef idx="0">
-                <a:schemeClr val="accent1"/>
-              </a:fillRef>
-              <a:effectRef idx="0">
-                <a:schemeClr val="accent1"/>
-              </a:effectRef>
-              <a:fontRef idx="minor">
-                <a:schemeClr val="tx1"/>
-              </a:fontRef>
-            </p:style>
-          </p:cxnSp>
-          <p:cxnSp>
-            <p:nvCxnSpPr>
-              <p:cNvPr id="30" name="Straight Connector 29"/>
-              <p:cNvCxnSpPr>
-                <a:cxnSpLocks/>
-              </p:cNvCxnSpPr>
-              <p:nvPr/>
-            </p:nvCxnSpPr>
-            <p:spPr>
-              <a:xfrm rot="16200000">
-                <a:off x="1282397" y="2785262"/>
-                <a:ext cx="616290" cy="0"/>
-              </a:xfrm>
-              <a:prstGeom prst="line">
-                <a:avLst/>
-              </a:prstGeom>
-              <a:ln w="38100" cmpd="sng">
-                <a:solidFill>
-                  <a:srgbClr val="FF6600"/>
-                </a:solidFill>
-                <a:prstDash val="solid"/>
-                <a:headEnd type="triangle" w="med" len="med"/>
-                <a:tailEnd type="triangle" w="med" len="med"/>
-              </a:ln>
-            </p:spPr>
-            <p:style>
-              <a:lnRef idx="1">
-                <a:schemeClr val="accent1"/>
-              </a:lnRef>
-              <a:fillRef idx="0">
-                <a:schemeClr val="accent1"/>
-              </a:fillRef>
-              <a:effectRef idx="0">
-                <a:schemeClr val="accent1"/>
-              </a:effectRef>
-              <a:fontRef idx="minor">
-                <a:schemeClr val="tx1"/>
-              </a:fontRef>
-            </p:style>
-          </p:cxnSp>
-        </p:grpSp>
-        <p:sp>
-          <p:nvSpPr>
-            <p:cNvPr id="50" name="Rectangle 49"/>
-            <p:cNvSpPr>
-              <a:spLocks noChangeAspect="1"/>
-            </p:cNvSpPr>
-            <p:nvPr/>
-          </p:nvSpPr>
-          <p:spPr>
-            <a:xfrm>
-              <a:off x="2056512" y="2490835"/>
-              <a:ext cx="548545" cy="550800"/>
-            </a:xfrm>
-            <a:prstGeom prst="rect">
-              <a:avLst/>
-            </a:prstGeom>
-            <a:noFill/>
-            <a:ln w="9525">
-              <a:noFill/>
-            </a:ln>
-          </p:spPr>
-          <p:style>
-            <a:lnRef idx="2">
-              <a:schemeClr val="accent1">
-                <a:shade val="50000"/>
-              </a:schemeClr>
-            </a:lnRef>
-            <a:fillRef idx="1">
-              <a:schemeClr val="accent1"/>
-            </a:fillRef>
-            <a:effectRef idx="0">
-              <a:schemeClr val="accent1"/>
-            </a:effectRef>
-            <a:fontRef idx="minor">
-              <a:schemeClr val="lt1"/>
-            </a:fontRef>
-          </p:style>
-          <p:txBody>
-            <a:bodyPr rtlCol="0" anchor="ctr"/>
-            <a:lstStyle/>
-            <a:p>
-              <a:pPr algn="ctr"/>
-              <a:endParaRPr lang="en-US"/>
-            </a:p>
-          </p:txBody>
-        </p:sp>
-      </p:grpSp>
-      <p:grpSp>
-        <p:nvGrpSpPr>
           <p:cNvPr id="14" name="Group 13"/>
           <p:cNvGrpSpPr/>
           <p:nvPr/>
@@ -19066,896 +18768,6 @@
       </p:grpSp>
       <p:grpSp>
         <p:nvGrpSpPr>
-          <p:cNvPr id="123" name="Group 7_Copy"/>
-          <p:cNvGrpSpPr/>
-          <p:nvPr/>
-        </p:nvGrpSpPr>
-        <p:grpSpPr>
-          <a:xfrm>
-            <a:off x="2056512" y="2490835"/>
-            <a:ext cx="548545" cy="550800"/>
-            <a:chOff x="2056512" y="2490835"/>
-            <a:chExt cx="548545" cy="550800"/>
-          </a:xfrm>
-        </p:grpSpPr>
-        <p:grpSp>
-          <p:nvGrpSpPr>
-            <p:cNvPr id="124" name="Group 123"/>
-            <p:cNvGrpSpPr>
-              <a:grpSpLocks noChangeAspect="1"/>
-            </p:cNvGrpSpPr>
-            <p:nvPr/>
-          </p:nvGrpSpPr>
-          <p:grpSpPr>
-            <a:xfrm>
-              <a:off x="2124948" y="2559552"/>
-              <a:ext cx="411673" cy="413366"/>
-              <a:chOff x="1590542" y="2477117"/>
-              <a:chExt cx="763108" cy="616291"/>
-            </a:xfrm>
-          </p:grpSpPr>
-          <p:sp>
-            <p:nvSpPr>
-              <p:cNvPr id="126" name="Rectangle 125"/>
-              <p:cNvSpPr>
-                <a:spLocks/>
-              </p:cNvSpPr>
-              <p:nvPr/>
-            </p:nvSpPr>
-            <p:spPr>
-              <a:xfrm flipV="1">
-                <a:off x="1737360" y="2477117"/>
-                <a:ext cx="616290" cy="434647"/>
-              </a:xfrm>
-              <a:prstGeom prst="rect">
-                <a:avLst/>
-              </a:prstGeom>
-              <a:solidFill>
-                <a:srgbClr val="0070C0"/>
-              </a:solidFill>
-              <a:ln w="19050">
-                <a:solidFill>
-                  <a:srgbClr val="0070C0"/>
-                </a:solidFill>
-                <a:prstDash val="solid"/>
-              </a:ln>
-            </p:spPr>
-            <p:style>
-              <a:lnRef idx="2">
-                <a:schemeClr val="accent1">
-                  <a:shade val="50000"/>
-                </a:schemeClr>
-              </a:lnRef>
-              <a:fillRef idx="1">
-                <a:schemeClr val="accent1"/>
-              </a:fillRef>
-              <a:effectRef idx="0">
-                <a:schemeClr val="accent1"/>
-              </a:effectRef>
-              <a:fontRef idx="minor">
-                <a:schemeClr val="lt1"/>
-              </a:fontRef>
-            </p:style>
-            <p:txBody>
-              <a:bodyPr rtlCol="0" anchor="ctr"/>
-              <a:lstStyle/>
-              <a:p>
-                <a:pPr algn="ctr"/>
-                <a:endParaRPr lang="en-US" sz="1000" b="1" dirty="0"/>
-              </a:p>
-            </p:txBody>
-          </p:sp>
-          <p:sp>
-            <p:nvSpPr>
-              <p:cNvPr id="127" name="Rectangle 126"/>
-              <p:cNvSpPr>
-                <a:spLocks/>
-              </p:cNvSpPr>
-              <p:nvPr/>
-            </p:nvSpPr>
-            <p:spPr>
-              <a:xfrm flipV="1">
-                <a:off x="1737360" y="2785262"/>
-                <a:ext cx="616290" cy="308146"/>
-              </a:xfrm>
-              <a:prstGeom prst="rect">
-                <a:avLst/>
-              </a:prstGeom>
-              <a:solidFill>
-                <a:schemeClr val="bg1"/>
-              </a:solidFill>
-              <a:ln w="19050">
-                <a:solidFill>
-                  <a:srgbClr val="0070C0"/>
-                </a:solidFill>
-              </a:ln>
-            </p:spPr>
-            <p:style>
-              <a:lnRef idx="2">
-                <a:schemeClr val="accent1">
-                  <a:shade val="50000"/>
-                </a:schemeClr>
-              </a:lnRef>
-              <a:fillRef idx="1">
-                <a:schemeClr val="accent1"/>
-              </a:fillRef>
-              <a:effectRef idx="0">
-                <a:schemeClr val="accent1"/>
-              </a:effectRef>
-              <a:fontRef idx="minor">
-                <a:schemeClr val="lt1"/>
-              </a:fontRef>
-            </p:style>
-            <p:txBody>
-              <a:bodyPr rtlCol="0" anchor="ctr"/>
-              <a:lstStyle/>
-              <a:p>
-                <a:pPr algn="ctr"/>
-                <a:endParaRPr lang="en-US" dirty="0"/>
-              </a:p>
-            </p:txBody>
-          </p:sp>
-          <p:cxnSp>
-            <p:nvCxnSpPr>
-              <p:cNvPr id="128" name="Straight Connector 127"/>
-              <p:cNvCxnSpPr>
-                <a:cxnSpLocks/>
-              </p:cNvCxnSpPr>
-              <p:nvPr/>
-            </p:nvCxnSpPr>
-            <p:spPr>
-              <a:xfrm>
-                <a:off x="1737360" y="3093408"/>
-                <a:ext cx="616290" cy="0"/>
-              </a:xfrm>
-              <a:prstGeom prst="line">
-                <a:avLst/>
-              </a:prstGeom>
-              <a:ln w="38100" cmpd="sng">
-                <a:solidFill>
-                  <a:srgbClr val="FF6600"/>
-                </a:solidFill>
-                <a:prstDash val="solid"/>
-                <a:headEnd type="triangle" w="med" len="med"/>
-                <a:tailEnd type="triangle" w="med" len="med"/>
-              </a:ln>
-            </p:spPr>
-            <p:style>
-              <a:lnRef idx="1">
-                <a:schemeClr val="accent1"/>
-              </a:lnRef>
-              <a:fillRef idx="0">
-                <a:schemeClr val="accent1"/>
-              </a:fillRef>
-              <a:effectRef idx="0">
-                <a:schemeClr val="accent1"/>
-              </a:effectRef>
-              <a:fontRef idx="minor">
-                <a:schemeClr val="tx1"/>
-              </a:fontRef>
-            </p:style>
-          </p:cxnSp>
-          <p:cxnSp>
-            <p:nvCxnSpPr>
-              <p:cNvPr id="129" name="Straight Arrow Connector 128"/>
-              <p:cNvCxnSpPr/>
-              <p:nvPr/>
-            </p:nvCxnSpPr>
-            <p:spPr>
-              <a:xfrm flipV="1">
-                <a:off x="2045505" y="2537922"/>
-                <a:ext cx="0" cy="213425"/>
-              </a:xfrm>
-              <a:prstGeom prst="straightConnector1">
-                <a:avLst/>
-              </a:prstGeom>
-              <a:ln w="38100">
-                <a:solidFill>
-                  <a:schemeClr val="bg1"/>
-                </a:solidFill>
-                <a:headEnd type="none" w="med" len="med"/>
-                <a:tailEnd type="triangle" w="med" len="med"/>
-              </a:ln>
-            </p:spPr>
-            <p:style>
-              <a:lnRef idx="1">
-                <a:schemeClr val="accent1"/>
-              </a:lnRef>
-              <a:fillRef idx="0">
-                <a:schemeClr val="accent1"/>
-              </a:fillRef>
-              <a:effectRef idx="0">
-                <a:schemeClr val="accent1"/>
-              </a:effectRef>
-              <a:fontRef idx="minor">
-                <a:schemeClr val="tx1"/>
-              </a:fontRef>
-            </p:style>
-          </p:cxnSp>
-          <p:cxnSp>
-            <p:nvCxnSpPr>
-              <p:cNvPr id="130" name="Straight Connector 129"/>
-              <p:cNvCxnSpPr>
-                <a:cxnSpLocks/>
-              </p:cNvCxnSpPr>
-              <p:nvPr/>
-            </p:nvCxnSpPr>
-            <p:spPr>
-              <a:xfrm rot="16200000">
-                <a:off x="1282397" y="2785262"/>
-                <a:ext cx="616290" cy="0"/>
-              </a:xfrm>
-              <a:prstGeom prst="line">
-                <a:avLst/>
-              </a:prstGeom>
-              <a:ln w="38100" cmpd="sng">
-                <a:solidFill>
-                  <a:srgbClr val="FF6600"/>
-                </a:solidFill>
-                <a:prstDash val="solid"/>
-                <a:headEnd type="triangle" w="med" len="med"/>
-                <a:tailEnd type="triangle" w="med" len="med"/>
-              </a:ln>
-            </p:spPr>
-            <p:style>
-              <a:lnRef idx="1">
-                <a:schemeClr val="accent1"/>
-              </a:lnRef>
-              <a:fillRef idx="0">
-                <a:schemeClr val="accent1"/>
-              </a:fillRef>
-              <a:effectRef idx="0">
-                <a:schemeClr val="accent1"/>
-              </a:effectRef>
-              <a:fontRef idx="minor">
-                <a:schemeClr val="tx1"/>
-              </a:fontRef>
-            </p:style>
-          </p:cxnSp>
-        </p:grpSp>
-        <p:sp>
-          <p:nvSpPr>
-            <p:cNvPr id="125" name="Rectangle 124"/>
-            <p:cNvSpPr>
-              <a:spLocks noChangeAspect="1"/>
-            </p:cNvSpPr>
-            <p:nvPr/>
-          </p:nvSpPr>
-          <p:spPr>
-            <a:xfrm>
-              <a:off x="2056512" y="2490835"/>
-              <a:ext cx="548545" cy="550800"/>
-            </a:xfrm>
-            <a:prstGeom prst="rect">
-              <a:avLst/>
-            </a:prstGeom>
-            <a:noFill/>
-            <a:ln w="9525">
-              <a:noFill/>
-            </a:ln>
-          </p:spPr>
-          <p:style>
-            <a:lnRef idx="2">
-              <a:schemeClr val="accent1">
-                <a:shade val="50000"/>
-              </a:schemeClr>
-            </a:lnRef>
-            <a:fillRef idx="1">
-              <a:schemeClr val="accent1"/>
-            </a:fillRef>
-            <a:effectRef idx="0">
-              <a:schemeClr val="accent1"/>
-            </a:effectRef>
-            <a:fontRef idx="minor">
-              <a:schemeClr val="lt1"/>
-            </a:fontRef>
-          </p:style>
-          <p:txBody>
-            <a:bodyPr rtlCol="0" anchor="ctr"/>
-            <a:lstStyle/>
-            <a:p>
-              <a:pPr algn="ctr"/>
-              <a:endParaRPr lang="en-US"/>
-            </a:p>
-          </p:txBody>
-        </p:sp>
-      </p:grpSp>
-      <p:grpSp>
-        <p:nvGrpSpPr>
-          <p:cNvPr id="131" name="Group 7_Copy"/>
-          <p:cNvGrpSpPr/>
-          <p:nvPr/>
-        </p:nvGrpSpPr>
-        <p:grpSpPr>
-          <a:xfrm>
-            <a:off x="2056512" y="2490835"/>
-            <a:ext cx="548545" cy="550800"/>
-            <a:chOff x="2056512" y="2490835"/>
-            <a:chExt cx="548545" cy="550800"/>
-          </a:xfrm>
-        </p:grpSpPr>
-        <p:grpSp>
-          <p:nvGrpSpPr>
-            <p:cNvPr id="132" name="Group 131"/>
-            <p:cNvGrpSpPr>
-              <a:grpSpLocks noChangeAspect="1"/>
-            </p:cNvGrpSpPr>
-            <p:nvPr/>
-          </p:nvGrpSpPr>
-          <p:grpSpPr>
-            <a:xfrm>
-              <a:off x="2124948" y="2559552"/>
-              <a:ext cx="411673" cy="413366"/>
-              <a:chOff x="1590542" y="2477117"/>
-              <a:chExt cx="763108" cy="616291"/>
-            </a:xfrm>
-          </p:grpSpPr>
-          <p:sp>
-            <p:nvSpPr>
-              <p:cNvPr id="134" name="Rectangle 133"/>
-              <p:cNvSpPr>
-                <a:spLocks/>
-              </p:cNvSpPr>
-              <p:nvPr/>
-            </p:nvSpPr>
-            <p:spPr>
-              <a:xfrm flipV="1">
-                <a:off x="1737360" y="2477117"/>
-                <a:ext cx="616290" cy="434647"/>
-              </a:xfrm>
-              <a:prstGeom prst="rect">
-                <a:avLst/>
-              </a:prstGeom>
-              <a:solidFill>
-                <a:srgbClr val="0070C0"/>
-              </a:solidFill>
-              <a:ln w="19050">
-                <a:solidFill>
-                  <a:srgbClr val="0070C0"/>
-                </a:solidFill>
-                <a:prstDash val="solid"/>
-              </a:ln>
-            </p:spPr>
-            <p:style>
-              <a:lnRef idx="2">
-                <a:schemeClr val="accent1">
-                  <a:shade val="50000"/>
-                </a:schemeClr>
-              </a:lnRef>
-              <a:fillRef idx="1">
-                <a:schemeClr val="accent1"/>
-              </a:fillRef>
-              <a:effectRef idx="0">
-                <a:schemeClr val="accent1"/>
-              </a:effectRef>
-              <a:fontRef idx="minor">
-                <a:schemeClr val="lt1"/>
-              </a:fontRef>
-            </p:style>
-            <p:txBody>
-              <a:bodyPr rtlCol="0" anchor="ctr"/>
-              <a:lstStyle/>
-              <a:p>
-                <a:pPr algn="ctr"/>
-                <a:endParaRPr lang="en-US" sz="1000" b="1" dirty="0"/>
-              </a:p>
-            </p:txBody>
-          </p:sp>
-          <p:sp>
-            <p:nvSpPr>
-              <p:cNvPr id="135" name="Rectangle 134"/>
-              <p:cNvSpPr>
-                <a:spLocks/>
-              </p:cNvSpPr>
-              <p:nvPr/>
-            </p:nvSpPr>
-            <p:spPr>
-              <a:xfrm flipV="1">
-                <a:off x="1737360" y="2785262"/>
-                <a:ext cx="616290" cy="308146"/>
-              </a:xfrm>
-              <a:prstGeom prst="rect">
-                <a:avLst/>
-              </a:prstGeom>
-              <a:solidFill>
-                <a:schemeClr val="bg1"/>
-              </a:solidFill>
-              <a:ln w="19050">
-                <a:solidFill>
-                  <a:srgbClr val="0070C0"/>
-                </a:solidFill>
-              </a:ln>
-            </p:spPr>
-            <p:style>
-              <a:lnRef idx="2">
-                <a:schemeClr val="accent1">
-                  <a:shade val="50000"/>
-                </a:schemeClr>
-              </a:lnRef>
-              <a:fillRef idx="1">
-                <a:schemeClr val="accent1"/>
-              </a:fillRef>
-              <a:effectRef idx="0">
-                <a:schemeClr val="accent1"/>
-              </a:effectRef>
-              <a:fontRef idx="minor">
-                <a:schemeClr val="lt1"/>
-              </a:fontRef>
-            </p:style>
-            <p:txBody>
-              <a:bodyPr rtlCol="0" anchor="ctr"/>
-              <a:lstStyle/>
-              <a:p>
-                <a:pPr algn="ctr"/>
-                <a:endParaRPr lang="en-US" dirty="0"/>
-              </a:p>
-            </p:txBody>
-          </p:sp>
-          <p:cxnSp>
-            <p:nvCxnSpPr>
-              <p:cNvPr id="136" name="Straight Connector 135"/>
-              <p:cNvCxnSpPr>
-                <a:cxnSpLocks/>
-              </p:cNvCxnSpPr>
-              <p:nvPr/>
-            </p:nvCxnSpPr>
-            <p:spPr>
-              <a:xfrm>
-                <a:off x="1737360" y="3093408"/>
-                <a:ext cx="616290" cy="0"/>
-              </a:xfrm>
-              <a:prstGeom prst="line">
-                <a:avLst/>
-              </a:prstGeom>
-              <a:ln w="38100" cmpd="sng">
-                <a:solidFill>
-                  <a:srgbClr val="FF6600"/>
-                </a:solidFill>
-                <a:prstDash val="solid"/>
-                <a:headEnd type="triangle" w="med" len="med"/>
-                <a:tailEnd type="triangle" w="med" len="med"/>
-              </a:ln>
-            </p:spPr>
-            <p:style>
-              <a:lnRef idx="1">
-                <a:schemeClr val="accent1"/>
-              </a:lnRef>
-              <a:fillRef idx="0">
-                <a:schemeClr val="accent1"/>
-              </a:fillRef>
-              <a:effectRef idx="0">
-                <a:schemeClr val="accent1"/>
-              </a:effectRef>
-              <a:fontRef idx="minor">
-                <a:schemeClr val="tx1"/>
-              </a:fontRef>
-            </p:style>
-          </p:cxnSp>
-          <p:cxnSp>
-            <p:nvCxnSpPr>
-              <p:cNvPr id="137" name="Straight Arrow Connector 136"/>
-              <p:cNvCxnSpPr/>
-              <p:nvPr/>
-            </p:nvCxnSpPr>
-            <p:spPr>
-              <a:xfrm flipV="1">
-                <a:off x="2045505" y="2537922"/>
-                <a:ext cx="0" cy="213425"/>
-              </a:xfrm>
-              <a:prstGeom prst="straightConnector1">
-                <a:avLst/>
-              </a:prstGeom>
-              <a:ln w="38100">
-                <a:solidFill>
-                  <a:schemeClr val="bg1"/>
-                </a:solidFill>
-                <a:headEnd type="none" w="med" len="med"/>
-                <a:tailEnd type="triangle" w="med" len="med"/>
-              </a:ln>
-            </p:spPr>
-            <p:style>
-              <a:lnRef idx="1">
-                <a:schemeClr val="accent1"/>
-              </a:lnRef>
-              <a:fillRef idx="0">
-                <a:schemeClr val="accent1"/>
-              </a:fillRef>
-              <a:effectRef idx="0">
-                <a:schemeClr val="accent1"/>
-              </a:effectRef>
-              <a:fontRef idx="minor">
-                <a:schemeClr val="tx1"/>
-              </a:fontRef>
-            </p:style>
-          </p:cxnSp>
-          <p:cxnSp>
-            <p:nvCxnSpPr>
-              <p:cNvPr id="138" name="Straight Connector 137"/>
-              <p:cNvCxnSpPr>
-                <a:cxnSpLocks/>
-              </p:cNvCxnSpPr>
-              <p:nvPr/>
-            </p:nvCxnSpPr>
-            <p:spPr>
-              <a:xfrm rot="16200000">
-                <a:off x="1282397" y="2785262"/>
-                <a:ext cx="616290" cy="0"/>
-              </a:xfrm>
-              <a:prstGeom prst="line">
-                <a:avLst/>
-              </a:prstGeom>
-              <a:ln w="38100" cmpd="sng">
-                <a:solidFill>
-                  <a:srgbClr val="FF6600"/>
-                </a:solidFill>
-                <a:prstDash val="solid"/>
-                <a:headEnd type="triangle" w="med" len="med"/>
-                <a:tailEnd type="triangle" w="med" len="med"/>
-              </a:ln>
-            </p:spPr>
-            <p:style>
-              <a:lnRef idx="1">
-                <a:schemeClr val="accent1"/>
-              </a:lnRef>
-              <a:fillRef idx="0">
-                <a:schemeClr val="accent1"/>
-              </a:fillRef>
-              <a:effectRef idx="0">
-                <a:schemeClr val="accent1"/>
-              </a:effectRef>
-              <a:fontRef idx="minor">
-                <a:schemeClr val="tx1"/>
-              </a:fontRef>
-            </p:style>
-          </p:cxnSp>
-        </p:grpSp>
-        <p:sp>
-          <p:nvSpPr>
-            <p:cNvPr id="133" name="Rectangle 132"/>
-            <p:cNvSpPr>
-              <a:spLocks noChangeAspect="1"/>
-            </p:cNvSpPr>
-            <p:nvPr/>
-          </p:nvSpPr>
-          <p:spPr>
-            <a:xfrm>
-              <a:off x="2056512" y="2490835"/>
-              <a:ext cx="548545" cy="550800"/>
-            </a:xfrm>
-            <a:prstGeom prst="rect">
-              <a:avLst/>
-            </a:prstGeom>
-            <a:noFill/>
-            <a:ln w="9525">
-              <a:noFill/>
-            </a:ln>
-          </p:spPr>
-          <p:style>
-            <a:lnRef idx="2">
-              <a:schemeClr val="accent1">
-                <a:shade val="50000"/>
-              </a:schemeClr>
-            </a:lnRef>
-            <a:fillRef idx="1">
-              <a:schemeClr val="accent1"/>
-            </a:fillRef>
-            <a:effectRef idx="0">
-              <a:schemeClr val="accent1"/>
-            </a:effectRef>
-            <a:fontRef idx="minor">
-              <a:schemeClr val="lt1"/>
-            </a:fontRef>
-          </p:style>
-          <p:txBody>
-            <a:bodyPr rtlCol="0" anchor="ctr"/>
-            <a:lstStyle/>
-            <a:p>
-              <a:pPr algn="ctr"/>
-              <a:endParaRPr lang="en-US"/>
-            </a:p>
-          </p:txBody>
-        </p:sp>
-      </p:grpSp>
-      <p:grpSp>
-        <p:nvGrpSpPr>
-          <p:cNvPr id="139" name="Group 7_Copy"/>
-          <p:cNvGrpSpPr>
-            <a:grpSpLocks noChangeAspect="1"/>
-          </p:cNvGrpSpPr>
-          <p:nvPr/>
-        </p:nvGrpSpPr>
-        <p:grpSpPr>
-          <a:xfrm>
-            <a:off x="2056512" y="2490835"/>
-            <a:ext cx="548545" cy="550800"/>
-            <a:chOff x="2056512" y="2490835"/>
-            <a:chExt cx="548545" cy="550800"/>
-          </a:xfrm>
-        </p:grpSpPr>
-        <p:grpSp>
-          <p:nvGrpSpPr>
-            <p:cNvPr id="140" name="Group 139"/>
-            <p:cNvGrpSpPr>
-              <a:grpSpLocks noChangeAspect="1"/>
-            </p:cNvGrpSpPr>
-            <p:nvPr/>
-          </p:nvGrpSpPr>
-          <p:grpSpPr>
-            <a:xfrm>
-              <a:off x="2124948" y="2559552"/>
-              <a:ext cx="411673" cy="413366"/>
-              <a:chOff x="1590542" y="2477117"/>
-              <a:chExt cx="763108" cy="616291"/>
-            </a:xfrm>
-          </p:grpSpPr>
-          <p:sp>
-            <p:nvSpPr>
-              <p:cNvPr id="142" name="Rectangle 141"/>
-              <p:cNvSpPr>
-                <a:spLocks/>
-              </p:cNvSpPr>
-              <p:nvPr/>
-            </p:nvSpPr>
-            <p:spPr>
-              <a:xfrm flipV="1">
-                <a:off x="1737360" y="2477117"/>
-                <a:ext cx="616290" cy="434647"/>
-              </a:xfrm>
-              <a:prstGeom prst="rect">
-                <a:avLst/>
-              </a:prstGeom>
-              <a:solidFill>
-                <a:srgbClr val="0070C0"/>
-              </a:solidFill>
-              <a:ln w="19050">
-                <a:solidFill>
-                  <a:srgbClr val="0070C0"/>
-                </a:solidFill>
-                <a:prstDash val="solid"/>
-              </a:ln>
-            </p:spPr>
-            <p:style>
-              <a:lnRef idx="2">
-                <a:schemeClr val="accent1">
-                  <a:shade val="50000"/>
-                </a:schemeClr>
-              </a:lnRef>
-              <a:fillRef idx="1">
-                <a:schemeClr val="accent1"/>
-              </a:fillRef>
-              <a:effectRef idx="0">
-                <a:schemeClr val="accent1"/>
-              </a:effectRef>
-              <a:fontRef idx="minor">
-                <a:schemeClr val="lt1"/>
-              </a:fontRef>
-            </p:style>
-            <p:txBody>
-              <a:bodyPr rtlCol="0" anchor="ctr"/>
-              <a:lstStyle/>
-              <a:p>
-                <a:pPr algn="ctr"/>
-                <a:endParaRPr lang="en-US" sz="1000" b="1" dirty="0"/>
-              </a:p>
-            </p:txBody>
-          </p:sp>
-          <p:sp>
-            <p:nvSpPr>
-              <p:cNvPr id="143" name="Rectangle 142"/>
-              <p:cNvSpPr>
-                <a:spLocks/>
-              </p:cNvSpPr>
-              <p:nvPr/>
-            </p:nvSpPr>
-            <p:spPr>
-              <a:xfrm flipV="1">
-                <a:off x="1737360" y="2785262"/>
-                <a:ext cx="616290" cy="308146"/>
-              </a:xfrm>
-              <a:prstGeom prst="rect">
-                <a:avLst/>
-              </a:prstGeom>
-              <a:solidFill>
-                <a:schemeClr val="bg1"/>
-              </a:solidFill>
-              <a:ln w="19050">
-                <a:solidFill>
-                  <a:srgbClr val="0070C0"/>
-                </a:solidFill>
-              </a:ln>
-            </p:spPr>
-            <p:style>
-              <a:lnRef idx="2">
-                <a:schemeClr val="accent1">
-                  <a:shade val="50000"/>
-                </a:schemeClr>
-              </a:lnRef>
-              <a:fillRef idx="1">
-                <a:schemeClr val="accent1"/>
-              </a:fillRef>
-              <a:effectRef idx="0">
-                <a:schemeClr val="accent1"/>
-              </a:effectRef>
-              <a:fontRef idx="minor">
-                <a:schemeClr val="lt1"/>
-              </a:fontRef>
-            </p:style>
-            <p:txBody>
-              <a:bodyPr rtlCol="0" anchor="ctr"/>
-              <a:lstStyle/>
-              <a:p>
-                <a:pPr algn="ctr"/>
-                <a:endParaRPr lang="en-US" dirty="0"/>
-              </a:p>
-            </p:txBody>
-          </p:sp>
-          <p:cxnSp>
-            <p:nvCxnSpPr>
-              <p:cNvPr id="144" name="Straight Connector 143"/>
-              <p:cNvCxnSpPr>
-                <a:cxnSpLocks/>
-              </p:cNvCxnSpPr>
-              <p:nvPr/>
-            </p:nvCxnSpPr>
-            <p:spPr>
-              <a:xfrm>
-                <a:off x="1737360" y="3093408"/>
-                <a:ext cx="616290" cy="0"/>
-              </a:xfrm>
-              <a:prstGeom prst="line">
-                <a:avLst/>
-              </a:prstGeom>
-              <a:ln w="38100" cmpd="sng">
-                <a:solidFill>
-                  <a:srgbClr val="FF6600"/>
-                </a:solidFill>
-                <a:prstDash val="solid"/>
-                <a:headEnd type="triangle" w="med" len="med"/>
-                <a:tailEnd type="triangle" w="med" len="med"/>
-              </a:ln>
-            </p:spPr>
-            <p:style>
-              <a:lnRef idx="1">
-                <a:schemeClr val="accent1"/>
-              </a:lnRef>
-              <a:fillRef idx="0">
-                <a:schemeClr val="accent1"/>
-              </a:fillRef>
-              <a:effectRef idx="0">
-                <a:schemeClr val="accent1"/>
-              </a:effectRef>
-              <a:fontRef idx="minor">
-                <a:schemeClr val="tx1"/>
-              </a:fontRef>
-            </p:style>
-          </p:cxnSp>
-          <p:cxnSp>
-            <p:nvCxnSpPr>
-              <p:cNvPr id="145" name="Straight Arrow Connector 144"/>
-              <p:cNvCxnSpPr/>
-              <p:nvPr/>
-            </p:nvCxnSpPr>
-            <p:spPr>
-              <a:xfrm flipV="1">
-                <a:off x="2045505" y="2537922"/>
-                <a:ext cx="0" cy="213425"/>
-              </a:xfrm>
-              <a:prstGeom prst="straightConnector1">
-                <a:avLst/>
-              </a:prstGeom>
-              <a:ln w="38100">
-                <a:solidFill>
-                  <a:schemeClr val="bg1"/>
-                </a:solidFill>
-                <a:headEnd type="none" w="med" len="med"/>
-                <a:tailEnd type="triangle" w="med" len="med"/>
-              </a:ln>
-            </p:spPr>
-            <p:style>
-              <a:lnRef idx="1">
-                <a:schemeClr val="accent1"/>
-              </a:lnRef>
-              <a:fillRef idx="0">
-                <a:schemeClr val="accent1"/>
-              </a:fillRef>
-              <a:effectRef idx="0">
-                <a:schemeClr val="accent1"/>
-              </a:effectRef>
-              <a:fontRef idx="minor">
-                <a:schemeClr val="tx1"/>
-              </a:fontRef>
-            </p:style>
-          </p:cxnSp>
-          <p:cxnSp>
-            <p:nvCxnSpPr>
-              <p:cNvPr id="146" name="Straight Connector 145"/>
-              <p:cNvCxnSpPr>
-                <a:cxnSpLocks/>
-              </p:cNvCxnSpPr>
-              <p:nvPr/>
-            </p:nvCxnSpPr>
-            <p:spPr>
-              <a:xfrm rot="16200000">
-                <a:off x="1282397" y="2785262"/>
-                <a:ext cx="616290" cy="0"/>
-              </a:xfrm>
-              <a:prstGeom prst="line">
-                <a:avLst/>
-              </a:prstGeom>
-              <a:ln w="38100" cmpd="sng">
-                <a:solidFill>
-                  <a:srgbClr val="FF6600"/>
-                </a:solidFill>
-                <a:prstDash val="solid"/>
-                <a:headEnd type="triangle" w="med" len="med"/>
-                <a:tailEnd type="triangle" w="med" len="med"/>
-              </a:ln>
-            </p:spPr>
-            <p:style>
-              <a:lnRef idx="1">
-                <a:schemeClr val="accent1"/>
-              </a:lnRef>
-              <a:fillRef idx="0">
-                <a:schemeClr val="accent1"/>
-              </a:fillRef>
-              <a:effectRef idx="0">
-                <a:schemeClr val="accent1"/>
-              </a:effectRef>
-              <a:fontRef idx="minor">
-                <a:schemeClr val="tx1"/>
-              </a:fontRef>
-            </p:style>
-          </p:cxnSp>
-        </p:grpSp>
-        <p:sp>
-          <p:nvSpPr>
-            <p:cNvPr id="141" name="Rectangle 140"/>
-            <p:cNvSpPr>
-              <a:spLocks noChangeAspect="1"/>
-            </p:cNvSpPr>
-            <p:nvPr/>
-          </p:nvSpPr>
-          <p:spPr>
-            <a:xfrm>
-              <a:off x="2056512" y="2490835"/>
-              <a:ext cx="548545" cy="550800"/>
-            </a:xfrm>
-            <a:prstGeom prst="rect">
-              <a:avLst/>
-            </a:prstGeom>
-            <a:noFill/>
-            <a:ln w="9525">
-              <a:noFill/>
-            </a:ln>
-          </p:spPr>
-          <p:style>
-            <a:lnRef idx="2">
-              <a:schemeClr val="accent1">
-                <a:shade val="50000"/>
-              </a:schemeClr>
-            </a:lnRef>
-            <a:fillRef idx="1">
-              <a:schemeClr val="accent1"/>
-            </a:fillRef>
-            <a:effectRef idx="0">
-              <a:schemeClr val="accent1"/>
-            </a:effectRef>
-            <a:fontRef idx="minor">
-              <a:schemeClr val="lt1"/>
-            </a:fontRef>
-          </p:style>
-          <p:txBody>
-            <a:bodyPr rtlCol="0" anchor="ctr"/>
-            <a:lstStyle/>
-            <a:p>
-              <a:pPr algn="ctr"/>
-              <a:endParaRPr lang="en-US"/>
-            </a:p>
-          </p:txBody>
-        </p:sp>
-      </p:grpSp>
-      <p:grpSp>
-        <p:nvGrpSpPr>
           <p:cNvPr id="148" name="Group 147"/>
           <p:cNvGrpSpPr>
             <a:grpSpLocks noChangeAspect="1"/>
@@ -19964,7 +18776,7 @@
         </p:nvGrpSpPr>
         <p:grpSpPr>
           <a:xfrm>
-            <a:off x="2124948" y="2559552"/>
+            <a:off x="2028617" y="2535522"/>
             <a:ext cx="411673" cy="413366"/>
             <a:chOff x="1590542" y="2477117"/>
             <a:chExt cx="763108" cy="616291"/>

</xml_diff>

<commit_message>
Added UI for Adjust Proportionally, set default resize factor to 1.5, updated icons file
</commit_message>
<xml_diff>
--- a/doc/Icons-ResizeLab.pptx
+++ b/doc/Icons-ResizeLab.pptx
@@ -215,7 +215,7 @@
           <a:p>
             <a:fld id="{6699ACB9-486C-4D62-A3A7-AF98E13EFDA3}" type="datetimeFigureOut">
               <a:rPr lang="en-US" smtClean="0"/>
-              <a:t>3/24/2016</a:t>
+              <a:t>3/29/2016</a:t>
             </a:fld>
             <a:endParaRPr lang="en-US"/>
           </a:p>
@@ -917,7 +917,7 @@
             <a:fld id="{1D8BD707-D9CF-40AE-B4C6-C98DA3205C09}" type="datetimeFigureOut">
               <a:rPr lang="en-US" smtClean="0"/>
               <a:pPr/>
-              <a:t>3/24/2016</a:t>
+              <a:t>3/29/2016</a:t>
             </a:fld>
             <a:endParaRPr lang="en-US"/>
           </a:p>
@@ -1084,7 +1084,7 @@
             <a:fld id="{1D8BD707-D9CF-40AE-B4C6-C98DA3205C09}" type="datetimeFigureOut">
               <a:rPr lang="en-US" smtClean="0"/>
               <a:pPr/>
-              <a:t>3/24/2016</a:t>
+              <a:t>3/29/2016</a:t>
             </a:fld>
             <a:endParaRPr lang="en-US"/>
           </a:p>
@@ -1261,7 +1261,7 @@
             <a:fld id="{1D8BD707-D9CF-40AE-B4C6-C98DA3205C09}" type="datetimeFigureOut">
               <a:rPr lang="en-US" smtClean="0"/>
               <a:pPr/>
-              <a:t>3/24/2016</a:t>
+              <a:t>3/29/2016</a:t>
             </a:fld>
             <a:endParaRPr lang="en-US"/>
           </a:p>
@@ -1428,7 +1428,7 @@
             <a:fld id="{1D8BD707-D9CF-40AE-B4C6-C98DA3205C09}" type="datetimeFigureOut">
               <a:rPr lang="en-US" smtClean="0"/>
               <a:pPr/>
-              <a:t>3/24/2016</a:t>
+              <a:t>3/29/2016</a:t>
             </a:fld>
             <a:endParaRPr lang="en-US"/>
           </a:p>
@@ -1671,7 +1671,7 @@
             <a:fld id="{1D8BD707-D9CF-40AE-B4C6-C98DA3205C09}" type="datetimeFigureOut">
               <a:rPr lang="en-US" smtClean="0"/>
               <a:pPr/>
-              <a:t>3/24/2016</a:t>
+              <a:t>3/29/2016</a:t>
             </a:fld>
             <a:endParaRPr lang="en-US"/>
           </a:p>
@@ -1956,7 +1956,7 @@
             <a:fld id="{1D8BD707-D9CF-40AE-B4C6-C98DA3205C09}" type="datetimeFigureOut">
               <a:rPr lang="en-US" smtClean="0"/>
               <a:pPr/>
-              <a:t>3/24/2016</a:t>
+              <a:t>3/29/2016</a:t>
             </a:fld>
             <a:endParaRPr lang="en-US"/>
           </a:p>
@@ -2375,7 +2375,7 @@
             <a:fld id="{1D8BD707-D9CF-40AE-B4C6-C98DA3205C09}" type="datetimeFigureOut">
               <a:rPr lang="en-US" smtClean="0"/>
               <a:pPr/>
-              <a:t>3/24/2016</a:t>
+              <a:t>3/29/2016</a:t>
             </a:fld>
             <a:endParaRPr lang="en-US"/>
           </a:p>
@@ -2490,7 +2490,7 @@
             <a:fld id="{1D8BD707-D9CF-40AE-B4C6-C98DA3205C09}" type="datetimeFigureOut">
               <a:rPr lang="en-US" smtClean="0"/>
               <a:pPr/>
-              <a:t>3/24/2016</a:t>
+              <a:t>3/29/2016</a:t>
             </a:fld>
             <a:endParaRPr lang="en-US"/>
           </a:p>
@@ -2582,7 +2582,7 @@
             <a:fld id="{1D8BD707-D9CF-40AE-B4C6-C98DA3205C09}" type="datetimeFigureOut">
               <a:rPr lang="en-US" smtClean="0"/>
               <a:pPr/>
-              <a:t>3/24/2016</a:t>
+              <a:t>3/29/2016</a:t>
             </a:fld>
             <a:endParaRPr lang="en-US"/>
           </a:p>
@@ -2856,7 +2856,7 @@
             <a:fld id="{1D8BD707-D9CF-40AE-B4C6-C98DA3205C09}" type="datetimeFigureOut">
               <a:rPr lang="en-US" smtClean="0"/>
               <a:pPr/>
-              <a:t>3/24/2016</a:t>
+              <a:t>3/29/2016</a:t>
             </a:fld>
             <a:endParaRPr lang="en-US"/>
           </a:p>
@@ -3106,7 +3106,7 @@
             <a:fld id="{1D8BD707-D9CF-40AE-B4C6-C98DA3205C09}" type="datetimeFigureOut">
               <a:rPr lang="en-US" smtClean="0"/>
               <a:pPr/>
-              <a:t>3/24/2016</a:t>
+              <a:t>3/29/2016</a:t>
             </a:fld>
             <a:endParaRPr lang="en-US"/>
           </a:p>
@@ -3321,7 +3321,7 @@
             <a:fld id="{1D8BD707-D9CF-40AE-B4C6-C98DA3205C09}" type="datetimeFigureOut">
               <a:rPr lang="en-US" smtClean="0"/>
               <a:pPr/>
-              <a:t>3/24/2016</a:t>
+              <a:t>3/29/2016</a:t>
             </a:fld>
             <a:endParaRPr lang="en-US"/>
           </a:p>
@@ -20037,7 +20037,7 @@
       </p:grpSp>
       <p:grpSp>
         <p:nvGrpSpPr>
-          <p:cNvPr id="7" name="Group 6"/>
+          <p:cNvPr id="3" name="Group 2"/>
           <p:cNvGrpSpPr/>
           <p:nvPr/>
         </p:nvGrpSpPr>
@@ -20059,7 +20059,7 @@
           </p:nvGrpSpPr>
           <p:grpSpPr>
             <a:xfrm>
-              <a:off x="1324914" y="3444911"/>
+              <a:off x="1324913" y="3446711"/>
               <a:ext cx="504000" cy="504001"/>
               <a:chOff x="2033802" y="3546473"/>
               <a:chExt cx="553819" cy="510616"/>
@@ -20506,278 +20506,6 @@
       </p:sp>
       <p:grpSp>
         <p:nvGrpSpPr>
-          <p:cNvPr id="66" name="Group 65"/>
-          <p:cNvGrpSpPr/>
-          <p:nvPr/>
-        </p:nvGrpSpPr>
-        <p:grpSpPr>
-          <a:xfrm>
-            <a:off x="2033804" y="3546474"/>
-            <a:ext cx="553819" cy="550544"/>
-            <a:chOff x="2033804" y="3546474"/>
-            <a:chExt cx="553819" cy="550544"/>
-          </a:xfrm>
-        </p:grpSpPr>
-        <p:sp>
-          <p:nvSpPr>
-            <p:cNvPr id="59" name="Rectangle 58"/>
-            <p:cNvSpPr>
-              <a:spLocks/>
-            </p:cNvSpPr>
-            <p:nvPr/>
-          </p:nvSpPr>
-          <p:spPr>
-            <a:xfrm rot="10800000" flipV="1">
-              <a:off x="2033804" y="3546474"/>
-              <a:ext cx="553819" cy="259665"/>
-            </a:xfrm>
-            <a:prstGeom prst="rect">
-              <a:avLst/>
-            </a:prstGeom>
-            <a:solidFill>
-              <a:srgbClr val="0070C0"/>
-            </a:solidFill>
-            <a:ln w="19050">
-              <a:solidFill>
-                <a:srgbClr val="0070C0"/>
-              </a:solidFill>
-              <a:miter lim="800000"/>
-            </a:ln>
-          </p:spPr>
-          <p:style>
-            <a:lnRef idx="2">
-              <a:schemeClr val="accent1">
-                <a:shade val="50000"/>
-              </a:schemeClr>
-            </a:lnRef>
-            <a:fillRef idx="1">
-              <a:schemeClr val="accent1"/>
-            </a:fillRef>
-            <a:effectRef idx="0">
-              <a:schemeClr val="accent1"/>
-            </a:effectRef>
-            <a:fontRef idx="minor">
-              <a:schemeClr val="lt1"/>
-            </a:fontRef>
-          </p:style>
-          <p:txBody>
-            <a:bodyPr rtlCol="0" anchor="ctr"/>
-            <a:lstStyle/>
-            <a:p>
-              <a:pPr algn="ctr"/>
-              <a:r>
-                <a:rPr lang="en-US" dirty="0">
-                  <a:solidFill>
-                    <a:schemeClr val="bg1"/>
-                  </a:solidFill>
-                </a:rPr>
-                <a:t>2</a:t>
-              </a:r>
-            </a:p>
-          </p:txBody>
-        </p:sp>
-        <p:sp>
-          <p:nvSpPr>
-            <p:cNvPr id="60" name="Rectangle 59"/>
-            <p:cNvSpPr>
-              <a:spLocks/>
-            </p:cNvSpPr>
-            <p:nvPr/>
-          </p:nvSpPr>
-          <p:spPr>
-            <a:xfrm rot="10800000" flipV="1">
-              <a:off x="2033807" y="3851858"/>
-              <a:ext cx="283261" cy="245160"/>
-            </a:xfrm>
-            <a:prstGeom prst="rect">
-              <a:avLst/>
-            </a:prstGeom>
-            <a:solidFill>
-              <a:schemeClr val="bg1"/>
-            </a:solidFill>
-            <a:ln w="19050">
-              <a:solidFill>
-                <a:srgbClr val="FF6600"/>
-              </a:solidFill>
-              <a:miter lim="800000"/>
-            </a:ln>
-          </p:spPr>
-          <p:style>
-            <a:lnRef idx="2">
-              <a:schemeClr val="accent1">
-                <a:shade val="50000"/>
-              </a:schemeClr>
-            </a:lnRef>
-            <a:fillRef idx="1">
-              <a:schemeClr val="accent1"/>
-            </a:fillRef>
-            <a:effectRef idx="0">
-              <a:schemeClr val="accent1"/>
-            </a:effectRef>
-            <a:fontRef idx="minor">
-              <a:schemeClr val="lt1"/>
-            </a:fontRef>
-          </p:style>
-          <p:txBody>
-            <a:bodyPr rtlCol="0" anchor="ctr"/>
-            <a:lstStyle/>
-            <a:p>
-              <a:pPr algn="ctr"/>
-              <a:r>
-                <a:rPr lang="en-US" dirty="0" smtClean="0">
-                  <a:solidFill>
-                    <a:srgbClr val="FF6600"/>
-                  </a:solidFill>
-                </a:rPr>
-                <a:t>1</a:t>
-              </a:r>
-              <a:endParaRPr lang="en-US" dirty="0">
-                <a:solidFill>
-                  <a:srgbClr val="FF6600"/>
-                </a:solidFill>
-              </a:endParaRPr>
-            </a:p>
-          </p:txBody>
-        </p:sp>
-      </p:grpSp>
-      <p:grpSp>
-        <p:nvGrpSpPr>
-          <p:cNvPr id="19" name="Group 18"/>
-          <p:cNvGrpSpPr/>
-          <p:nvPr/>
-        </p:nvGrpSpPr>
-        <p:grpSpPr>
-          <a:xfrm>
-            <a:off x="3920414" y="3508072"/>
-            <a:ext cx="553813" cy="550544"/>
-            <a:chOff x="2033807" y="3546474"/>
-            <a:chExt cx="553813" cy="550544"/>
-          </a:xfrm>
-        </p:grpSpPr>
-        <p:sp>
-          <p:nvSpPr>
-            <p:cNvPr id="20" name="Rectangle 19"/>
-            <p:cNvSpPr>
-              <a:spLocks/>
-            </p:cNvSpPr>
-            <p:nvPr/>
-          </p:nvSpPr>
-          <p:spPr>
-            <a:xfrm rot="10800000" flipV="1">
-              <a:off x="2361541" y="3546474"/>
-              <a:ext cx="226079" cy="549016"/>
-            </a:xfrm>
-            <a:prstGeom prst="rect">
-              <a:avLst/>
-            </a:prstGeom>
-            <a:solidFill>
-              <a:srgbClr val="0070C0"/>
-            </a:solidFill>
-            <a:ln w="19050">
-              <a:solidFill>
-                <a:srgbClr val="0070C0"/>
-              </a:solidFill>
-              <a:miter lim="800000"/>
-            </a:ln>
-          </p:spPr>
-          <p:style>
-            <a:lnRef idx="2">
-              <a:schemeClr val="accent1">
-                <a:shade val="50000"/>
-              </a:schemeClr>
-            </a:lnRef>
-            <a:fillRef idx="1">
-              <a:schemeClr val="accent1"/>
-            </a:fillRef>
-            <a:effectRef idx="0">
-              <a:schemeClr val="accent1"/>
-            </a:effectRef>
-            <a:fontRef idx="minor">
-              <a:schemeClr val="lt1"/>
-            </a:fontRef>
-          </p:style>
-          <p:txBody>
-            <a:bodyPr rtlCol="0" anchor="ctr"/>
-            <a:lstStyle/>
-            <a:p>
-              <a:pPr algn="ctr"/>
-              <a:r>
-                <a:rPr lang="en-US" dirty="0">
-                  <a:solidFill>
-                    <a:schemeClr val="bg1"/>
-                  </a:solidFill>
-                </a:rPr>
-                <a:t>2</a:t>
-              </a:r>
-            </a:p>
-          </p:txBody>
-        </p:sp>
-        <p:sp>
-          <p:nvSpPr>
-            <p:cNvPr id="21" name="Rectangle 20"/>
-            <p:cNvSpPr>
-              <a:spLocks/>
-            </p:cNvSpPr>
-            <p:nvPr/>
-          </p:nvSpPr>
-          <p:spPr>
-            <a:xfrm rot="10800000" flipV="1">
-              <a:off x="2033807" y="3820982"/>
-              <a:ext cx="276936" cy="276036"/>
-            </a:xfrm>
-            <a:prstGeom prst="rect">
-              <a:avLst/>
-            </a:prstGeom>
-            <a:solidFill>
-              <a:schemeClr val="bg1"/>
-            </a:solidFill>
-            <a:ln w="19050">
-              <a:solidFill>
-                <a:srgbClr val="FF6600"/>
-              </a:solidFill>
-              <a:miter lim="800000"/>
-            </a:ln>
-          </p:spPr>
-          <p:style>
-            <a:lnRef idx="2">
-              <a:schemeClr val="accent1">
-                <a:shade val="50000"/>
-              </a:schemeClr>
-            </a:lnRef>
-            <a:fillRef idx="1">
-              <a:schemeClr val="accent1"/>
-            </a:fillRef>
-            <a:effectRef idx="0">
-              <a:schemeClr val="accent1"/>
-            </a:effectRef>
-            <a:fontRef idx="minor">
-              <a:schemeClr val="lt1"/>
-            </a:fontRef>
-          </p:style>
-          <p:txBody>
-            <a:bodyPr rtlCol="0" anchor="ctr"/>
-            <a:lstStyle/>
-            <a:p>
-              <a:pPr algn="ctr"/>
-              <a:r>
-                <a:rPr lang="en-US" dirty="0" smtClean="0">
-                  <a:solidFill>
-                    <a:srgbClr val="FF6600"/>
-                  </a:solidFill>
-                </a:rPr>
-                <a:t>1</a:t>
-              </a:r>
-              <a:endParaRPr lang="en-US" dirty="0">
-                <a:solidFill>
-                  <a:srgbClr val="FF6600"/>
-                </a:solidFill>
-              </a:endParaRPr>
-            </a:p>
-          </p:txBody>
-        </p:sp>
-      </p:grpSp>
-      <p:grpSp>
-        <p:nvGrpSpPr>
           <p:cNvPr id="22" name="Group 21"/>
           <p:cNvGrpSpPr/>
           <p:nvPr/>
@@ -20908,6 +20636,404 @@
                   <a:srgbClr val="FF6600"/>
                 </a:solidFill>
               </a:endParaRPr>
+            </a:p>
+          </p:txBody>
+        </p:sp>
+      </p:grpSp>
+      <p:grpSp>
+        <p:nvGrpSpPr>
+          <p:cNvPr id="3" name="Group 2"/>
+          <p:cNvGrpSpPr/>
+          <p:nvPr/>
+        </p:nvGrpSpPr>
+        <p:grpSpPr>
+          <a:xfrm>
+            <a:off x="2003739" y="3500075"/>
+            <a:ext cx="548545" cy="550800"/>
+            <a:chOff x="2003739" y="3500075"/>
+            <a:chExt cx="548545" cy="550800"/>
+          </a:xfrm>
+        </p:grpSpPr>
+        <p:grpSp>
+          <p:nvGrpSpPr>
+            <p:cNvPr id="66" name="Group 65"/>
+            <p:cNvGrpSpPr>
+              <a:grpSpLocks noChangeAspect="1"/>
+            </p:cNvGrpSpPr>
+            <p:nvPr/>
+          </p:nvGrpSpPr>
+          <p:grpSpPr>
+            <a:xfrm>
+              <a:off x="2052854" y="3551649"/>
+              <a:ext cx="450315" cy="447652"/>
+              <a:chOff x="2033804" y="3546474"/>
+              <a:chExt cx="553819" cy="550544"/>
+            </a:xfrm>
+          </p:grpSpPr>
+          <p:sp>
+            <p:nvSpPr>
+              <p:cNvPr id="59" name="Rectangle 58"/>
+              <p:cNvSpPr>
+                <a:spLocks/>
+              </p:cNvSpPr>
+              <p:nvPr/>
+            </p:nvSpPr>
+            <p:spPr>
+              <a:xfrm rot="10800000" flipV="1">
+                <a:off x="2033804" y="3546474"/>
+                <a:ext cx="553819" cy="259665"/>
+              </a:xfrm>
+              <a:prstGeom prst="rect">
+                <a:avLst/>
+              </a:prstGeom>
+              <a:solidFill>
+                <a:srgbClr val="0070C0"/>
+              </a:solidFill>
+              <a:ln w="19050">
+                <a:solidFill>
+                  <a:srgbClr val="0070C0"/>
+                </a:solidFill>
+                <a:miter lim="800000"/>
+              </a:ln>
+            </p:spPr>
+            <p:style>
+              <a:lnRef idx="2">
+                <a:schemeClr val="accent1">
+                  <a:shade val="50000"/>
+                </a:schemeClr>
+              </a:lnRef>
+              <a:fillRef idx="1">
+                <a:schemeClr val="accent1"/>
+              </a:fillRef>
+              <a:effectRef idx="0">
+                <a:schemeClr val="accent1"/>
+              </a:effectRef>
+              <a:fontRef idx="minor">
+                <a:schemeClr val="lt1"/>
+              </a:fontRef>
+            </p:style>
+            <p:txBody>
+              <a:bodyPr rtlCol="0" anchor="ctr"/>
+              <a:lstStyle/>
+              <a:p>
+                <a:pPr algn="ctr"/>
+                <a:r>
+                  <a:rPr lang="en-US" dirty="0">
+                    <a:solidFill>
+                      <a:schemeClr val="bg1"/>
+                    </a:solidFill>
+                  </a:rPr>
+                  <a:t>2</a:t>
+                </a:r>
+              </a:p>
+            </p:txBody>
+          </p:sp>
+          <p:sp>
+            <p:nvSpPr>
+              <p:cNvPr id="60" name="Rectangle 59"/>
+              <p:cNvSpPr>
+                <a:spLocks/>
+              </p:cNvSpPr>
+              <p:nvPr/>
+            </p:nvSpPr>
+            <p:spPr>
+              <a:xfrm rot="10800000" flipV="1">
+                <a:off x="2033807" y="3851858"/>
+                <a:ext cx="283261" cy="245160"/>
+              </a:xfrm>
+              <a:prstGeom prst="rect">
+                <a:avLst/>
+              </a:prstGeom>
+              <a:solidFill>
+                <a:schemeClr val="bg1"/>
+              </a:solidFill>
+              <a:ln w="19050">
+                <a:solidFill>
+                  <a:srgbClr val="FF6600"/>
+                </a:solidFill>
+                <a:miter lim="800000"/>
+              </a:ln>
+            </p:spPr>
+            <p:style>
+              <a:lnRef idx="2">
+                <a:schemeClr val="accent1">
+                  <a:shade val="50000"/>
+                </a:schemeClr>
+              </a:lnRef>
+              <a:fillRef idx="1">
+                <a:schemeClr val="accent1"/>
+              </a:fillRef>
+              <a:effectRef idx="0">
+                <a:schemeClr val="accent1"/>
+              </a:effectRef>
+              <a:fontRef idx="minor">
+                <a:schemeClr val="lt1"/>
+              </a:fontRef>
+            </p:style>
+            <p:txBody>
+              <a:bodyPr rtlCol="0" anchor="ctr"/>
+              <a:lstStyle/>
+              <a:p>
+                <a:pPr algn="ctr"/>
+                <a:r>
+                  <a:rPr lang="en-US" dirty="0" smtClean="0">
+                    <a:solidFill>
+                      <a:srgbClr val="FF6600"/>
+                    </a:solidFill>
+                  </a:rPr>
+                  <a:t>1</a:t>
+                </a:r>
+                <a:endParaRPr lang="en-US" dirty="0">
+                  <a:solidFill>
+                    <a:srgbClr val="FF6600"/>
+                  </a:solidFill>
+                </a:endParaRPr>
+              </a:p>
+            </p:txBody>
+          </p:sp>
+        </p:grpSp>
+        <p:sp>
+          <p:nvSpPr>
+            <p:cNvPr id="15" name="Rectangle 39"/>
+            <p:cNvSpPr>
+              <a:spLocks/>
+            </p:cNvSpPr>
+            <p:nvPr/>
+          </p:nvSpPr>
+          <p:spPr>
+            <a:xfrm>
+              <a:off x="2003739" y="3500075"/>
+              <a:ext cx="548545" cy="550800"/>
+            </a:xfrm>
+            <a:prstGeom prst="rect">
+              <a:avLst/>
+            </a:prstGeom>
+            <a:noFill/>
+            <a:ln w="9525">
+              <a:noFill/>
+            </a:ln>
+          </p:spPr>
+          <p:style>
+            <a:lnRef idx="2">
+              <a:schemeClr val="accent1">
+                <a:shade val="50000"/>
+              </a:schemeClr>
+            </a:lnRef>
+            <a:fillRef idx="1">
+              <a:schemeClr val="accent1"/>
+            </a:fillRef>
+            <a:effectRef idx="0">
+              <a:schemeClr val="accent1"/>
+            </a:effectRef>
+            <a:fontRef idx="minor">
+              <a:schemeClr val="lt1"/>
+            </a:fontRef>
+          </p:style>
+          <p:txBody>
+            <a:bodyPr rtlCol="0" anchor="ctr"/>
+            <a:lstStyle/>
+            <a:p>
+              <a:pPr algn="ctr"/>
+              <a:endParaRPr lang="en-US"/>
+            </a:p>
+          </p:txBody>
+        </p:sp>
+      </p:grpSp>
+      <p:grpSp>
+        <p:nvGrpSpPr>
+          <p:cNvPr id="4" name="Group 3"/>
+          <p:cNvGrpSpPr/>
+          <p:nvPr/>
+        </p:nvGrpSpPr>
+        <p:grpSpPr>
+          <a:xfrm>
+            <a:off x="3871322" y="3440458"/>
+            <a:ext cx="548545" cy="550800"/>
+            <a:chOff x="3871322" y="3440458"/>
+            <a:chExt cx="548545" cy="550800"/>
+          </a:xfrm>
+        </p:grpSpPr>
+        <p:grpSp>
+          <p:nvGrpSpPr>
+            <p:cNvPr id="19" name="Group 18"/>
+            <p:cNvGrpSpPr>
+              <a:grpSpLocks noChangeAspect="1"/>
+            </p:cNvGrpSpPr>
+            <p:nvPr/>
+          </p:nvGrpSpPr>
+          <p:grpSpPr>
+            <a:xfrm>
+              <a:off x="3920436" y="3492032"/>
+              <a:ext cx="450315" cy="447652"/>
+              <a:chOff x="2033807" y="3546474"/>
+              <a:chExt cx="553813" cy="550544"/>
+            </a:xfrm>
+          </p:grpSpPr>
+          <p:sp>
+            <p:nvSpPr>
+              <p:cNvPr id="20" name="Rectangle 19"/>
+              <p:cNvSpPr>
+                <a:spLocks/>
+              </p:cNvSpPr>
+              <p:nvPr/>
+            </p:nvSpPr>
+            <p:spPr>
+              <a:xfrm rot="10800000" flipV="1">
+                <a:off x="2361541" y="3546474"/>
+                <a:ext cx="226079" cy="549016"/>
+              </a:xfrm>
+              <a:prstGeom prst="rect">
+                <a:avLst/>
+              </a:prstGeom>
+              <a:solidFill>
+                <a:srgbClr val="0070C0"/>
+              </a:solidFill>
+              <a:ln w="19050">
+                <a:solidFill>
+                  <a:srgbClr val="0070C0"/>
+                </a:solidFill>
+                <a:miter lim="800000"/>
+              </a:ln>
+            </p:spPr>
+            <p:style>
+              <a:lnRef idx="2">
+                <a:schemeClr val="accent1">
+                  <a:shade val="50000"/>
+                </a:schemeClr>
+              </a:lnRef>
+              <a:fillRef idx="1">
+                <a:schemeClr val="accent1"/>
+              </a:fillRef>
+              <a:effectRef idx="0">
+                <a:schemeClr val="accent1"/>
+              </a:effectRef>
+              <a:fontRef idx="minor">
+                <a:schemeClr val="lt1"/>
+              </a:fontRef>
+            </p:style>
+            <p:txBody>
+              <a:bodyPr rtlCol="0" anchor="ctr"/>
+              <a:lstStyle/>
+              <a:p>
+                <a:pPr algn="ctr"/>
+                <a:r>
+                  <a:rPr lang="en-US" dirty="0">
+                    <a:solidFill>
+                      <a:schemeClr val="bg1"/>
+                    </a:solidFill>
+                  </a:rPr>
+                  <a:t>2</a:t>
+                </a:r>
+              </a:p>
+            </p:txBody>
+          </p:sp>
+          <p:sp>
+            <p:nvSpPr>
+              <p:cNvPr id="21" name="Rectangle 20"/>
+              <p:cNvSpPr>
+                <a:spLocks/>
+              </p:cNvSpPr>
+              <p:nvPr/>
+            </p:nvSpPr>
+            <p:spPr>
+              <a:xfrm rot="10800000" flipV="1">
+                <a:off x="2033807" y="3820982"/>
+                <a:ext cx="276936" cy="276036"/>
+              </a:xfrm>
+              <a:prstGeom prst="rect">
+                <a:avLst/>
+              </a:prstGeom>
+              <a:solidFill>
+                <a:schemeClr val="bg1"/>
+              </a:solidFill>
+              <a:ln w="19050">
+                <a:solidFill>
+                  <a:srgbClr val="FF6600"/>
+                </a:solidFill>
+                <a:miter lim="800000"/>
+              </a:ln>
+            </p:spPr>
+            <p:style>
+              <a:lnRef idx="2">
+                <a:schemeClr val="accent1">
+                  <a:shade val="50000"/>
+                </a:schemeClr>
+              </a:lnRef>
+              <a:fillRef idx="1">
+                <a:schemeClr val="accent1"/>
+              </a:fillRef>
+              <a:effectRef idx="0">
+                <a:schemeClr val="accent1"/>
+              </a:effectRef>
+              <a:fontRef idx="minor">
+                <a:schemeClr val="lt1"/>
+              </a:fontRef>
+            </p:style>
+            <p:txBody>
+              <a:bodyPr rtlCol="0" anchor="ctr"/>
+              <a:lstStyle/>
+              <a:p>
+                <a:pPr algn="ctr"/>
+                <a:r>
+                  <a:rPr lang="en-US" dirty="0" smtClean="0">
+                    <a:solidFill>
+                      <a:srgbClr val="FF6600"/>
+                    </a:solidFill>
+                  </a:rPr>
+                  <a:t>1</a:t>
+                </a:r>
+                <a:endParaRPr lang="en-US" dirty="0">
+                  <a:solidFill>
+                    <a:srgbClr val="FF6600"/>
+                  </a:solidFill>
+                </a:endParaRPr>
+              </a:p>
+            </p:txBody>
+          </p:sp>
+        </p:grpSp>
+        <p:sp>
+          <p:nvSpPr>
+            <p:cNvPr id="16" name="Rectangle 39"/>
+            <p:cNvSpPr>
+              <a:spLocks/>
+            </p:cNvSpPr>
+            <p:nvPr/>
+          </p:nvSpPr>
+          <p:spPr>
+            <a:xfrm>
+              <a:off x="3871322" y="3440458"/>
+              <a:ext cx="548545" cy="550800"/>
+            </a:xfrm>
+            <a:prstGeom prst="rect">
+              <a:avLst/>
+            </a:prstGeom>
+            <a:noFill/>
+            <a:ln w="9525">
+              <a:noFill/>
+            </a:ln>
+          </p:spPr>
+          <p:style>
+            <a:lnRef idx="2">
+              <a:schemeClr val="accent1">
+                <a:shade val="50000"/>
+              </a:schemeClr>
+            </a:lnRef>
+            <a:fillRef idx="1">
+              <a:schemeClr val="accent1"/>
+            </a:fillRef>
+            <a:effectRef idx="0">
+              <a:schemeClr val="accent1"/>
+            </a:effectRef>
+            <a:fontRef idx="minor">
+              <a:schemeClr val="lt1"/>
+            </a:fontRef>
+          </p:style>
+          <p:txBody>
+            <a:bodyPr rtlCol="0" anchor="ctr"/>
+            <a:lstStyle/>
+            <a:p>
+              <a:pPr algn="ctr"/>
+              <a:endParaRPr lang="en-US"/>
             </a:p>
           </p:txBody>
         </p:sp>

</xml_diff>